<commit_message>
updated slide templates + paths
</commit_message>
<xml_diff>
--- a/Slides/Schools Snapshot/AssessmentOverview_SEEE_202306.pptx
+++ b/Slides/Schools Snapshot/AssessmentOverview_SEEE_202306.pptx
@@ -587,8 +587,8 @@
 </file>
 
 <file path=ppt/slideLayouts/slideLayout10.xml><?xml version="1.0" encoding="utf-8"?>
-<p:sldLayout xmlns:a="http://schemas.openxmlformats.org/drawingml/2006/main" xmlns:r="http://schemas.openxmlformats.org/officeDocument/2006/relationships" xmlns:p="http://schemas.openxmlformats.org/presentationml/2006/main" preserve="1">
-  <p:cSld name="Comparison - Yellow Sub-Header">
+<p:sldLayout xmlns:a="http://schemas.openxmlformats.org/drawingml/2006/main" xmlns:r="http://schemas.openxmlformats.org/officeDocument/2006/relationships" xmlns:p="http://schemas.openxmlformats.org/presentationml/2006/main" type="blank" preserve="1">
+  <p:cSld name="Blank">
     <p:spTree>
       <p:nvGrpSpPr>
         <p:cNvPr id="1" name=""/>
@@ -605,10 +605,10 @@
       </p:grpSpPr>
       <p:sp>
         <p:nvSpPr>
-          <p:cNvPr id="3" name="Text Placeholder 2">
-            <a:extLst>
-              <a:ext uri="{FF2B5EF4-FFF2-40B4-BE49-F238E27FC236}">
-                <a16:creationId xmlns:a16="http://schemas.microsoft.com/office/drawing/2014/main" id="{A7EE70C0-0004-DA5B-411C-22A2E3426F32}"/>
+          <p:cNvPr id="6" name="Slide Number Placeholder 5">
+            <a:extLst>
+              <a:ext uri="{FF2B5EF4-FFF2-40B4-BE49-F238E27FC236}">
+                <a16:creationId xmlns:a16="http://schemas.microsoft.com/office/drawing/2014/main" id="{D69C960F-029C-289D-38D6-CF5F60CDEE1C}"/>
               </a:ext>
             </a:extLst>
           </p:cNvPr>
@@ -616,264 +616,44 @@
             <a:spLocks noGrp="1"/>
           </p:cNvSpPr>
           <p:nvPr>
-            <p:ph type="body" idx="1"/>
+            <p:ph type="sldNum" sz="quarter" idx="4"/>
           </p:nvPr>
         </p:nvSpPr>
         <p:spPr>
           <a:xfrm>
-            <a:off x="326590" y="1150069"/>
-            <a:ext cx="5693210" cy="659877"/>
-          </a:xfrm>
-          <a:prstGeom prst="rect">
-            <a:avLst/>
-          </a:prstGeom>
-          <a:solidFill>
-            <a:srgbClr val="F4DB52"/>
-          </a:solidFill>
-        </p:spPr>
-        <p:txBody>
-          <a:bodyPr anchor="b"/>
+            <a:off x="11484634" y="6650966"/>
+            <a:ext cx="370936" cy="207034"/>
+          </a:xfrm>
+          <a:prstGeom prst="rect">
+            <a:avLst/>
+          </a:prstGeom>
+        </p:spPr>
+        <p:txBody>
+          <a:bodyPr/>
           <a:lstStyle>
-            <a:lvl1pPr marL="0" indent="0">
-              <a:buNone/>
-              <a:defRPr sz="2800" b="1">
+            <a:lvl1pPr algn="r">
+              <a:defRPr sz="1000">
                 <a:solidFill>
-                  <a:schemeClr val="tx1"/>
-                </a:solidFill>
-              </a:defRPr>
-            </a:lvl1pPr>
-            <a:lvl2pPr marL="457200" indent="0">
-              <a:buNone/>
-              <a:defRPr sz="2000" b="1"/>
-            </a:lvl2pPr>
-            <a:lvl3pPr marL="914400" indent="0">
-              <a:buNone/>
-              <a:defRPr sz="1800" b="1"/>
-            </a:lvl3pPr>
-            <a:lvl4pPr marL="1371600" indent="0">
-              <a:buNone/>
-              <a:defRPr sz="1600" b="1"/>
-            </a:lvl4pPr>
-            <a:lvl5pPr marL="1828800" indent="0">
-              <a:buNone/>
-              <a:defRPr sz="1600" b="1"/>
-            </a:lvl5pPr>
-            <a:lvl6pPr marL="2286000" indent="0">
-              <a:buNone/>
-              <a:defRPr sz="1600" b="1"/>
-            </a:lvl6pPr>
-            <a:lvl7pPr marL="2743200" indent="0">
-              <a:buNone/>
-              <a:defRPr sz="1600" b="1"/>
-            </a:lvl7pPr>
-            <a:lvl8pPr marL="3200400" indent="0">
-              <a:buNone/>
-              <a:defRPr sz="1600" b="1"/>
-            </a:lvl8pPr>
-            <a:lvl9pPr marL="3657600" indent="0">
-              <a:buNone/>
-              <a:defRPr sz="1600" b="1"/>
-            </a:lvl9pPr>
-          </a:lstStyle>
-          <a:p>
-            <a:pPr lvl="0"/>
-            <a:r>
-              <a:rPr lang="en-US"/>
-              <a:t>Click to edit Master text styles</a:t>
-            </a:r>
-          </a:p>
-        </p:txBody>
-      </p:sp>
-      <p:sp>
-        <p:nvSpPr>
-          <p:cNvPr id="4" name="Content Placeholder 3">
-            <a:extLst>
-              <a:ext uri="{FF2B5EF4-FFF2-40B4-BE49-F238E27FC236}">
-                <a16:creationId xmlns:a16="http://schemas.microsoft.com/office/drawing/2014/main" id="{433E7C9F-2EEC-6475-AE93-1246752B2204}"/>
-              </a:ext>
-            </a:extLst>
-          </p:cNvPr>
-          <p:cNvSpPr>
-            <a:spLocks noGrp="1"/>
-          </p:cNvSpPr>
-          <p:nvPr>
-            <p:ph sz="half" idx="2"/>
-          </p:nvPr>
-        </p:nvSpPr>
-        <p:spPr>
-          <a:xfrm>
-            <a:off x="326590" y="1809946"/>
-            <a:ext cx="5693210" cy="4619134"/>
-          </a:xfrm>
-          <a:prstGeom prst="rect">
-            <a:avLst/>
-          </a:prstGeom>
-        </p:spPr>
-        <p:txBody>
-          <a:bodyPr/>
-          <a:lstStyle/>
-          <a:p>
-            <a:pPr lvl="0"/>
-            <a:r>
-              <a:rPr lang="en-US"/>
-              <a:t>Click to edit Master text styles</a:t>
-            </a:r>
-          </a:p>
-          <a:p>
-            <a:pPr lvl="1"/>
-            <a:r>
-              <a:rPr lang="en-US"/>
-              <a:t>Second level</a:t>
-            </a:r>
-          </a:p>
-          <a:p>
-            <a:pPr lvl="2"/>
-            <a:r>
-              <a:rPr lang="en-US"/>
-              <a:t>Third level</a:t>
-            </a:r>
-          </a:p>
-          <a:p>
-            <a:pPr lvl="3"/>
-            <a:r>
-              <a:rPr lang="en-US"/>
-              <a:t>Fourth level</a:t>
-            </a:r>
-          </a:p>
-          <a:p>
-            <a:pPr lvl="4"/>
-            <a:r>
-              <a:rPr lang="en-US"/>
-              <a:t>Fifth level</a:t>
-            </a:r>
-            <a:endParaRPr lang="en-GB" dirty="0"/>
-          </a:p>
-        </p:txBody>
-      </p:sp>
-      <p:sp>
-        <p:nvSpPr>
-          <p:cNvPr id="5" name="Text Placeholder 4">
-            <a:extLst>
-              <a:ext uri="{FF2B5EF4-FFF2-40B4-BE49-F238E27FC236}">
-                <a16:creationId xmlns:a16="http://schemas.microsoft.com/office/drawing/2014/main" id="{6581B006-631F-4BB6-7AFB-4D358EC005E0}"/>
-              </a:ext>
-            </a:extLst>
-          </p:cNvPr>
-          <p:cNvSpPr>
-            <a:spLocks noGrp="1"/>
-          </p:cNvSpPr>
-          <p:nvPr>
-            <p:ph type="body" sz="quarter" idx="3"/>
-          </p:nvPr>
-        </p:nvSpPr>
-        <p:spPr>
-          <a:xfrm>
-            <a:off x="6172199" y="1150069"/>
-            <a:ext cx="5683371" cy="659877"/>
-          </a:xfrm>
-          <a:prstGeom prst="rect">
-            <a:avLst/>
-          </a:prstGeom>
-          <a:solidFill>
-            <a:srgbClr val="F4DB52"/>
-          </a:solidFill>
-        </p:spPr>
-        <p:txBody>
-          <a:bodyPr vert="horz" lIns="91440" tIns="45720" rIns="91440" bIns="45720" rtlCol="0" anchor="b">
-            <a:normAutofit/>
-          </a:bodyPr>
-          <a:lstStyle>
-            <a:lvl1pPr>
-              <a:defRPr lang="en-US" b="1" dirty="0">
-                <a:solidFill>
-                  <a:schemeClr val="tx1"/>
+                  <a:schemeClr val="bg1"/>
                 </a:solidFill>
               </a:defRPr>
             </a:lvl1pPr>
           </a:lstStyle>
           <a:p>
-            <a:pPr marL="0" lvl="0" indent="0">
-              <a:buNone/>
-            </a:pPr>
-            <a:r>
-              <a:rPr lang="en-US"/>
-              <a:t>Click to edit Master text styles</a:t>
-            </a:r>
-          </a:p>
-        </p:txBody>
-      </p:sp>
-      <p:sp>
-        <p:nvSpPr>
-          <p:cNvPr id="6" name="Content Placeholder 5">
-            <a:extLst>
-              <a:ext uri="{FF2B5EF4-FFF2-40B4-BE49-F238E27FC236}">
-                <a16:creationId xmlns:a16="http://schemas.microsoft.com/office/drawing/2014/main" id="{4D14FAB4-C3D5-5802-AC62-3F1B0FEE0444}"/>
-              </a:ext>
-            </a:extLst>
-          </p:cNvPr>
-          <p:cNvSpPr>
-            <a:spLocks noGrp="1"/>
-          </p:cNvSpPr>
-          <p:nvPr>
-            <p:ph sz="quarter" idx="4"/>
-          </p:nvPr>
-        </p:nvSpPr>
-        <p:spPr>
-          <a:xfrm>
-            <a:off x="6172199" y="1809946"/>
-            <a:ext cx="5673525" cy="4619134"/>
-          </a:xfrm>
-          <a:prstGeom prst="rect">
-            <a:avLst/>
-          </a:prstGeom>
-        </p:spPr>
-        <p:txBody>
-          <a:bodyPr/>
-          <a:lstStyle/>
-          <a:p>
-            <a:pPr lvl="0"/>
-            <a:r>
-              <a:rPr lang="en-US"/>
-              <a:t>Click to edit Master text styles</a:t>
-            </a:r>
-          </a:p>
-          <a:p>
-            <a:pPr lvl="1"/>
-            <a:r>
-              <a:rPr lang="en-US"/>
-              <a:t>Second level</a:t>
-            </a:r>
-          </a:p>
-          <a:p>
-            <a:pPr lvl="2"/>
-            <a:r>
-              <a:rPr lang="en-US"/>
-              <a:t>Third level</a:t>
-            </a:r>
-          </a:p>
-          <a:p>
-            <a:pPr lvl="3"/>
-            <a:r>
-              <a:rPr lang="en-US"/>
-              <a:t>Fourth level</a:t>
-            </a:r>
-          </a:p>
-          <a:p>
-            <a:pPr lvl="4"/>
-            <a:r>
-              <a:rPr lang="en-US"/>
-              <a:t>Fifth level</a:t>
-            </a:r>
+            <a:fld id="{7767393B-85A6-40C1-AB65-A74DA355DB56}" type="slidenum">
+              <a:rPr lang="en-GB" smtClean="0"/>
+              <a:t>‹#›</a:t>
+            </a:fld>
             <a:endParaRPr lang="en-GB"/>
           </a:p>
         </p:txBody>
       </p:sp>
       <p:sp>
         <p:nvSpPr>
-          <p:cNvPr id="11" name="Rectangle 10">
-            <a:extLst>
-              <a:ext uri="{FF2B5EF4-FFF2-40B4-BE49-F238E27FC236}">
-                <a16:creationId xmlns:a16="http://schemas.microsoft.com/office/drawing/2014/main" id="{EBB802B9-F88A-543F-655F-6F4D0B19FEA3}"/>
+          <p:cNvPr id="4" name="Parallelogram 3">
+            <a:extLst>
+              <a:ext uri="{FF2B5EF4-FFF2-40B4-BE49-F238E27FC236}">
+                <a16:creationId xmlns:a16="http://schemas.microsoft.com/office/drawing/2014/main" id="{1AE01DBA-F45B-E26C-6B7B-5DDD82F4AC45}"/>
               </a:ext>
             </a:extLst>
           </p:cNvPr>
@@ -882,14 +662,14 @@
         </p:nvSpPr>
         <p:spPr>
           <a:xfrm>
-            <a:off x="0" y="101176"/>
-            <a:ext cx="12191999" cy="827008"/>
-          </a:xfrm>
-          <a:prstGeom prst="rect">
-            <a:avLst/>
-          </a:prstGeom>
-          <a:solidFill>
-            <a:srgbClr val="245391"/>
+            <a:off x="11208471" y="159685"/>
+            <a:ext cx="848382" cy="709988"/>
+          </a:xfrm>
+          <a:prstGeom prst="parallelogram">
+            <a:avLst/>
+          </a:prstGeom>
+          <a:solidFill>
+            <a:srgbClr val="F4DB52"/>
           </a:solidFill>
           <a:ln>
             <a:noFill/>
@@ -920,1648 +700,6 @@
           </a:p>
         </p:txBody>
       </p:sp>
-      <p:sp>
-        <p:nvSpPr>
-          <p:cNvPr id="12" name="Title 1">
-            <a:extLst>
-              <a:ext uri="{FF2B5EF4-FFF2-40B4-BE49-F238E27FC236}">
-                <a16:creationId xmlns:a16="http://schemas.microsoft.com/office/drawing/2014/main" id="{661E29F3-04F3-2EEC-DB5E-CE1144A482CA}"/>
-              </a:ext>
-            </a:extLst>
-          </p:cNvPr>
-          <p:cNvSpPr>
-            <a:spLocks noGrp="1"/>
-          </p:cNvSpPr>
-          <p:nvPr>
-            <p:ph type="title"/>
-          </p:nvPr>
-        </p:nvSpPr>
-        <p:spPr>
-          <a:xfrm>
-            <a:off x="326590" y="101175"/>
-            <a:ext cx="10881880" cy="827009"/>
-          </a:xfrm>
-          <a:prstGeom prst="rect">
-            <a:avLst/>
-          </a:prstGeom>
-          <a:solidFill>
-            <a:srgbClr val="245391"/>
-          </a:solidFill>
-        </p:spPr>
-        <p:txBody>
-          <a:bodyPr>
-            <a:normAutofit/>
-          </a:bodyPr>
-          <a:lstStyle>
-            <a:lvl1pPr marL="0" indent="0">
-              <a:defRPr sz="3200" b="1">
-                <a:solidFill>
-                  <a:schemeClr val="bg1"/>
-                </a:solidFill>
-              </a:defRPr>
-            </a:lvl1pPr>
-          </a:lstStyle>
-          <a:p>
-            <a:r>
-              <a:rPr lang="en-US"/>
-              <a:t>Click to edit Master title style</a:t>
-            </a:r>
-            <a:endParaRPr lang="en-GB" dirty="0"/>
-          </a:p>
-        </p:txBody>
-      </p:sp>
-      <p:sp>
-        <p:nvSpPr>
-          <p:cNvPr id="13" name="Slide Number Placeholder 5">
-            <a:extLst>
-              <a:ext uri="{FF2B5EF4-FFF2-40B4-BE49-F238E27FC236}">
-                <a16:creationId xmlns:a16="http://schemas.microsoft.com/office/drawing/2014/main" id="{B0D63A05-1B5F-F916-3C25-1C57B251A0A9}"/>
-              </a:ext>
-            </a:extLst>
-          </p:cNvPr>
-          <p:cNvSpPr>
-            <a:spLocks noGrp="1"/>
-          </p:cNvSpPr>
-          <p:nvPr>
-            <p:ph type="sldNum" sz="quarter" idx="10"/>
-          </p:nvPr>
-        </p:nvSpPr>
-        <p:spPr>
-          <a:xfrm>
-            <a:off x="11484634" y="6650966"/>
-            <a:ext cx="370936" cy="207034"/>
-          </a:xfrm>
-          <a:prstGeom prst="rect">
-            <a:avLst/>
-          </a:prstGeom>
-        </p:spPr>
-        <p:txBody>
-          <a:bodyPr/>
-          <a:lstStyle>
-            <a:lvl1pPr algn="r">
-              <a:defRPr sz="1000">
-                <a:solidFill>
-                  <a:schemeClr val="bg1"/>
-                </a:solidFill>
-              </a:defRPr>
-            </a:lvl1pPr>
-          </a:lstStyle>
-          <a:p>
-            <a:fld id="{7767393B-85A6-40C1-AB65-A74DA355DB56}" type="slidenum">
-              <a:rPr lang="en-GB" smtClean="0"/>
-              <a:pPr/>
-              <a:t>‹#›</a:t>
-            </a:fld>
-            <a:endParaRPr lang="en-GB"/>
-          </a:p>
-        </p:txBody>
-      </p:sp>
-      <p:sp>
-        <p:nvSpPr>
-          <p:cNvPr id="10" name="Parallelogram 9">
-            <a:extLst>
-              <a:ext uri="{FF2B5EF4-FFF2-40B4-BE49-F238E27FC236}">
-                <a16:creationId xmlns:a16="http://schemas.microsoft.com/office/drawing/2014/main" id="{54247249-9BE4-3BEC-6B23-7ADD02874617}"/>
-              </a:ext>
-            </a:extLst>
-          </p:cNvPr>
-          <p:cNvSpPr/>
-          <p:nvPr/>
-        </p:nvSpPr>
-        <p:spPr>
-          <a:xfrm>
-            <a:off x="11208471" y="159685"/>
-            <a:ext cx="848382" cy="709988"/>
-          </a:xfrm>
-          <a:prstGeom prst="parallelogram">
-            <a:avLst/>
-          </a:prstGeom>
-          <a:solidFill>
-            <a:srgbClr val="F4DB52"/>
-          </a:solidFill>
-          <a:ln>
-            <a:noFill/>
-          </a:ln>
-        </p:spPr>
-        <p:style>
-          <a:lnRef idx="2">
-            <a:schemeClr val="accent1">
-              <a:shade val="50000"/>
-            </a:schemeClr>
-          </a:lnRef>
-          <a:fillRef idx="1">
-            <a:schemeClr val="accent1"/>
-          </a:fillRef>
-          <a:effectRef idx="0">
-            <a:schemeClr val="accent1"/>
-          </a:effectRef>
-          <a:fontRef idx="minor">
-            <a:schemeClr val="lt1"/>
-          </a:fontRef>
-        </p:style>
-        <p:txBody>
-          <a:bodyPr rtlCol="0" anchor="ctr"/>
-          <a:lstStyle/>
-          <a:p>
-            <a:pPr algn="ctr"/>
-            <a:endParaRPr lang="en-GB"/>
-          </a:p>
-        </p:txBody>
-      </p:sp>
-      <p:pic>
-        <p:nvPicPr>
-          <p:cNvPr id="14" name="Graphic 13">
-            <a:extLst>
-              <a:ext uri="{FF2B5EF4-FFF2-40B4-BE49-F238E27FC236}">
-                <a16:creationId xmlns:a16="http://schemas.microsoft.com/office/drawing/2014/main" id="{D29499FA-932A-0653-24D8-F298B96B8D1C}"/>
-              </a:ext>
-            </a:extLst>
-          </p:cNvPr>
-          <p:cNvPicPr>
-            <a:picLocks noChangeAspect="1"/>
-          </p:cNvPicPr>
-          <p:nvPr/>
-        </p:nvPicPr>
-        <p:blipFill>
-          <a:blip r:embed="rId2">
-            <a:extLst>
-              <a:ext uri="{28A0092B-C50C-407E-A947-70E740481C1C}">
-                <a14:useLocalDpi xmlns:a14="http://schemas.microsoft.com/office/drawing/2010/main" val="0"/>
-              </a:ext>
-              <a:ext uri="{96DAC541-7B7A-43D3-8B79-37D633B846F1}">
-                <asvg:svgBlip xmlns:asvg="http://schemas.microsoft.com/office/drawing/2016/SVG/main" r:embed="rId3"/>
-              </a:ext>
-            </a:extLst>
-          </a:blip>
-          <a:stretch>
-            <a:fillRect/>
-          </a:stretch>
-        </p:blipFill>
-        <p:spPr>
-          <a:xfrm>
-            <a:off x="11419250" y="203307"/>
-            <a:ext cx="426823" cy="622742"/>
-          </a:xfrm>
-          <a:prstGeom prst="rect">
-            <a:avLst/>
-          </a:prstGeom>
-        </p:spPr>
-      </p:pic>
-    </p:spTree>
-    <p:extLst>
-      <p:ext uri="{BB962C8B-B14F-4D97-AF65-F5344CB8AC3E}">
-        <p14:creationId xmlns:p14="http://schemas.microsoft.com/office/powerpoint/2010/main" val="1177837866"/>
-      </p:ext>
-    </p:extLst>
-  </p:cSld>
-  <p:clrMapOvr>
-    <a:masterClrMapping/>
-  </p:clrMapOvr>
-</p:sldLayout>
-</file>
-
-<file path=ppt/slideLayouts/slideLayout11.xml><?xml version="1.0" encoding="utf-8"?>
-<p:sldLayout xmlns:a="http://schemas.openxmlformats.org/drawingml/2006/main" xmlns:r="http://schemas.openxmlformats.org/officeDocument/2006/relationships" xmlns:p="http://schemas.openxmlformats.org/presentationml/2006/main" preserve="1">
-  <p:cSld name="Comparison - Green Sub-Header">
-    <p:spTree>
-      <p:nvGrpSpPr>
-        <p:cNvPr id="1" name=""/>
-        <p:cNvGrpSpPr/>
-        <p:nvPr/>
-      </p:nvGrpSpPr>
-      <p:grpSpPr>
-        <a:xfrm>
-          <a:off x="0" y="0"/>
-          <a:ext cx="0" cy="0"/>
-          <a:chOff x="0" y="0"/>
-          <a:chExt cx="0" cy="0"/>
-        </a:xfrm>
-      </p:grpSpPr>
-      <p:sp>
-        <p:nvSpPr>
-          <p:cNvPr id="3" name="Text Placeholder 2">
-            <a:extLst>
-              <a:ext uri="{FF2B5EF4-FFF2-40B4-BE49-F238E27FC236}">
-                <a16:creationId xmlns:a16="http://schemas.microsoft.com/office/drawing/2014/main" id="{A7EE70C0-0004-DA5B-411C-22A2E3426F32}"/>
-              </a:ext>
-            </a:extLst>
-          </p:cNvPr>
-          <p:cNvSpPr>
-            <a:spLocks noGrp="1"/>
-          </p:cNvSpPr>
-          <p:nvPr>
-            <p:ph type="body" idx="1"/>
-          </p:nvPr>
-        </p:nvSpPr>
-        <p:spPr>
-          <a:xfrm>
-            <a:off x="326590" y="1150069"/>
-            <a:ext cx="5693210" cy="659877"/>
-          </a:xfrm>
-          <a:prstGeom prst="rect">
-            <a:avLst/>
-          </a:prstGeom>
-          <a:solidFill>
-            <a:srgbClr val="4AAF55"/>
-          </a:solidFill>
-        </p:spPr>
-        <p:txBody>
-          <a:bodyPr anchor="b"/>
-          <a:lstStyle>
-            <a:lvl1pPr marL="0" indent="0">
-              <a:buNone/>
-              <a:defRPr sz="2800" b="1">
-                <a:solidFill>
-                  <a:schemeClr val="bg1"/>
-                </a:solidFill>
-              </a:defRPr>
-            </a:lvl1pPr>
-            <a:lvl2pPr marL="457200" indent="0">
-              <a:buNone/>
-              <a:defRPr sz="2000" b="1"/>
-            </a:lvl2pPr>
-            <a:lvl3pPr marL="914400" indent="0">
-              <a:buNone/>
-              <a:defRPr sz="1800" b="1"/>
-            </a:lvl3pPr>
-            <a:lvl4pPr marL="1371600" indent="0">
-              <a:buNone/>
-              <a:defRPr sz="1600" b="1"/>
-            </a:lvl4pPr>
-            <a:lvl5pPr marL="1828800" indent="0">
-              <a:buNone/>
-              <a:defRPr sz="1600" b="1"/>
-            </a:lvl5pPr>
-            <a:lvl6pPr marL="2286000" indent="0">
-              <a:buNone/>
-              <a:defRPr sz="1600" b="1"/>
-            </a:lvl6pPr>
-            <a:lvl7pPr marL="2743200" indent="0">
-              <a:buNone/>
-              <a:defRPr sz="1600" b="1"/>
-            </a:lvl7pPr>
-            <a:lvl8pPr marL="3200400" indent="0">
-              <a:buNone/>
-              <a:defRPr sz="1600" b="1"/>
-            </a:lvl8pPr>
-            <a:lvl9pPr marL="3657600" indent="0">
-              <a:buNone/>
-              <a:defRPr sz="1600" b="1"/>
-            </a:lvl9pPr>
-          </a:lstStyle>
-          <a:p>
-            <a:pPr lvl="0"/>
-            <a:r>
-              <a:rPr lang="en-US"/>
-              <a:t>Click to edit Master text styles</a:t>
-            </a:r>
-          </a:p>
-        </p:txBody>
-      </p:sp>
-      <p:sp>
-        <p:nvSpPr>
-          <p:cNvPr id="4" name="Content Placeholder 3">
-            <a:extLst>
-              <a:ext uri="{FF2B5EF4-FFF2-40B4-BE49-F238E27FC236}">
-                <a16:creationId xmlns:a16="http://schemas.microsoft.com/office/drawing/2014/main" id="{433E7C9F-2EEC-6475-AE93-1246752B2204}"/>
-              </a:ext>
-            </a:extLst>
-          </p:cNvPr>
-          <p:cNvSpPr>
-            <a:spLocks noGrp="1"/>
-          </p:cNvSpPr>
-          <p:nvPr>
-            <p:ph sz="half" idx="2"/>
-          </p:nvPr>
-        </p:nvSpPr>
-        <p:spPr>
-          <a:xfrm>
-            <a:off x="326590" y="1809946"/>
-            <a:ext cx="5693210" cy="4619134"/>
-          </a:xfrm>
-          <a:prstGeom prst="rect">
-            <a:avLst/>
-          </a:prstGeom>
-        </p:spPr>
-        <p:txBody>
-          <a:bodyPr/>
-          <a:lstStyle/>
-          <a:p>
-            <a:pPr lvl="0"/>
-            <a:r>
-              <a:rPr lang="en-US"/>
-              <a:t>Click to edit Master text styles</a:t>
-            </a:r>
-          </a:p>
-          <a:p>
-            <a:pPr lvl="1"/>
-            <a:r>
-              <a:rPr lang="en-US"/>
-              <a:t>Second level</a:t>
-            </a:r>
-          </a:p>
-          <a:p>
-            <a:pPr lvl="2"/>
-            <a:r>
-              <a:rPr lang="en-US"/>
-              <a:t>Third level</a:t>
-            </a:r>
-          </a:p>
-          <a:p>
-            <a:pPr lvl="3"/>
-            <a:r>
-              <a:rPr lang="en-US"/>
-              <a:t>Fourth level</a:t>
-            </a:r>
-          </a:p>
-          <a:p>
-            <a:pPr lvl="4"/>
-            <a:r>
-              <a:rPr lang="en-US"/>
-              <a:t>Fifth level</a:t>
-            </a:r>
-            <a:endParaRPr lang="en-GB" dirty="0"/>
-          </a:p>
-        </p:txBody>
-      </p:sp>
-      <p:sp>
-        <p:nvSpPr>
-          <p:cNvPr id="5" name="Text Placeholder 4">
-            <a:extLst>
-              <a:ext uri="{FF2B5EF4-FFF2-40B4-BE49-F238E27FC236}">
-                <a16:creationId xmlns:a16="http://schemas.microsoft.com/office/drawing/2014/main" id="{6581B006-631F-4BB6-7AFB-4D358EC005E0}"/>
-              </a:ext>
-            </a:extLst>
-          </p:cNvPr>
-          <p:cNvSpPr>
-            <a:spLocks noGrp="1"/>
-          </p:cNvSpPr>
-          <p:nvPr>
-            <p:ph type="body" sz="quarter" idx="3"/>
-          </p:nvPr>
-        </p:nvSpPr>
-        <p:spPr>
-          <a:xfrm>
-            <a:off x="6172199" y="1150069"/>
-            <a:ext cx="5683371" cy="659877"/>
-          </a:xfrm>
-          <a:prstGeom prst="rect">
-            <a:avLst/>
-          </a:prstGeom>
-          <a:solidFill>
-            <a:srgbClr val="4AAF55"/>
-          </a:solidFill>
-        </p:spPr>
-        <p:txBody>
-          <a:bodyPr vert="horz" lIns="91440" tIns="45720" rIns="91440" bIns="45720" rtlCol="0" anchor="b">
-            <a:normAutofit/>
-          </a:bodyPr>
-          <a:lstStyle>
-            <a:lvl1pPr>
-              <a:defRPr lang="en-US" b="1" dirty="0">
-                <a:solidFill>
-                  <a:schemeClr val="bg1"/>
-                </a:solidFill>
-              </a:defRPr>
-            </a:lvl1pPr>
-          </a:lstStyle>
-          <a:p>
-            <a:pPr marL="0" lvl="0" indent="0">
-              <a:buNone/>
-            </a:pPr>
-            <a:r>
-              <a:rPr lang="en-US"/>
-              <a:t>Click to edit Master text styles</a:t>
-            </a:r>
-          </a:p>
-        </p:txBody>
-      </p:sp>
-      <p:sp>
-        <p:nvSpPr>
-          <p:cNvPr id="6" name="Content Placeholder 5">
-            <a:extLst>
-              <a:ext uri="{FF2B5EF4-FFF2-40B4-BE49-F238E27FC236}">
-                <a16:creationId xmlns:a16="http://schemas.microsoft.com/office/drawing/2014/main" id="{4D14FAB4-C3D5-5802-AC62-3F1B0FEE0444}"/>
-              </a:ext>
-            </a:extLst>
-          </p:cNvPr>
-          <p:cNvSpPr>
-            <a:spLocks noGrp="1"/>
-          </p:cNvSpPr>
-          <p:nvPr>
-            <p:ph sz="quarter" idx="4"/>
-          </p:nvPr>
-        </p:nvSpPr>
-        <p:spPr>
-          <a:xfrm>
-            <a:off x="6172199" y="1809946"/>
-            <a:ext cx="5673525" cy="4619134"/>
-          </a:xfrm>
-          <a:prstGeom prst="rect">
-            <a:avLst/>
-          </a:prstGeom>
-        </p:spPr>
-        <p:txBody>
-          <a:bodyPr/>
-          <a:lstStyle/>
-          <a:p>
-            <a:pPr lvl="0"/>
-            <a:r>
-              <a:rPr lang="en-US"/>
-              <a:t>Click to edit Master text styles</a:t>
-            </a:r>
-          </a:p>
-          <a:p>
-            <a:pPr lvl="1"/>
-            <a:r>
-              <a:rPr lang="en-US"/>
-              <a:t>Second level</a:t>
-            </a:r>
-          </a:p>
-          <a:p>
-            <a:pPr lvl="2"/>
-            <a:r>
-              <a:rPr lang="en-US"/>
-              <a:t>Third level</a:t>
-            </a:r>
-          </a:p>
-          <a:p>
-            <a:pPr lvl="3"/>
-            <a:r>
-              <a:rPr lang="en-US"/>
-              <a:t>Fourth level</a:t>
-            </a:r>
-          </a:p>
-          <a:p>
-            <a:pPr lvl="4"/>
-            <a:r>
-              <a:rPr lang="en-US"/>
-              <a:t>Fifth level</a:t>
-            </a:r>
-            <a:endParaRPr lang="en-GB"/>
-          </a:p>
-        </p:txBody>
-      </p:sp>
-      <p:sp>
-        <p:nvSpPr>
-          <p:cNvPr id="11" name="Rectangle 10">
-            <a:extLst>
-              <a:ext uri="{FF2B5EF4-FFF2-40B4-BE49-F238E27FC236}">
-                <a16:creationId xmlns:a16="http://schemas.microsoft.com/office/drawing/2014/main" id="{EBB802B9-F88A-543F-655F-6F4D0B19FEA3}"/>
-              </a:ext>
-            </a:extLst>
-          </p:cNvPr>
-          <p:cNvSpPr/>
-          <p:nvPr/>
-        </p:nvSpPr>
-        <p:spPr>
-          <a:xfrm>
-            <a:off x="0" y="101176"/>
-            <a:ext cx="12191999" cy="827008"/>
-          </a:xfrm>
-          <a:prstGeom prst="rect">
-            <a:avLst/>
-          </a:prstGeom>
-          <a:solidFill>
-            <a:srgbClr val="245391"/>
-          </a:solidFill>
-          <a:ln>
-            <a:noFill/>
-          </a:ln>
-        </p:spPr>
-        <p:style>
-          <a:lnRef idx="2">
-            <a:schemeClr val="accent1">
-              <a:shade val="50000"/>
-            </a:schemeClr>
-          </a:lnRef>
-          <a:fillRef idx="1">
-            <a:schemeClr val="accent1"/>
-          </a:fillRef>
-          <a:effectRef idx="0">
-            <a:schemeClr val="accent1"/>
-          </a:effectRef>
-          <a:fontRef idx="minor">
-            <a:schemeClr val="lt1"/>
-          </a:fontRef>
-        </p:style>
-        <p:txBody>
-          <a:bodyPr rtlCol="0" anchor="ctr"/>
-          <a:lstStyle/>
-          <a:p>
-            <a:pPr algn="ctr"/>
-            <a:endParaRPr lang="en-GB"/>
-          </a:p>
-        </p:txBody>
-      </p:sp>
-      <p:sp>
-        <p:nvSpPr>
-          <p:cNvPr id="12" name="Title 1">
-            <a:extLst>
-              <a:ext uri="{FF2B5EF4-FFF2-40B4-BE49-F238E27FC236}">
-                <a16:creationId xmlns:a16="http://schemas.microsoft.com/office/drawing/2014/main" id="{661E29F3-04F3-2EEC-DB5E-CE1144A482CA}"/>
-              </a:ext>
-            </a:extLst>
-          </p:cNvPr>
-          <p:cNvSpPr>
-            <a:spLocks noGrp="1"/>
-          </p:cNvSpPr>
-          <p:nvPr>
-            <p:ph type="title"/>
-          </p:nvPr>
-        </p:nvSpPr>
-        <p:spPr>
-          <a:xfrm>
-            <a:off x="326590" y="101175"/>
-            <a:ext cx="10881880" cy="827009"/>
-          </a:xfrm>
-          <a:prstGeom prst="rect">
-            <a:avLst/>
-          </a:prstGeom>
-          <a:solidFill>
-            <a:srgbClr val="245391"/>
-          </a:solidFill>
-        </p:spPr>
-        <p:txBody>
-          <a:bodyPr>
-            <a:normAutofit/>
-          </a:bodyPr>
-          <a:lstStyle>
-            <a:lvl1pPr marL="0" indent="0">
-              <a:defRPr sz="3200" b="1">
-                <a:solidFill>
-                  <a:schemeClr val="bg1"/>
-                </a:solidFill>
-              </a:defRPr>
-            </a:lvl1pPr>
-          </a:lstStyle>
-          <a:p>
-            <a:r>
-              <a:rPr lang="en-US"/>
-              <a:t>Click to edit Master title style</a:t>
-            </a:r>
-            <a:endParaRPr lang="en-GB" dirty="0"/>
-          </a:p>
-        </p:txBody>
-      </p:sp>
-      <p:sp>
-        <p:nvSpPr>
-          <p:cNvPr id="13" name="Slide Number Placeholder 5">
-            <a:extLst>
-              <a:ext uri="{FF2B5EF4-FFF2-40B4-BE49-F238E27FC236}">
-                <a16:creationId xmlns:a16="http://schemas.microsoft.com/office/drawing/2014/main" id="{B0D63A05-1B5F-F916-3C25-1C57B251A0A9}"/>
-              </a:ext>
-            </a:extLst>
-          </p:cNvPr>
-          <p:cNvSpPr>
-            <a:spLocks noGrp="1"/>
-          </p:cNvSpPr>
-          <p:nvPr>
-            <p:ph type="sldNum" sz="quarter" idx="10"/>
-          </p:nvPr>
-        </p:nvSpPr>
-        <p:spPr>
-          <a:xfrm>
-            <a:off x="11484634" y="6650966"/>
-            <a:ext cx="370936" cy="207034"/>
-          </a:xfrm>
-          <a:prstGeom prst="rect">
-            <a:avLst/>
-          </a:prstGeom>
-        </p:spPr>
-        <p:txBody>
-          <a:bodyPr/>
-          <a:lstStyle>
-            <a:lvl1pPr algn="r">
-              <a:defRPr sz="1000">
-                <a:solidFill>
-                  <a:schemeClr val="bg1"/>
-                </a:solidFill>
-              </a:defRPr>
-            </a:lvl1pPr>
-          </a:lstStyle>
-          <a:p>
-            <a:fld id="{7767393B-85A6-40C1-AB65-A74DA355DB56}" type="slidenum">
-              <a:rPr lang="en-GB" smtClean="0"/>
-              <a:pPr/>
-              <a:t>‹#›</a:t>
-            </a:fld>
-            <a:endParaRPr lang="en-GB"/>
-          </a:p>
-        </p:txBody>
-      </p:sp>
-      <p:sp>
-        <p:nvSpPr>
-          <p:cNvPr id="10" name="Parallelogram 9">
-            <a:extLst>
-              <a:ext uri="{FF2B5EF4-FFF2-40B4-BE49-F238E27FC236}">
-                <a16:creationId xmlns:a16="http://schemas.microsoft.com/office/drawing/2014/main" id="{CC5E6040-7AC2-C620-97E5-AC059CA0A8CF}"/>
-              </a:ext>
-            </a:extLst>
-          </p:cNvPr>
-          <p:cNvSpPr/>
-          <p:nvPr/>
-        </p:nvSpPr>
-        <p:spPr>
-          <a:xfrm>
-            <a:off x="11208471" y="159685"/>
-            <a:ext cx="848382" cy="709988"/>
-          </a:xfrm>
-          <a:prstGeom prst="parallelogram">
-            <a:avLst/>
-          </a:prstGeom>
-          <a:solidFill>
-            <a:srgbClr val="F4DB52"/>
-          </a:solidFill>
-          <a:ln>
-            <a:noFill/>
-          </a:ln>
-        </p:spPr>
-        <p:style>
-          <a:lnRef idx="2">
-            <a:schemeClr val="accent1">
-              <a:shade val="50000"/>
-            </a:schemeClr>
-          </a:lnRef>
-          <a:fillRef idx="1">
-            <a:schemeClr val="accent1"/>
-          </a:fillRef>
-          <a:effectRef idx="0">
-            <a:schemeClr val="accent1"/>
-          </a:effectRef>
-          <a:fontRef idx="minor">
-            <a:schemeClr val="lt1"/>
-          </a:fontRef>
-        </p:style>
-        <p:txBody>
-          <a:bodyPr rtlCol="0" anchor="ctr"/>
-          <a:lstStyle/>
-          <a:p>
-            <a:pPr algn="ctr"/>
-            <a:endParaRPr lang="en-GB"/>
-          </a:p>
-        </p:txBody>
-      </p:sp>
-      <p:pic>
-        <p:nvPicPr>
-          <p:cNvPr id="14" name="Graphic 13">
-            <a:extLst>
-              <a:ext uri="{FF2B5EF4-FFF2-40B4-BE49-F238E27FC236}">
-                <a16:creationId xmlns:a16="http://schemas.microsoft.com/office/drawing/2014/main" id="{6FD705B2-C969-2978-EE41-B6888CFF5746}"/>
-              </a:ext>
-            </a:extLst>
-          </p:cNvPr>
-          <p:cNvPicPr>
-            <a:picLocks noChangeAspect="1"/>
-          </p:cNvPicPr>
-          <p:nvPr/>
-        </p:nvPicPr>
-        <p:blipFill>
-          <a:blip r:embed="rId2">
-            <a:extLst>
-              <a:ext uri="{28A0092B-C50C-407E-A947-70E740481C1C}">
-                <a14:useLocalDpi xmlns:a14="http://schemas.microsoft.com/office/drawing/2010/main" val="0"/>
-              </a:ext>
-              <a:ext uri="{96DAC541-7B7A-43D3-8B79-37D633B846F1}">
-                <asvg:svgBlip xmlns:asvg="http://schemas.microsoft.com/office/drawing/2016/SVG/main" r:embed="rId3"/>
-              </a:ext>
-            </a:extLst>
-          </a:blip>
-          <a:stretch>
-            <a:fillRect/>
-          </a:stretch>
-        </p:blipFill>
-        <p:spPr>
-          <a:xfrm>
-            <a:off x="11419250" y="203307"/>
-            <a:ext cx="426823" cy="622742"/>
-          </a:xfrm>
-          <a:prstGeom prst="rect">
-            <a:avLst/>
-          </a:prstGeom>
-        </p:spPr>
-      </p:pic>
-    </p:spTree>
-    <p:extLst>
-      <p:ext uri="{BB962C8B-B14F-4D97-AF65-F5344CB8AC3E}">
-        <p14:creationId xmlns:p14="http://schemas.microsoft.com/office/powerpoint/2010/main" val="2045897835"/>
-      </p:ext>
-    </p:extLst>
-  </p:cSld>
-  <p:clrMapOvr>
-    <a:masterClrMapping/>
-  </p:clrMapOvr>
-</p:sldLayout>
-</file>
-
-<file path=ppt/slideLayouts/slideLayout12.xml><?xml version="1.0" encoding="utf-8"?>
-<p:sldLayout xmlns:a="http://schemas.openxmlformats.org/drawingml/2006/main" xmlns:r="http://schemas.openxmlformats.org/officeDocument/2006/relationships" xmlns:p="http://schemas.openxmlformats.org/presentationml/2006/main" preserve="1">
-  <p:cSld name="Comparison - No Colour">
-    <p:spTree>
-      <p:nvGrpSpPr>
-        <p:cNvPr id="1" name=""/>
-        <p:cNvGrpSpPr/>
-        <p:nvPr/>
-      </p:nvGrpSpPr>
-      <p:grpSpPr>
-        <a:xfrm>
-          <a:off x="0" y="0"/>
-          <a:ext cx="0" cy="0"/>
-          <a:chOff x="0" y="0"/>
-          <a:chExt cx="0" cy="0"/>
-        </a:xfrm>
-      </p:grpSpPr>
-      <p:sp>
-        <p:nvSpPr>
-          <p:cNvPr id="3" name="Text Placeholder 2">
-            <a:extLst>
-              <a:ext uri="{FF2B5EF4-FFF2-40B4-BE49-F238E27FC236}">
-                <a16:creationId xmlns:a16="http://schemas.microsoft.com/office/drawing/2014/main" id="{A7EE70C0-0004-DA5B-411C-22A2E3426F32}"/>
-              </a:ext>
-            </a:extLst>
-          </p:cNvPr>
-          <p:cNvSpPr>
-            <a:spLocks noGrp="1"/>
-          </p:cNvSpPr>
-          <p:nvPr>
-            <p:ph type="body" idx="1"/>
-          </p:nvPr>
-        </p:nvSpPr>
-        <p:spPr>
-          <a:xfrm>
-            <a:off x="326590" y="1150069"/>
-            <a:ext cx="5693210" cy="659877"/>
-          </a:xfrm>
-          <a:prstGeom prst="rect">
-            <a:avLst/>
-          </a:prstGeom>
-          <a:noFill/>
-        </p:spPr>
-        <p:txBody>
-          <a:bodyPr anchor="b"/>
-          <a:lstStyle>
-            <a:lvl1pPr marL="0" indent="0">
-              <a:buNone/>
-              <a:defRPr sz="2800" b="1">
-                <a:solidFill>
-                  <a:schemeClr val="tx1"/>
-                </a:solidFill>
-              </a:defRPr>
-            </a:lvl1pPr>
-            <a:lvl2pPr marL="457200" indent="0">
-              <a:buNone/>
-              <a:defRPr sz="2000" b="1"/>
-            </a:lvl2pPr>
-            <a:lvl3pPr marL="914400" indent="0">
-              <a:buNone/>
-              <a:defRPr sz="1800" b="1"/>
-            </a:lvl3pPr>
-            <a:lvl4pPr marL="1371600" indent="0">
-              <a:buNone/>
-              <a:defRPr sz="1600" b="1"/>
-            </a:lvl4pPr>
-            <a:lvl5pPr marL="1828800" indent="0">
-              <a:buNone/>
-              <a:defRPr sz="1600" b="1"/>
-            </a:lvl5pPr>
-            <a:lvl6pPr marL="2286000" indent="0">
-              <a:buNone/>
-              <a:defRPr sz="1600" b="1"/>
-            </a:lvl6pPr>
-            <a:lvl7pPr marL="2743200" indent="0">
-              <a:buNone/>
-              <a:defRPr sz="1600" b="1"/>
-            </a:lvl7pPr>
-            <a:lvl8pPr marL="3200400" indent="0">
-              <a:buNone/>
-              <a:defRPr sz="1600" b="1"/>
-            </a:lvl8pPr>
-            <a:lvl9pPr marL="3657600" indent="0">
-              <a:buNone/>
-              <a:defRPr sz="1600" b="1"/>
-            </a:lvl9pPr>
-          </a:lstStyle>
-          <a:p>
-            <a:pPr lvl="0"/>
-            <a:r>
-              <a:rPr lang="en-US"/>
-              <a:t>Click to edit Master text styles</a:t>
-            </a:r>
-          </a:p>
-        </p:txBody>
-      </p:sp>
-      <p:sp>
-        <p:nvSpPr>
-          <p:cNvPr id="4" name="Content Placeholder 3">
-            <a:extLst>
-              <a:ext uri="{FF2B5EF4-FFF2-40B4-BE49-F238E27FC236}">
-                <a16:creationId xmlns:a16="http://schemas.microsoft.com/office/drawing/2014/main" id="{433E7C9F-2EEC-6475-AE93-1246752B2204}"/>
-              </a:ext>
-            </a:extLst>
-          </p:cNvPr>
-          <p:cNvSpPr>
-            <a:spLocks noGrp="1"/>
-          </p:cNvSpPr>
-          <p:nvPr>
-            <p:ph sz="half" idx="2"/>
-          </p:nvPr>
-        </p:nvSpPr>
-        <p:spPr>
-          <a:xfrm>
-            <a:off x="326590" y="1809946"/>
-            <a:ext cx="5693210" cy="4619134"/>
-          </a:xfrm>
-          <a:prstGeom prst="rect">
-            <a:avLst/>
-          </a:prstGeom>
-        </p:spPr>
-        <p:txBody>
-          <a:bodyPr/>
-          <a:lstStyle/>
-          <a:p>
-            <a:pPr lvl="0"/>
-            <a:r>
-              <a:rPr lang="en-US"/>
-              <a:t>Click to edit Master text styles</a:t>
-            </a:r>
-          </a:p>
-          <a:p>
-            <a:pPr lvl="1"/>
-            <a:r>
-              <a:rPr lang="en-US"/>
-              <a:t>Second level</a:t>
-            </a:r>
-          </a:p>
-          <a:p>
-            <a:pPr lvl="2"/>
-            <a:r>
-              <a:rPr lang="en-US"/>
-              <a:t>Third level</a:t>
-            </a:r>
-          </a:p>
-          <a:p>
-            <a:pPr lvl="3"/>
-            <a:r>
-              <a:rPr lang="en-US"/>
-              <a:t>Fourth level</a:t>
-            </a:r>
-          </a:p>
-          <a:p>
-            <a:pPr lvl="4"/>
-            <a:r>
-              <a:rPr lang="en-US"/>
-              <a:t>Fifth level</a:t>
-            </a:r>
-            <a:endParaRPr lang="en-GB" dirty="0"/>
-          </a:p>
-        </p:txBody>
-      </p:sp>
-      <p:sp>
-        <p:nvSpPr>
-          <p:cNvPr id="5" name="Text Placeholder 4">
-            <a:extLst>
-              <a:ext uri="{FF2B5EF4-FFF2-40B4-BE49-F238E27FC236}">
-                <a16:creationId xmlns:a16="http://schemas.microsoft.com/office/drawing/2014/main" id="{6581B006-631F-4BB6-7AFB-4D358EC005E0}"/>
-              </a:ext>
-            </a:extLst>
-          </p:cNvPr>
-          <p:cNvSpPr>
-            <a:spLocks noGrp="1"/>
-          </p:cNvSpPr>
-          <p:nvPr>
-            <p:ph type="body" sz="quarter" idx="3"/>
-          </p:nvPr>
-        </p:nvSpPr>
-        <p:spPr>
-          <a:xfrm>
-            <a:off x="6172199" y="1150069"/>
-            <a:ext cx="5683371" cy="659877"/>
-          </a:xfrm>
-          <a:prstGeom prst="rect">
-            <a:avLst/>
-          </a:prstGeom>
-          <a:noFill/>
-        </p:spPr>
-        <p:txBody>
-          <a:bodyPr vert="horz" lIns="91440" tIns="45720" rIns="91440" bIns="45720" rtlCol="0" anchor="b">
-            <a:normAutofit/>
-          </a:bodyPr>
-          <a:lstStyle>
-            <a:lvl1pPr>
-              <a:defRPr lang="en-US" b="1" dirty="0"/>
-            </a:lvl1pPr>
-          </a:lstStyle>
-          <a:p>
-            <a:pPr marL="0" lvl="0" indent="0">
-              <a:buNone/>
-            </a:pPr>
-            <a:r>
-              <a:rPr lang="en-US"/>
-              <a:t>Click to edit Master text styles</a:t>
-            </a:r>
-          </a:p>
-        </p:txBody>
-      </p:sp>
-      <p:sp>
-        <p:nvSpPr>
-          <p:cNvPr id="6" name="Content Placeholder 5">
-            <a:extLst>
-              <a:ext uri="{FF2B5EF4-FFF2-40B4-BE49-F238E27FC236}">
-                <a16:creationId xmlns:a16="http://schemas.microsoft.com/office/drawing/2014/main" id="{4D14FAB4-C3D5-5802-AC62-3F1B0FEE0444}"/>
-              </a:ext>
-            </a:extLst>
-          </p:cNvPr>
-          <p:cNvSpPr>
-            <a:spLocks noGrp="1"/>
-          </p:cNvSpPr>
-          <p:nvPr>
-            <p:ph sz="quarter" idx="4"/>
-          </p:nvPr>
-        </p:nvSpPr>
-        <p:spPr>
-          <a:xfrm>
-            <a:off x="6172199" y="1809946"/>
-            <a:ext cx="5673525" cy="4619134"/>
-          </a:xfrm>
-          <a:prstGeom prst="rect">
-            <a:avLst/>
-          </a:prstGeom>
-        </p:spPr>
-        <p:txBody>
-          <a:bodyPr/>
-          <a:lstStyle/>
-          <a:p>
-            <a:pPr lvl="0"/>
-            <a:r>
-              <a:rPr lang="en-US"/>
-              <a:t>Click to edit Master text styles</a:t>
-            </a:r>
-          </a:p>
-          <a:p>
-            <a:pPr lvl="1"/>
-            <a:r>
-              <a:rPr lang="en-US"/>
-              <a:t>Second level</a:t>
-            </a:r>
-          </a:p>
-          <a:p>
-            <a:pPr lvl="2"/>
-            <a:r>
-              <a:rPr lang="en-US"/>
-              <a:t>Third level</a:t>
-            </a:r>
-          </a:p>
-          <a:p>
-            <a:pPr lvl="3"/>
-            <a:r>
-              <a:rPr lang="en-US"/>
-              <a:t>Fourth level</a:t>
-            </a:r>
-          </a:p>
-          <a:p>
-            <a:pPr lvl="4"/>
-            <a:r>
-              <a:rPr lang="en-US"/>
-              <a:t>Fifth level</a:t>
-            </a:r>
-            <a:endParaRPr lang="en-GB"/>
-          </a:p>
-        </p:txBody>
-      </p:sp>
-      <p:sp>
-        <p:nvSpPr>
-          <p:cNvPr id="11" name="Rectangle 10">
-            <a:extLst>
-              <a:ext uri="{FF2B5EF4-FFF2-40B4-BE49-F238E27FC236}">
-                <a16:creationId xmlns:a16="http://schemas.microsoft.com/office/drawing/2014/main" id="{EBB802B9-F88A-543F-655F-6F4D0B19FEA3}"/>
-              </a:ext>
-            </a:extLst>
-          </p:cNvPr>
-          <p:cNvSpPr/>
-          <p:nvPr/>
-        </p:nvSpPr>
-        <p:spPr>
-          <a:xfrm>
-            <a:off x="0" y="101176"/>
-            <a:ext cx="12191999" cy="827008"/>
-          </a:xfrm>
-          <a:prstGeom prst="rect">
-            <a:avLst/>
-          </a:prstGeom>
-          <a:solidFill>
-            <a:srgbClr val="245391"/>
-          </a:solidFill>
-          <a:ln>
-            <a:noFill/>
-          </a:ln>
-        </p:spPr>
-        <p:style>
-          <a:lnRef idx="2">
-            <a:schemeClr val="accent1">
-              <a:shade val="50000"/>
-            </a:schemeClr>
-          </a:lnRef>
-          <a:fillRef idx="1">
-            <a:schemeClr val="accent1"/>
-          </a:fillRef>
-          <a:effectRef idx="0">
-            <a:schemeClr val="accent1"/>
-          </a:effectRef>
-          <a:fontRef idx="minor">
-            <a:schemeClr val="lt1"/>
-          </a:fontRef>
-        </p:style>
-        <p:txBody>
-          <a:bodyPr rtlCol="0" anchor="ctr"/>
-          <a:lstStyle/>
-          <a:p>
-            <a:pPr algn="ctr"/>
-            <a:endParaRPr lang="en-GB"/>
-          </a:p>
-        </p:txBody>
-      </p:sp>
-      <p:sp>
-        <p:nvSpPr>
-          <p:cNvPr id="12" name="Title 1">
-            <a:extLst>
-              <a:ext uri="{FF2B5EF4-FFF2-40B4-BE49-F238E27FC236}">
-                <a16:creationId xmlns:a16="http://schemas.microsoft.com/office/drawing/2014/main" id="{661E29F3-04F3-2EEC-DB5E-CE1144A482CA}"/>
-              </a:ext>
-            </a:extLst>
-          </p:cNvPr>
-          <p:cNvSpPr>
-            <a:spLocks noGrp="1"/>
-          </p:cNvSpPr>
-          <p:nvPr>
-            <p:ph type="title"/>
-          </p:nvPr>
-        </p:nvSpPr>
-        <p:spPr>
-          <a:xfrm>
-            <a:off x="326590" y="101175"/>
-            <a:ext cx="10881880" cy="827009"/>
-          </a:xfrm>
-          <a:prstGeom prst="rect">
-            <a:avLst/>
-          </a:prstGeom>
-          <a:solidFill>
-            <a:srgbClr val="245391"/>
-          </a:solidFill>
-        </p:spPr>
-        <p:txBody>
-          <a:bodyPr>
-            <a:normAutofit/>
-          </a:bodyPr>
-          <a:lstStyle>
-            <a:lvl1pPr marL="0" indent="0">
-              <a:defRPr sz="3200" b="1">
-                <a:solidFill>
-                  <a:schemeClr val="bg1"/>
-                </a:solidFill>
-              </a:defRPr>
-            </a:lvl1pPr>
-          </a:lstStyle>
-          <a:p>
-            <a:r>
-              <a:rPr lang="en-US"/>
-              <a:t>Click to edit Master title style</a:t>
-            </a:r>
-            <a:endParaRPr lang="en-GB" dirty="0"/>
-          </a:p>
-        </p:txBody>
-      </p:sp>
-      <p:sp>
-        <p:nvSpPr>
-          <p:cNvPr id="13" name="Slide Number Placeholder 5">
-            <a:extLst>
-              <a:ext uri="{FF2B5EF4-FFF2-40B4-BE49-F238E27FC236}">
-                <a16:creationId xmlns:a16="http://schemas.microsoft.com/office/drawing/2014/main" id="{B0D63A05-1B5F-F916-3C25-1C57B251A0A9}"/>
-              </a:ext>
-            </a:extLst>
-          </p:cNvPr>
-          <p:cNvSpPr>
-            <a:spLocks noGrp="1"/>
-          </p:cNvSpPr>
-          <p:nvPr>
-            <p:ph type="sldNum" sz="quarter" idx="10"/>
-          </p:nvPr>
-        </p:nvSpPr>
-        <p:spPr>
-          <a:xfrm>
-            <a:off x="11484634" y="6650966"/>
-            <a:ext cx="370936" cy="207034"/>
-          </a:xfrm>
-          <a:prstGeom prst="rect">
-            <a:avLst/>
-          </a:prstGeom>
-        </p:spPr>
-        <p:txBody>
-          <a:bodyPr/>
-          <a:lstStyle>
-            <a:lvl1pPr algn="r">
-              <a:defRPr sz="1000">
-                <a:solidFill>
-                  <a:schemeClr val="bg1"/>
-                </a:solidFill>
-              </a:defRPr>
-            </a:lvl1pPr>
-          </a:lstStyle>
-          <a:p>
-            <a:fld id="{7767393B-85A6-40C1-AB65-A74DA355DB56}" type="slidenum">
-              <a:rPr lang="en-GB" smtClean="0"/>
-              <a:pPr/>
-              <a:t>‹#›</a:t>
-            </a:fld>
-            <a:endParaRPr lang="en-GB"/>
-          </a:p>
-        </p:txBody>
-      </p:sp>
-      <p:sp>
-        <p:nvSpPr>
-          <p:cNvPr id="10" name="Parallelogram 9">
-            <a:extLst>
-              <a:ext uri="{FF2B5EF4-FFF2-40B4-BE49-F238E27FC236}">
-                <a16:creationId xmlns:a16="http://schemas.microsoft.com/office/drawing/2014/main" id="{F0247E3A-CE97-5F64-EC7B-5C5C7E7BD2EB}"/>
-              </a:ext>
-            </a:extLst>
-          </p:cNvPr>
-          <p:cNvSpPr/>
-          <p:nvPr/>
-        </p:nvSpPr>
-        <p:spPr>
-          <a:xfrm>
-            <a:off x="11208471" y="159685"/>
-            <a:ext cx="848382" cy="709988"/>
-          </a:xfrm>
-          <a:prstGeom prst="parallelogram">
-            <a:avLst/>
-          </a:prstGeom>
-          <a:solidFill>
-            <a:srgbClr val="F4DB52"/>
-          </a:solidFill>
-          <a:ln>
-            <a:noFill/>
-          </a:ln>
-        </p:spPr>
-        <p:style>
-          <a:lnRef idx="2">
-            <a:schemeClr val="accent1">
-              <a:shade val="50000"/>
-            </a:schemeClr>
-          </a:lnRef>
-          <a:fillRef idx="1">
-            <a:schemeClr val="accent1"/>
-          </a:fillRef>
-          <a:effectRef idx="0">
-            <a:schemeClr val="accent1"/>
-          </a:effectRef>
-          <a:fontRef idx="minor">
-            <a:schemeClr val="lt1"/>
-          </a:fontRef>
-        </p:style>
-        <p:txBody>
-          <a:bodyPr rtlCol="0" anchor="ctr"/>
-          <a:lstStyle/>
-          <a:p>
-            <a:pPr algn="ctr"/>
-            <a:endParaRPr lang="en-GB"/>
-          </a:p>
-        </p:txBody>
-      </p:sp>
-      <p:pic>
-        <p:nvPicPr>
-          <p:cNvPr id="14" name="Graphic 13">
-            <a:extLst>
-              <a:ext uri="{FF2B5EF4-FFF2-40B4-BE49-F238E27FC236}">
-                <a16:creationId xmlns:a16="http://schemas.microsoft.com/office/drawing/2014/main" id="{0A366DF0-2186-87DD-821E-5CCCB1B3E988}"/>
-              </a:ext>
-            </a:extLst>
-          </p:cNvPr>
-          <p:cNvPicPr>
-            <a:picLocks noChangeAspect="1"/>
-          </p:cNvPicPr>
-          <p:nvPr/>
-        </p:nvPicPr>
-        <p:blipFill>
-          <a:blip r:embed="rId2">
-            <a:extLst>
-              <a:ext uri="{28A0092B-C50C-407E-A947-70E740481C1C}">
-                <a14:useLocalDpi xmlns:a14="http://schemas.microsoft.com/office/drawing/2010/main" val="0"/>
-              </a:ext>
-              <a:ext uri="{96DAC541-7B7A-43D3-8B79-37D633B846F1}">
-                <asvg:svgBlip xmlns:asvg="http://schemas.microsoft.com/office/drawing/2016/SVG/main" r:embed="rId3"/>
-              </a:ext>
-            </a:extLst>
-          </a:blip>
-          <a:stretch>
-            <a:fillRect/>
-          </a:stretch>
-        </p:blipFill>
-        <p:spPr>
-          <a:xfrm>
-            <a:off x="11419250" y="203307"/>
-            <a:ext cx="426823" cy="622742"/>
-          </a:xfrm>
-          <a:prstGeom prst="rect">
-            <a:avLst/>
-          </a:prstGeom>
-        </p:spPr>
-      </p:pic>
-    </p:spTree>
-    <p:extLst>
-      <p:ext uri="{BB962C8B-B14F-4D97-AF65-F5344CB8AC3E}">
-        <p14:creationId xmlns:p14="http://schemas.microsoft.com/office/powerpoint/2010/main" val="1632882156"/>
-      </p:ext>
-    </p:extLst>
-  </p:cSld>
-  <p:clrMapOvr>
-    <a:masterClrMapping/>
-  </p:clrMapOvr>
-</p:sldLayout>
-</file>
-
-<file path=ppt/slideLayouts/slideLayout13.xml><?xml version="1.0" encoding="utf-8"?>
-<p:sldLayout xmlns:a="http://schemas.openxmlformats.org/drawingml/2006/main" xmlns:r="http://schemas.openxmlformats.org/officeDocument/2006/relationships" xmlns:p="http://schemas.openxmlformats.org/presentationml/2006/main" preserve="1">
-  <p:cSld name="Title Only">
-    <p:spTree>
-      <p:nvGrpSpPr>
-        <p:cNvPr id="1" name=""/>
-        <p:cNvGrpSpPr/>
-        <p:nvPr/>
-      </p:nvGrpSpPr>
-      <p:grpSpPr>
-        <a:xfrm>
-          <a:off x="0" y="0"/>
-          <a:ext cx="0" cy="0"/>
-          <a:chOff x="0" y="0"/>
-          <a:chExt cx="0" cy="0"/>
-        </a:xfrm>
-      </p:grpSpPr>
-      <p:sp>
-        <p:nvSpPr>
-          <p:cNvPr id="7" name="Rectangle 6">
-            <a:extLst>
-              <a:ext uri="{FF2B5EF4-FFF2-40B4-BE49-F238E27FC236}">
-                <a16:creationId xmlns:a16="http://schemas.microsoft.com/office/drawing/2014/main" id="{D7F0D94F-0C93-4252-B6F2-450FFCA7F2AB}"/>
-              </a:ext>
-            </a:extLst>
-          </p:cNvPr>
-          <p:cNvSpPr/>
-          <p:nvPr/>
-        </p:nvSpPr>
-        <p:spPr>
-          <a:xfrm>
-            <a:off x="0" y="101176"/>
-            <a:ext cx="12191999" cy="827008"/>
-          </a:xfrm>
-          <a:prstGeom prst="rect">
-            <a:avLst/>
-          </a:prstGeom>
-          <a:solidFill>
-            <a:srgbClr val="245391"/>
-          </a:solidFill>
-          <a:ln>
-            <a:noFill/>
-          </a:ln>
-        </p:spPr>
-        <p:style>
-          <a:lnRef idx="2">
-            <a:schemeClr val="accent1">
-              <a:shade val="50000"/>
-            </a:schemeClr>
-          </a:lnRef>
-          <a:fillRef idx="1">
-            <a:schemeClr val="accent1"/>
-          </a:fillRef>
-          <a:effectRef idx="0">
-            <a:schemeClr val="accent1"/>
-          </a:effectRef>
-          <a:fontRef idx="minor">
-            <a:schemeClr val="lt1"/>
-          </a:fontRef>
-        </p:style>
-        <p:txBody>
-          <a:bodyPr rtlCol="0" anchor="ctr"/>
-          <a:lstStyle/>
-          <a:p>
-            <a:pPr algn="ctr"/>
-            <a:endParaRPr lang="en-GB"/>
-          </a:p>
-        </p:txBody>
-      </p:sp>
-      <p:sp>
-        <p:nvSpPr>
-          <p:cNvPr id="8" name="Title 1">
-            <a:extLst>
-              <a:ext uri="{FF2B5EF4-FFF2-40B4-BE49-F238E27FC236}">
-                <a16:creationId xmlns:a16="http://schemas.microsoft.com/office/drawing/2014/main" id="{6894B5F9-3C75-6DB4-A85D-1EED77E88629}"/>
-              </a:ext>
-            </a:extLst>
-          </p:cNvPr>
-          <p:cNvSpPr>
-            <a:spLocks noGrp="1"/>
-          </p:cNvSpPr>
-          <p:nvPr>
-            <p:ph type="title"/>
-          </p:nvPr>
-        </p:nvSpPr>
-        <p:spPr>
-          <a:xfrm>
-            <a:off x="326590" y="101175"/>
-            <a:ext cx="10881880" cy="827009"/>
-          </a:xfrm>
-          <a:prstGeom prst="rect">
-            <a:avLst/>
-          </a:prstGeom>
-          <a:solidFill>
-            <a:srgbClr val="245391"/>
-          </a:solidFill>
-        </p:spPr>
-        <p:txBody>
-          <a:bodyPr>
-            <a:normAutofit/>
-          </a:bodyPr>
-          <a:lstStyle>
-            <a:lvl1pPr marL="0" indent="0">
-              <a:defRPr sz="3200" b="1">
-                <a:solidFill>
-                  <a:schemeClr val="bg1"/>
-                </a:solidFill>
-              </a:defRPr>
-            </a:lvl1pPr>
-          </a:lstStyle>
-          <a:p>
-            <a:r>
-              <a:rPr lang="en-US"/>
-              <a:t>Click to edit Master title style</a:t>
-            </a:r>
-            <a:endParaRPr lang="en-GB" dirty="0"/>
-          </a:p>
-        </p:txBody>
-      </p:sp>
-      <p:sp>
-        <p:nvSpPr>
-          <p:cNvPr id="9" name="Slide Number Placeholder 5">
-            <a:extLst>
-              <a:ext uri="{FF2B5EF4-FFF2-40B4-BE49-F238E27FC236}">
-                <a16:creationId xmlns:a16="http://schemas.microsoft.com/office/drawing/2014/main" id="{D40D9E9B-695B-7E25-3359-992FB8379BE0}"/>
-              </a:ext>
-            </a:extLst>
-          </p:cNvPr>
-          <p:cNvSpPr>
-            <a:spLocks noGrp="1"/>
-          </p:cNvSpPr>
-          <p:nvPr>
-            <p:ph type="sldNum" sz="quarter" idx="4"/>
-          </p:nvPr>
-        </p:nvSpPr>
-        <p:spPr>
-          <a:xfrm>
-            <a:off x="11484634" y="6650966"/>
-            <a:ext cx="370936" cy="207034"/>
-          </a:xfrm>
-          <a:prstGeom prst="rect">
-            <a:avLst/>
-          </a:prstGeom>
-        </p:spPr>
-        <p:txBody>
-          <a:bodyPr/>
-          <a:lstStyle>
-            <a:lvl1pPr algn="r">
-              <a:defRPr sz="1000">
-                <a:solidFill>
-                  <a:schemeClr val="bg1"/>
-                </a:solidFill>
-              </a:defRPr>
-            </a:lvl1pPr>
-          </a:lstStyle>
-          <a:p>
-            <a:fld id="{7767393B-85A6-40C1-AB65-A74DA355DB56}" type="slidenum">
-              <a:rPr lang="en-GB" smtClean="0"/>
-              <a:t>‹#›</a:t>
-            </a:fld>
-            <a:endParaRPr lang="en-GB"/>
-          </a:p>
-        </p:txBody>
-      </p:sp>
-      <p:sp>
-        <p:nvSpPr>
-          <p:cNvPr id="6" name="Parallelogram 5">
-            <a:extLst>
-              <a:ext uri="{FF2B5EF4-FFF2-40B4-BE49-F238E27FC236}">
-                <a16:creationId xmlns:a16="http://schemas.microsoft.com/office/drawing/2014/main" id="{4BC7397A-21FA-CFBE-6A60-B3893E122BA9}"/>
-              </a:ext>
-            </a:extLst>
-          </p:cNvPr>
-          <p:cNvSpPr/>
-          <p:nvPr/>
-        </p:nvSpPr>
-        <p:spPr>
-          <a:xfrm>
-            <a:off x="11208471" y="159685"/>
-            <a:ext cx="848382" cy="709988"/>
-          </a:xfrm>
-          <a:prstGeom prst="parallelogram">
-            <a:avLst/>
-          </a:prstGeom>
-          <a:solidFill>
-            <a:srgbClr val="F4DB52"/>
-          </a:solidFill>
-          <a:ln>
-            <a:noFill/>
-          </a:ln>
-        </p:spPr>
-        <p:style>
-          <a:lnRef idx="2">
-            <a:schemeClr val="accent1">
-              <a:shade val="50000"/>
-            </a:schemeClr>
-          </a:lnRef>
-          <a:fillRef idx="1">
-            <a:schemeClr val="accent1"/>
-          </a:fillRef>
-          <a:effectRef idx="0">
-            <a:schemeClr val="accent1"/>
-          </a:effectRef>
-          <a:fontRef idx="minor">
-            <a:schemeClr val="lt1"/>
-          </a:fontRef>
-        </p:style>
-        <p:txBody>
-          <a:bodyPr rtlCol="0" anchor="ctr"/>
-          <a:lstStyle/>
-          <a:p>
-            <a:pPr algn="ctr"/>
-            <a:endParaRPr lang="en-GB"/>
-          </a:p>
-        </p:txBody>
-      </p:sp>
-      <p:pic>
-        <p:nvPicPr>
-          <p:cNvPr id="10" name="Graphic 9">
-            <a:extLst>
-              <a:ext uri="{FF2B5EF4-FFF2-40B4-BE49-F238E27FC236}">
-                <a16:creationId xmlns:a16="http://schemas.microsoft.com/office/drawing/2014/main" id="{3D21CF32-8450-D230-EB83-65B126BC169E}"/>
-              </a:ext>
-            </a:extLst>
-          </p:cNvPr>
-          <p:cNvPicPr>
-            <a:picLocks noChangeAspect="1"/>
-          </p:cNvPicPr>
-          <p:nvPr/>
-        </p:nvPicPr>
-        <p:blipFill>
-          <a:blip r:embed="rId2">
-            <a:extLst>
-              <a:ext uri="{28A0092B-C50C-407E-A947-70E740481C1C}">
-                <a14:useLocalDpi xmlns:a14="http://schemas.microsoft.com/office/drawing/2010/main" val="0"/>
-              </a:ext>
-              <a:ext uri="{96DAC541-7B7A-43D3-8B79-37D633B846F1}">
-                <asvg:svgBlip xmlns:asvg="http://schemas.microsoft.com/office/drawing/2016/SVG/main" r:embed="rId3"/>
-              </a:ext>
-            </a:extLst>
-          </a:blip>
-          <a:stretch>
-            <a:fillRect/>
-          </a:stretch>
-        </p:blipFill>
-        <p:spPr>
-          <a:xfrm>
-            <a:off x="11419250" y="203307"/>
-            <a:ext cx="426823" cy="622742"/>
-          </a:xfrm>
-          <a:prstGeom prst="rect">
-            <a:avLst/>
-          </a:prstGeom>
-        </p:spPr>
-      </p:pic>
-    </p:spTree>
-    <p:extLst>
-      <p:ext uri="{BB962C8B-B14F-4D97-AF65-F5344CB8AC3E}">
-        <p14:creationId xmlns:p14="http://schemas.microsoft.com/office/powerpoint/2010/main" val="315990423"/>
-      </p:ext>
-    </p:extLst>
-  </p:cSld>
-  <p:clrMapOvr>
-    <a:masterClrMapping/>
-  </p:clrMapOvr>
-</p:sldLayout>
-</file>
-
-<file path=ppt/slideLayouts/slideLayout14.xml><?xml version="1.0" encoding="utf-8"?>
-<p:sldLayout xmlns:a="http://schemas.openxmlformats.org/drawingml/2006/main" xmlns:r="http://schemas.openxmlformats.org/officeDocument/2006/relationships" xmlns:p="http://schemas.openxmlformats.org/presentationml/2006/main" type="blank" preserve="1">
-  <p:cSld name="Blank">
-    <p:spTree>
-      <p:nvGrpSpPr>
-        <p:cNvPr id="1" name=""/>
-        <p:cNvGrpSpPr/>
-        <p:nvPr/>
-      </p:nvGrpSpPr>
-      <p:grpSpPr>
-        <a:xfrm>
-          <a:off x="0" y="0"/>
-          <a:ext cx="0" cy="0"/>
-          <a:chOff x="0" y="0"/>
-          <a:chExt cx="0" cy="0"/>
-        </a:xfrm>
-      </p:grpSpPr>
-      <p:sp>
-        <p:nvSpPr>
-          <p:cNvPr id="6" name="Slide Number Placeholder 5">
-            <a:extLst>
-              <a:ext uri="{FF2B5EF4-FFF2-40B4-BE49-F238E27FC236}">
-                <a16:creationId xmlns:a16="http://schemas.microsoft.com/office/drawing/2014/main" id="{D69C960F-029C-289D-38D6-CF5F60CDEE1C}"/>
-              </a:ext>
-            </a:extLst>
-          </p:cNvPr>
-          <p:cNvSpPr>
-            <a:spLocks noGrp="1"/>
-          </p:cNvSpPr>
-          <p:nvPr>
-            <p:ph type="sldNum" sz="quarter" idx="4"/>
-          </p:nvPr>
-        </p:nvSpPr>
-        <p:spPr>
-          <a:xfrm>
-            <a:off x="11484634" y="6650966"/>
-            <a:ext cx="370936" cy="207034"/>
-          </a:xfrm>
-          <a:prstGeom prst="rect">
-            <a:avLst/>
-          </a:prstGeom>
-        </p:spPr>
-        <p:txBody>
-          <a:bodyPr/>
-          <a:lstStyle>
-            <a:lvl1pPr algn="r">
-              <a:defRPr sz="1000">
-                <a:solidFill>
-                  <a:schemeClr val="bg1"/>
-                </a:solidFill>
-              </a:defRPr>
-            </a:lvl1pPr>
-          </a:lstStyle>
-          <a:p>
-            <a:fld id="{7767393B-85A6-40C1-AB65-A74DA355DB56}" type="slidenum">
-              <a:rPr lang="en-GB" smtClean="0"/>
-              <a:t>‹#›</a:t>
-            </a:fld>
-            <a:endParaRPr lang="en-GB"/>
-          </a:p>
-        </p:txBody>
-      </p:sp>
-      <p:sp>
-        <p:nvSpPr>
-          <p:cNvPr id="4" name="Parallelogram 3">
-            <a:extLst>
-              <a:ext uri="{FF2B5EF4-FFF2-40B4-BE49-F238E27FC236}">
-                <a16:creationId xmlns:a16="http://schemas.microsoft.com/office/drawing/2014/main" id="{1AE01DBA-F45B-E26C-6B7B-5DDD82F4AC45}"/>
-              </a:ext>
-            </a:extLst>
-          </p:cNvPr>
-          <p:cNvSpPr/>
-          <p:nvPr/>
-        </p:nvSpPr>
-        <p:spPr>
-          <a:xfrm>
-            <a:off x="11208471" y="159685"/>
-            <a:ext cx="848382" cy="709988"/>
-          </a:xfrm>
-          <a:prstGeom prst="parallelogram">
-            <a:avLst/>
-          </a:prstGeom>
-          <a:solidFill>
-            <a:srgbClr val="F4DB52"/>
-          </a:solidFill>
-          <a:ln>
-            <a:noFill/>
-          </a:ln>
-        </p:spPr>
-        <p:style>
-          <a:lnRef idx="2">
-            <a:schemeClr val="accent1">
-              <a:shade val="50000"/>
-            </a:schemeClr>
-          </a:lnRef>
-          <a:fillRef idx="1">
-            <a:schemeClr val="accent1"/>
-          </a:fillRef>
-          <a:effectRef idx="0">
-            <a:schemeClr val="accent1"/>
-          </a:effectRef>
-          <a:fontRef idx="minor">
-            <a:schemeClr val="lt1"/>
-          </a:fontRef>
-        </p:style>
-        <p:txBody>
-          <a:bodyPr rtlCol="0" anchor="ctr"/>
-          <a:lstStyle/>
-          <a:p>
-            <a:pPr algn="ctr"/>
-            <a:endParaRPr lang="en-GB"/>
-          </a:p>
-        </p:txBody>
-      </p:sp>
       <p:pic>
         <p:nvPicPr>
           <p:cNvPr id="5" name="Graphic 4">
@@ -2614,7 +752,7 @@
 </p:sldLayout>
 </file>
 
-<file path=ppt/slideLayouts/slideLayout15.xml><?xml version="1.0" encoding="utf-8"?>
+<file path=ppt/slideLayouts/slideLayout11.xml><?xml version="1.0" encoding="utf-8"?>
 <p:sldLayout xmlns:a="http://schemas.openxmlformats.org/drawingml/2006/main" xmlns:r="http://schemas.openxmlformats.org/officeDocument/2006/relationships" xmlns:p="http://schemas.openxmlformats.org/presentationml/2006/main" preserve="1">
   <p:cSld name="Content with Caption">
     <p:spTree>
@@ -3063,7 +1201,7 @@
 </p:sldLayout>
 </file>
 
-<file path=ppt/slideLayouts/slideLayout16.xml><?xml version="1.0" encoding="utf-8"?>
+<file path=ppt/slideLayouts/slideLayout12.xml><?xml version="1.0" encoding="utf-8"?>
 <p:sldLayout xmlns:a="http://schemas.openxmlformats.org/drawingml/2006/main" xmlns:r="http://schemas.openxmlformats.org/officeDocument/2006/relationships" xmlns:p="http://schemas.openxmlformats.org/presentationml/2006/main" preserve="1">
   <p:cSld name="Picture with Caption">
     <p:spTree>
@@ -4040,7 +2178,7 @@
         <p:spPr>
           <a:xfrm>
             <a:off x="0" y="101176"/>
-            <a:ext cx="12191999" cy="827008"/>
+            <a:ext cx="12191999" cy="626793"/>
           </a:xfrm>
           <a:prstGeom prst="rect">
             <a:avLst/>
@@ -4096,7 +2234,7 @@
         <p:spPr>
           <a:xfrm>
             <a:off x="177800" y="101175"/>
-            <a:ext cx="11836400" cy="827009"/>
+            <a:ext cx="11836400" cy="626793"/>
           </a:xfrm>
           <a:prstGeom prst="rect">
             <a:avLst/>
@@ -4120,7 +2258,7 @@
           </a:lstStyle>
           <a:p>
             <a:r>
-              <a:rPr lang="en-US"/>
+              <a:rPr lang="en-US" dirty="0"/>
               <a:t>Click to edit Master title style</a:t>
             </a:r>
             <a:endParaRPr lang="en-GB" dirty="0"/>
@@ -4145,8 +2283,8 @@
         </p:nvSpPr>
         <p:spPr>
           <a:xfrm>
-            <a:off x="177800" y="1036320"/>
-            <a:ext cx="11836400" cy="5392760"/>
+            <a:off x="177800" y="807868"/>
+            <a:ext cx="11836400" cy="5621212"/>
           </a:xfrm>
           <a:prstGeom prst="rect">
             <a:avLst/>
@@ -4268,7 +2406,7 @@
 </file>
 
 <file path=ppt/slideLayouts/slideLayout5.xml><?xml version="1.0" encoding="utf-8"?>
-<p:sldLayout xmlns:a="http://schemas.openxmlformats.org/drawingml/2006/main" xmlns:r="http://schemas.openxmlformats.org/officeDocument/2006/relationships" xmlns:p="http://schemas.openxmlformats.org/presentationml/2006/main" preserve="1">
+<p:sldLayout xmlns:a="http://schemas.openxmlformats.org/drawingml/2006/main" xmlns:r="http://schemas.openxmlformats.org/officeDocument/2006/relationships" xmlns:p="http://schemas.openxmlformats.org/presentationml/2006/main" preserve="1" userDrawn="1">
   <p:cSld name="Two Content - No Colour">
     <p:spTree>
       <p:nvGrpSpPr>
@@ -4302,8 +2440,8 @@
         </p:nvSpPr>
         <p:spPr>
           <a:xfrm>
-            <a:off x="326590" y="1150070"/>
-            <a:ext cx="5693210" cy="5279010"/>
+            <a:off x="177800" y="861134"/>
+            <a:ext cx="5842000" cy="5567946"/>
           </a:xfrm>
           <a:prstGeom prst="rect">
             <a:avLst/>
@@ -4368,8 +2506,8 @@
         </p:nvSpPr>
         <p:spPr>
           <a:xfrm>
-            <a:off x="6172202" y="1150070"/>
-            <a:ext cx="5683368" cy="5279010"/>
+            <a:off x="6172202" y="861134"/>
+            <a:ext cx="5841998" cy="5567946"/>
           </a:xfrm>
           <a:prstGeom prst="rect">
             <a:avLst/>
@@ -4418,20 +2556,66 @@
       </p:sp>
       <p:sp>
         <p:nvSpPr>
-          <p:cNvPr id="9" name="Rectangle 8">
-            <a:extLst>
-              <a:ext uri="{FF2B5EF4-FFF2-40B4-BE49-F238E27FC236}">
-                <a16:creationId xmlns:a16="http://schemas.microsoft.com/office/drawing/2014/main" id="{43E97568-94FD-F797-00D0-A204C8758D41}"/>
+          <p:cNvPr id="12" name="Slide Number Placeholder 5">
+            <a:extLst>
+              <a:ext uri="{FF2B5EF4-FFF2-40B4-BE49-F238E27FC236}">
+                <a16:creationId xmlns:a16="http://schemas.microsoft.com/office/drawing/2014/main" id="{26D26384-FFA6-46A5-CD52-9800186C7F07}"/>
+              </a:ext>
+            </a:extLst>
+          </p:cNvPr>
+          <p:cNvSpPr>
+            <a:spLocks noGrp="1"/>
+          </p:cNvSpPr>
+          <p:nvPr>
+            <p:ph type="sldNum" sz="quarter" idx="4"/>
+          </p:nvPr>
+        </p:nvSpPr>
+        <p:spPr>
+          <a:xfrm>
+            <a:off x="11484634" y="6650966"/>
+            <a:ext cx="370936" cy="207034"/>
+          </a:xfrm>
+          <a:prstGeom prst="rect">
+            <a:avLst/>
+          </a:prstGeom>
+        </p:spPr>
+        <p:txBody>
+          <a:bodyPr/>
+          <a:lstStyle>
+            <a:lvl1pPr algn="r">
+              <a:defRPr sz="1000">
+                <a:solidFill>
+                  <a:schemeClr val="bg1"/>
+                </a:solidFill>
+              </a:defRPr>
+            </a:lvl1pPr>
+          </a:lstStyle>
+          <a:p>
+            <a:fld id="{7767393B-85A6-40C1-AB65-A74DA355DB56}" type="slidenum">
+              <a:rPr lang="en-GB" smtClean="0"/>
+              <a:pPr/>
+              <a:t>‹#›</a:t>
+            </a:fld>
+            <a:endParaRPr lang="en-GB"/>
+          </a:p>
+        </p:txBody>
+      </p:sp>
+      <p:sp>
+        <p:nvSpPr>
+          <p:cNvPr id="2" name="Rectangle 1">
+            <a:extLst>
+              <a:ext uri="{FF2B5EF4-FFF2-40B4-BE49-F238E27FC236}">
+                <a16:creationId xmlns:a16="http://schemas.microsoft.com/office/drawing/2014/main" id="{3F0FBB52-E34C-3A2C-692A-1FE7035E6660}"/>
               </a:ext>
             </a:extLst>
           </p:cNvPr>
           <p:cNvSpPr/>
-          <p:nvPr/>
+          <p:nvPr userDrawn="1"/>
         </p:nvSpPr>
         <p:spPr>
           <a:xfrm>
             <a:off x="0" y="101176"/>
-            <a:ext cx="12191999" cy="827008"/>
+            <a:ext cx="12191999" cy="626793"/>
           </a:xfrm>
           <a:prstGeom prst="rect">
             <a:avLst/>
@@ -4470,10 +2654,10 @@
       </p:sp>
       <p:sp>
         <p:nvSpPr>
-          <p:cNvPr id="10" name="Title 1">
-            <a:extLst>
-              <a:ext uri="{FF2B5EF4-FFF2-40B4-BE49-F238E27FC236}">
-                <a16:creationId xmlns:a16="http://schemas.microsoft.com/office/drawing/2014/main" id="{D9F72F79-6B14-C5F0-EDC1-E3E0F8BCA436}"/>
+          <p:cNvPr id="5" name="Title 1">
+            <a:extLst>
+              <a:ext uri="{FF2B5EF4-FFF2-40B4-BE49-F238E27FC236}">
+                <a16:creationId xmlns:a16="http://schemas.microsoft.com/office/drawing/2014/main" id="{5E4093B2-6165-CFB3-0310-31737C373CEF}"/>
               </a:ext>
             </a:extLst>
           </p:cNvPr>
@@ -4486,8 +2670,8 @@
         </p:nvSpPr>
         <p:spPr>
           <a:xfrm>
-            <a:off x="326590" y="101175"/>
-            <a:ext cx="10881880" cy="827009"/>
+            <a:off x="177800" y="101175"/>
+            <a:ext cx="11836400" cy="626793"/>
           </a:xfrm>
           <a:prstGeom prst="rect">
             <a:avLst/>
@@ -4511,8 +2695,176 @@
           </a:lstStyle>
           <a:p>
             <a:r>
+              <a:rPr lang="en-US" dirty="0"/>
+              <a:t>Click to edit Master title style</a:t>
+            </a:r>
+            <a:endParaRPr lang="en-GB" dirty="0"/>
+          </a:p>
+        </p:txBody>
+      </p:sp>
+    </p:spTree>
+    <p:extLst>
+      <p:ext uri="{BB962C8B-B14F-4D97-AF65-F5344CB8AC3E}">
+        <p14:creationId xmlns:p14="http://schemas.microsoft.com/office/powerpoint/2010/main" val="2481587099"/>
+      </p:ext>
+    </p:extLst>
+  </p:cSld>
+  <p:clrMapOvr>
+    <a:masterClrMapping/>
+  </p:clrMapOvr>
+</p:sldLayout>
+</file>
+
+<file path=ppt/slideLayouts/slideLayout6.xml><?xml version="1.0" encoding="utf-8"?>
+<p:sldLayout xmlns:a="http://schemas.openxmlformats.org/drawingml/2006/main" xmlns:r="http://schemas.openxmlformats.org/officeDocument/2006/relationships" xmlns:p="http://schemas.openxmlformats.org/presentationml/2006/main" preserve="1" userDrawn="1">
+  <p:cSld name="Two Content - Yellow Green">
+    <p:spTree>
+      <p:nvGrpSpPr>
+        <p:cNvPr id="1" name=""/>
+        <p:cNvGrpSpPr/>
+        <p:nvPr/>
+      </p:nvGrpSpPr>
+      <p:grpSpPr>
+        <a:xfrm>
+          <a:off x="0" y="0"/>
+          <a:ext cx="0" cy="0"/>
+          <a:chOff x="0" y="0"/>
+          <a:chExt cx="0" cy="0"/>
+        </a:xfrm>
+      </p:grpSpPr>
+      <p:sp>
+        <p:nvSpPr>
+          <p:cNvPr id="3" name="Content Placeholder 2">
+            <a:extLst>
+              <a:ext uri="{FF2B5EF4-FFF2-40B4-BE49-F238E27FC236}">
+                <a16:creationId xmlns:a16="http://schemas.microsoft.com/office/drawing/2014/main" id="{FFB3E276-45A6-3182-E191-0D21CECBD5BF}"/>
+              </a:ext>
+            </a:extLst>
+          </p:cNvPr>
+          <p:cNvSpPr>
+            <a:spLocks noGrp="1"/>
+          </p:cNvSpPr>
+          <p:nvPr>
+            <p:ph sz="half" idx="1"/>
+          </p:nvPr>
+        </p:nvSpPr>
+        <p:spPr>
+          <a:xfrm>
+            <a:off x="177800" y="861134"/>
+            <a:ext cx="5842000" cy="5567946"/>
+          </a:xfrm>
+          <a:prstGeom prst="rect">
+            <a:avLst/>
+          </a:prstGeom>
+          <a:solidFill>
+            <a:srgbClr val="F8E992"/>
+          </a:solidFill>
+        </p:spPr>
+        <p:txBody>
+          <a:bodyPr/>
+          <a:lstStyle/>
+          <a:p>
+            <a:pPr lvl="0"/>
+            <a:r>
               <a:rPr lang="en-US"/>
-              <a:t>Click to edit Master title style</a:t>
+              <a:t>Click to edit Master text styles</a:t>
+            </a:r>
+          </a:p>
+          <a:p>
+            <a:pPr lvl="1"/>
+            <a:r>
+              <a:rPr lang="en-US"/>
+              <a:t>Second level</a:t>
+            </a:r>
+          </a:p>
+          <a:p>
+            <a:pPr lvl="2"/>
+            <a:r>
+              <a:rPr lang="en-US"/>
+              <a:t>Third level</a:t>
+            </a:r>
+          </a:p>
+          <a:p>
+            <a:pPr lvl="3"/>
+            <a:r>
+              <a:rPr lang="en-US"/>
+              <a:t>Fourth level</a:t>
+            </a:r>
+          </a:p>
+          <a:p>
+            <a:pPr lvl="4"/>
+            <a:r>
+              <a:rPr lang="en-US"/>
+              <a:t>Fifth level</a:t>
+            </a:r>
+            <a:endParaRPr lang="en-GB" dirty="0"/>
+          </a:p>
+        </p:txBody>
+      </p:sp>
+      <p:sp>
+        <p:nvSpPr>
+          <p:cNvPr id="4" name="Content Placeholder 3">
+            <a:extLst>
+              <a:ext uri="{FF2B5EF4-FFF2-40B4-BE49-F238E27FC236}">
+                <a16:creationId xmlns:a16="http://schemas.microsoft.com/office/drawing/2014/main" id="{24DAC9F3-A161-D5C8-4EB3-26AE99A810B4}"/>
+              </a:ext>
+            </a:extLst>
+          </p:cNvPr>
+          <p:cNvSpPr>
+            <a:spLocks noGrp="1"/>
+          </p:cNvSpPr>
+          <p:nvPr>
+            <p:ph sz="half" idx="2"/>
+          </p:nvPr>
+        </p:nvSpPr>
+        <p:spPr>
+          <a:xfrm>
+            <a:off x="6172202" y="861134"/>
+            <a:ext cx="5841998" cy="5567946"/>
+          </a:xfrm>
+          <a:prstGeom prst="rect">
+            <a:avLst/>
+          </a:prstGeom>
+          <a:solidFill>
+            <a:srgbClr val="90D098"/>
+          </a:solidFill>
+        </p:spPr>
+        <p:txBody>
+          <a:bodyPr/>
+          <a:lstStyle/>
+          <a:p>
+            <a:pPr lvl="0"/>
+            <a:r>
+              <a:rPr lang="en-US" dirty="0"/>
+              <a:t>Click to edit Master text styles</a:t>
+            </a:r>
+          </a:p>
+          <a:p>
+            <a:pPr lvl="1"/>
+            <a:r>
+              <a:rPr lang="en-US" dirty="0"/>
+              <a:t>Second level</a:t>
+            </a:r>
+          </a:p>
+          <a:p>
+            <a:pPr lvl="2"/>
+            <a:r>
+              <a:rPr lang="en-US" dirty="0"/>
+              <a:t>Third level</a:t>
+            </a:r>
+          </a:p>
+          <a:p>
+            <a:pPr lvl="3"/>
+            <a:r>
+              <a:rPr lang="en-US" dirty="0"/>
+              <a:t>Fourth level</a:t>
+            </a:r>
+          </a:p>
+          <a:p>
+            <a:pPr lvl="4"/>
+            <a:r>
+              <a:rPr lang="en-US" dirty="0"/>
+              <a:t>Fifth level</a:t>
             </a:r>
             <a:endParaRPr lang="en-GB" dirty="0"/>
           </a:p>
@@ -4566,26 +2918,26 @@
       </p:sp>
       <p:sp>
         <p:nvSpPr>
-          <p:cNvPr id="8" name="Parallelogram 7">
-            <a:extLst>
-              <a:ext uri="{FF2B5EF4-FFF2-40B4-BE49-F238E27FC236}">
-                <a16:creationId xmlns:a16="http://schemas.microsoft.com/office/drawing/2014/main" id="{E2C3CC97-F1D4-E0B5-5B7A-20E7171E894D}"/>
+          <p:cNvPr id="2" name="Rectangle 1">
+            <a:extLst>
+              <a:ext uri="{FF2B5EF4-FFF2-40B4-BE49-F238E27FC236}">
+                <a16:creationId xmlns:a16="http://schemas.microsoft.com/office/drawing/2014/main" id="{6EC2F1DB-5A59-9ED0-5551-95010F872981}"/>
               </a:ext>
             </a:extLst>
           </p:cNvPr>
           <p:cNvSpPr/>
-          <p:nvPr/>
-        </p:nvSpPr>
-        <p:spPr>
-          <a:xfrm>
-            <a:off x="11208471" y="159685"/>
-            <a:ext cx="848382" cy="709988"/>
-          </a:xfrm>
-          <a:prstGeom prst="parallelogram">
-            <a:avLst/>
-          </a:prstGeom>
-          <a:solidFill>
-            <a:srgbClr val="F4DB52"/>
+          <p:nvPr userDrawn="1"/>
+        </p:nvSpPr>
+        <p:spPr>
+          <a:xfrm>
+            <a:off x="0" y="101176"/>
+            <a:ext cx="12191999" cy="626793"/>
+          </a:xfrm>
+          <a:prstGeom prst="rect">
+            <a:avLst/>
+          </a:prstGeom>
+          <a:solidFill>
+            <a:srgbClr val="245391"/>
           </a:solidFill>
           <a:ln>
             <a:noFill/>
@@ -4616,49 +2968,60 @@
           </a:p>
         </p:txBody>
       </p:sp>
-      <p:pic>
-        <p:nvPicPr>
-          <p:cNvPr id="11" name="Graphic 10">
-            <a:extLst>
-              <a:ext uri="{FF2B5EF4-FFF2-40B4-BE49-F238E27FC236}">
-                <a16:creationId xmlns:a16="http://schemas.microsoft.com/office/drawing/2014/main" id="{1A442065-41AB-9901-8048-5F26D07CC2E0}"/>
-              </a:ext>
-            </a:extLst>
-          </p:cNvPr>
-          <p:cNvPicPr>
-            <a:picLocks noChangeAspect="1"/>
-          </p:cNvPicPr>
-          <p:nvPr/>
-        </p:nvPicPr>
-        <p:blipFill>
-          <a:blip r:embed="rId2">
-            <a:extLst>
-              <a:ext uri="{28A0092B-C50C-407E-A947-70E740481C1C}">
-                <a14:useLocalDpi xmlns:a14="http://schemas.microsoft.com/office/drawing/2010/main" val="0"/>
-              </a:ext>
-              <a:ext uri="{96DAC541-7B7A-43D3-8B79-37D633B846F1}">
-                <asvg:svgBlip xmlns:asvg="http://schemas.microsoft.com/office/drawing/2016/SVG/main" r:embed="rId3"/>
-              </a:ext>
-            </a:extLst>
-          </a:blip>
-          <a:stretch>
-            <a:fillRect/>
-          </a:stretch>
-        </p:blipFill>
-        <p:spPr>
-          <a:xfrm>
-            <a:off x="11419250" y="203307"/>
-            <a:ext cx="426823" cy="622742"/>
-          </a:xfrm>
-          <a:prstGeom prst="rect">
-            <a:avLst/>
-          </a:prstGeom>
-        </p:spPr>
-      </p:pic>
+      <p:sp>
+        <p:nvSpPr>
+          <p:cNvPr id="5" name="Title 1">
+            <a:extLst>
+              <a:ext uri="{FF2B5EF4-FFF2-40B4-BE49-F238E27FC236}">
+                <a16:creationId xmlns:a16="http://schemas.microsoft.com/office/drawing/2014/main" id="{E1712F8D-66DC-0A69-E5B1-D860652125A8}"/>
+              </a:ext>
+            </a:extLst>
+          </p:cNvPr>
+          <p:cNvSpPr>
+            <a:spLocks noGrp="1"/>
+          </p:cNvSpPr>
+          <p:nvPr>
+            <p:ph type="title"/>
+          </p:nvPr>
+        </p:nvSpPr>
+        <p:spPr>
+          <a:xfrm>
+            <a:off x="177800" y="101175"/>
+            <a:ext cx="11836400" cy="626793"/>
+          </a:xfrm>
+          <a:prstGeom prst="rect">
+            <a:avLst/>
+          </a:prstGeom>
+          <a:solidFill>
+            <a:srgbClr val="245391"/>
+          </a:solidFill>
+        </p:spPr>
+        <p:txBody>
+          <a:bodyPr>
+            <a:normAutofit/>
+          </a:bodyPr>
+          <a:lstStyle>
+            <a:lvl1pPr marL="0" indent="0">
+              <a:defRPr sz="3200" b="1">
+                <a:solidFill>
+                  <a:schemeClr val="bg1"/>
+                </a:solidFill>
+              </a:defRPr>
+            </a:lvl1pPr>
+          </a:lstStyle>
+          <a:p>
+            <a:r>
+              <a:rPr lang="en-US" dirty="0"/>
+              <a:t>Click to edit Master title style</a:t>
+            </a:r>
+            <a:endParaRPr lang="en-GB" dirty="0"/>
+          </a:p>
+        </p:txBody>
+      </p:sp>
     </p:spTree>
     <p:extLst>
       <p:ext uri="{BB962C8B-B14F-4D97-AF65-F5344CB8AC3E}">
-        <p14:creationId xmlns:p14="http://schemas.microsoft.com/office/powerpoint/2010/main" val="2481587099"/>
+        <p14:creationId xmlns:p14="http://schemas.microsoft.com/office/powerpoint/2010/main" val="2738861046"/>
       </p:ext>
     </p:extLst>
   </p:cSld>
@@ -4668,9 +3031,9 @@
 </p:sldLayout>
 </file>
 
-<file path=ppt/slideLayouts/slideLayout6.xml><?xml version="1.0" encoding="utf-8"?>
-<p:sldLayout xmlns:a="http://schemas.openxmlformats.org/drawingml/2006/main" xmlns:r="http://schemas.openxmlformats.org/officeDocument/2006/relationships" xmlns:p="http://schemas.openxmlformats.org/presentationml/2006/main" preserve="1">
-  <p:cSld name="Two Content - Yellow Green">
+<file path=ppt/slideLayouts/slideLayout7.xml><?xml version="1.0" encoding="utf-8"?>
+<p:sldLayout xmlns:a="http://schemas.openxmlformats.org/drawingml/2006/main" xmlns:r="http://schemas.openxmlformats.org/officeDocument/2006/relationships" xmlns:p="http://schemas.openxmlformats.org/presentationml/2006/main" preserve="1" userDrawn="1">
+  <p:cSld name="Comparison - Light Blue Sub-Header">
     <p:spTree>
       <p:nvGrpSpPr>
         <p:cNvPr id="1" name=""/>
@@ -4687,10 +3050,10 @@
       </p:grpSpPr>
       <p:sp>
         <p:nvSpPr>
-          <p:cNvPr id="3" name="Content Placeholder 2">
-            <a:extLst>
-              <a:ext uri="{FF2B5EF4-FFF2-40B4-BE49-F238E27FC236}">
-                <a16:creationId xmlns:a16="http://schemas.microsoft.com/office/drawing/2014/main" id="{FFB3E276-45A6-3182-E191-0D21CECBD5BF}"/>
+          <p:cNvPr id="3" name="Text Placeholder 2">
+            <a:extLst>
+              <a:ext uri="{FF2B5EF4-FFF2-40B4-BE49-F238E27FC236}">
+                <a16:creationId xmlns:a16="http://schemas.microsoft.com/office/drawing/2014/main" id="{A7EE70C0-0004-DA5B-411C-22A2E3426F32}"/>
               </a:ext>
             </a:extLst>
           </p:cNvPr>
@@ -4698,60 +3061,72 @@
             <a:spLocks noGrp="1"/>
           </p:cNvSpPr>
           <p:nvPr>
-            <p:ph sz="half" idx="1"/>
+            <p:ph type="body" idx="1"/>
           </p:nvPr>
         </p:nvSpPr>
         <p:spPr>
           <a:xfrm>
-            <a:off x="326590" y="1150070"/>
-            <a:ext cx="5693210" cy="5279010"/>
-          </a:xfrm>
-          <a:prstGeom prst="rect">
-            <a:avLst/>
-          </a:prstGeom>
-          <a:solidFill>
-            <a:srgbClr val="F8E992"/>
-          </a:solidFill>
-        </p:spPr>
-        <p:txBody>
-          <a:bodyPr/>
-          <a:lstStyle/>
+            <a:off x="177800" y="820130"/>
+            <a:ext cx="5842000" cy="659877"/>
+          </a:xfrm>
+          <a:prstGeom prst="rect">
+            <a:avLst/>
+          </a:prstGeom>
+          <a:solidFill>
+            <a:srgbClr val="00A1D7"/>
+          </a:solidFill>
+        </p:spPr>
+        <p:txBody>
+          <a:bodyPr anchor="b"/>
+          <a:lstStyle>
+            <a:lvl1pPr marL="0" indent="0">
+              <a:buNone/>
+              <a:defRPr sz="2800" b="1">
+                <a:solidFill>
+                  <a:schemeClr val="bg1"/>
+                </a:solidFill>
+              </a:defRPr>
+            </a:lvl1pPr>
+            <a:lvl2pPr marL="457200" indent="0">
+              <a:buNone/>
+              <a:defRPr sz="2000" b="1"/>
+            </a:lvl2pPr>
+            <a:lvl3pPr marL="914400" indent="0">
+              <a:buNone/>
+              <a:defRPr sz="1800" b="1"/>
+            </a:lvl3pPr>
+            <a:lvl4pPr marL="1371600" indent="0">
+              <a:buNone/>
+              <a:defRPr sz="1600" b="1"/>
+            </a:lvl4pPr>
+            <a:lvl5pPr marL="1828800" indent="0">
+              <a:buNone/>
+              <a:defRPr sz="1600" b="1"/>
+            </a:lvl5pPr>
+            <a:lvl6pPr marL="2286000" indent="0">
+              <a:buNone/>
+              <a:defRPr sz="1600" b="1"/>
+            </a:lvl6pPr>
+            <a:lvl7pPr marL="2743200" indent="0">
+              <a:buNone/>
+              <a:defRPr sz="1600" b="1"/>
+            </a:lvl7pPr>
+            <a:lvl8pPr marL="3200400" indent="0">
+              <a:buNone/>
+              <a:defRPr sz="1600" b="1"/>
+            </a:lvl8pPr>
+            <a:lvl9pPr marL="3657600" indent="0">
+              <a:buNone/>
+              <a:defRPr sz="1600" b="1"/>
+            </a:lvl9pPr>
+          </a:lstStyle>
           <a:p>
             <a:pPr lvl="0"/>
             <a:r>
-              <a:rPr lang="en-US"/>
+              <a:rPr lang="en-US" dirty="0"/>
               <a:t>Click to edit Master text styles</a:t>
             </a:r>
           </a:p>
-          <a:p>
-            <a:pPr lvl="1"/>
-            <a:r>
-              <a:rPr lang="en-US"/>
-              <a:t>Second level</a:t>
-            </a:r>
-          </a:p>
-          <a:p>
-            <a:pPr lvl="2"/>
-            <a:r>
-              <a:rPr lang="en-US"/>
-              <a:t>Third level</a:t>
-            </a:r>
-          </a:p>
-          <a:p>
-            <a:pPr lvl="3"/>
-            <a:r>
-              <a:rPr lang="en-US"/>
-              <a:t>Fourth level</a:t>
-            </a:r>
-          </a:p>
-          <a:p>
-            <a:pPr lvl="4"/>
-            <a:r>
-              <a:rPr lang="en-US"/>
-              <a:t>Fifth level</a:t>
-            </a:r>
-            <a:endParaRPr lang="en-GB" dirty="0"/>
-          </a:p>
         </p:txBody>
       </p:sp>
       <p:sp>
@@ -4759,7 +3134,7 @@
           <p:cNvPr id="4" name="Content Placeholder 3">
             <a:extLst>
               <a:ext uri="{FF2B5EF4-FFF2-40B4-BE49-F238E27FC236}">
-                <a16:creationId xmlns:a16="http://schemas.microsoft.com/office/drawing/2014/main" id="{24DAC9F3-A161-D5C8-4EB3-26AE99A810B4}"/>
+                <a16:creationId xmlns:a16="http://schemas.microsoft.com/office/drawing/2014/main" id="{433E7C9F-2EEC-6475-AE93-1246752B2204}"/>
               </a:ext>
             </a:extLst>
           </p:cNvPr>
@@ -4772,15 +3147,12 @@
         </p:nvSpPr>
         <p:spPr>
           <a:xfrm>
-            <a:off x="6172202" y="1150070"/>
-            <a:ext cx="5683368" cy="5279010"/>
-          </a:xfrm>
-          <a:prstGeom prst="rect">
-            <a:avLst/>
-          </a:prstGeom>
-          <a:solidFill>
-            <a:srgbClr val="90D098"/>
-          </a:solidFill>
+            <a:off x="177800" y="1572168"/>
+            <a:ext cx="5842000" cy="4856912"/>
+          </a:xfrm>
+          <a:prstGeom prst="rect">
+            <a:avLst/>
+          </a:prstGeom>
         </p:spPr>
         <p:txBody>
           <a:bodyPr/>
@@ -4819,26 +3191,190 @@
               <a:rPr lang="en-US"/>
               <a:t>Fifth level</a:t>
             </a:r>
+            <a:endParaRPr lang="en-GB" dirty="0"/>
+          </a:p>
+        </p:txBody>
+      </p:sp>
+      <p:sp>
+        <p:nvSpPr>
+          <p:cNvPr id="5" name="Text Placeholder 4">
+            <a:extLst>
+              <a:ext uri="{FF2B5EF4-FFF2-40B4-BE49-F238E27FC236}">
+                <a16:creationId xmlns:a16="http://schemas.microsoft.com/office/drawing/2014/main" id="{6581B006-631F-4BB6-7AFB-4D358EC005E0}"/>
+              </a:ext>
+            </a:extLst>
+          </p:cNvPr>
+          <p:cNvSpPr>
+            <a:spLocks noGrp="1"/>
+          </p:cNvSpPr>
+          <p:nvPr>
+            <p:ph type="body" sz="quarter" idx="3"/>
+          </p:nvPr>
+        </p:nvSpPr>
+        <p:spPr>
+          <a:xfrm>
+            <a:off x="6172200" y="820130"/>
+            <a:ext cx="5832164" cy="659877"/>
+          </a:xfrm>
+          <a:prstGeom prst="rect">
+            <a:avLst/>
+          </a:prstGeom>
+          <a:solidFill>
+            <a:srgbClr val="00A1D7"/>
+          </a:solidFill>
+        </p:spPr>
+        <p:txBody>
+          <a:bodyPr vert="horz" lIns="91440" tIns="45720" rIns="91440" bIns="45720" rtlCol="0" anchor="b">
+            <a:normAutofit/>
+          </a:bodyPr>
+          <a:lstStyle>
+            <a:lvl1pPr>
+              <a:defRPr lang="en-US" b="1" dirty="0">
+                <a:solidFill>
+                  <a:schemeClr val="bg1"/>
+                </a:solidFill>
+              </a:defRPr>
+            </a:lvl1pPr>
+          </a:lstStyle>
+          <a:p>
+            <a:pPr marL="0" lvl="0" indent="0">
+              <a:buNone/>
+            </a:pPr>
+            <a:r>
+              <a:rPr lang="en-US"/>
+              <a:t>Click to edit Master text styles</a:t>
+            </a:r>
+          </a:p>
+        </p:txBody>
+      </p:sp>
+      <p:sp>
+        <p:nvSpPr>
+          <p:cNvPr id="6" name="Content Placeholder 5">
+            <a:extLst>
+              <a:ext uri="{FF2B5EF4-FFF2-40B4-BE49-F238E27FC236}">
+                <a16:creationId xmlns:a16="http://schemas.microsoft.com/office/drawing/2014/main" id="{4D14FAB4-C3D5-5802-AC62-3F1B0FEE0444}"/>
+              </a:ext>
+            </a:extLst>
+          </p:cNvPr>
+          <p:cNvSpPr>
+            <a:spLocks noGrp="1"/>
+          </p:cNvSpPr>
+          <p:nvPr>
+            <p:ph sz="quarter" idx="4"/>
+          </p:nvPr>
+        </p:nvSpPr>
+        <p:spPr>
+          <a:xfrm>
+            <a:off x="6172199" y="1572168"/>
+            <a:ext cx="5842000" cy="4856912"/>
+          </a:xfrm>
+          <a:prstGeom prst="rect">
+            <a:avLst/>
+          </a:prstGeom>
+        </p:spPr>
+        <p:txBody>
+          <a:bodyPr/>
+          <a:lstStyle/>
+          <a:p>
+            <a:pPr lvl="0"/>
+            <a:r>
+              <a:rPr lang="en-US"/>
+              <a:t>Click to edit Master text styles</a:t>
+            </a:r>
+          </a:p>
+          <a:p>
+            <a:pPr lvl="1"/>
+            <a:r>
+              <a:rPr lang="en-US"/>
+              <a:t>Second level</a:t>
+            </a:r>
+          </a:p>
+          <a:p>
+            <a:pPr lvl="2"/>
+            <a:r>
+              <a:rPr lang="en-US"/>
+              <a:t>Third level</a:t>
+            </a:r>
+          </a:p>
+          <a:p>
+            <a:pPr lvl="3"/>
+            <a:r>
+              <a:rPr lang="en-US"/>
+              <a:t>Fourth level</a:t>
+            </a:r>
+          </a:p>
+          <a:p>
+            <a:pPr lvl="4"/>
+            <a:r>
+              <a:rPr lang="en-US"/>
+              <a:t>Fifth level</a:t>
+            </a:r>
             <a:endParaRPr lang="en-GB"/>
           </a:p>
         </p:txBody>
       </p:sp>
       <p:sp>
         <p:nvSpPr>
-          <p:cNvPr id="9" name="Rectangle 8">
-            <a:extLst>
-              <a:ext uri="{FF2B5EF4-FFF2-40B4-BE49-F238E27FC236}">
-                <a16:creationId xmlns:a16="http://schemas.microsoft.com/office/drawing/2014/main" id="{43E97568-94FD-F797-00D0-A204C8758D41}"/>
+          <p:cNvPr id="13" name="Slide Number Placeholder 5">
+            <a:extLst>
+              <a:ext uri="{FF2B5EF4-FFF2-40B4-BE49-F238E27FC236}">
+                <a16:creationId xmlns:a16="http://schemas.microsoft.com/office/drawing/2014/main" id="{B0D63A05-1B5F-F916-3C25-1C57B251A0A9}"/>
+              </a:ext>
+            </a:extLst>
+          </p:cNvPr>
+          <p:cNvSpPr>
+            <a:spLocks noGrp="1"/>
+          </p:cNvSpPr>
+          <p:nvPr>
+            <p:ph type="sldNum" sz="quarter" idx="10"/>
+          </p:nvPr>
+        </p:nvSpPr>
+        <p:spPr>
+          <a:xfrm>
+            <a:off x="11484634" y="6650966"/>
+            <a:ext cx="370936" cy="207034"/>
+          </a:xfrm>
+          <a:prstGeom prst="rect">
+            <a:avLst/>
+          </a:prstGeom>
+        </p:spPr>
+        <p:txBody>
+          <a:bodyPr/>
+          <a:lstStyle>
+            <a:lvl1pPr algn="r">
+              <a:defRPr sz="1000">
+                <a:solidFill>
+                  <a:schemeClr val="bg1"/>
+                </a:solidFill>
+              </a:defRPr>
+            </a:lvl1pPr>
+          </a:lstStyle>
+          <a:p>
+            <a:fld id="{7767393B-85A6-40C1-AB65-A74DA355DB56}" type="slidenum">
+              <a:rPr lang="en-GB" smtClean="0"/>
+              <a:pPr/>
+              <a:t>‹#›</a:t>
+            </a:fld>
+            <a:endParaRPr lang="en-GB"/>
+          </a:p>
+        </p:txBody>
+      </p:sp>
+      <p:sp>
+        <p:nvSpPr>
+          <p:cNvPr id="2" name="Rectangle 1">
+            <a:extLst>
+              <a:ext uri="{FF2B5EF4-FFF2-40B4-BE49-F238E27FC236}">
+                <a16:creationId xmlns:a16="http://schemas.microsoft.com/office/drawing/2014/main" id="{9715A5BD-C30B-1DF2-AA5A-5EF2909EF2E6}"/>
               </a:ext>
             </a:extLst>
           </p:cNvPr>
           <p:cNvSpPr/>
-          <p:nvPr/>
+          <p:nvPr userDrawn="1"/>
         </p:nvSpPr>
         <p:spPr>
           <a:xfrm>
             <a:off x="0" y="101176"/>
-            <a:ext cx="12191999" cy="827008"/>
+            <a:ext cx="12191999" cy="626793"/>
           </a:xfrm>
           <a:prstGeom prst="rect">
             <a:avLst/>
@@ -4877,10 +3413,10 @@
       </p:sp>
       <p:sp>
         <p:nvSpPr>
-          <p:cNvPr id="10" name="Title 1">
-            <a:extLst>
-              <a:ext uri="{FF2B5EF4-FFF2-40B4-BE49-F238E27FC236}">
-                <a16:creationId xmlns:a16="http://schemas.microsoft.com/office/drawing/2014/main" id="{D9F72F79-6B14-C5F0-EDC1-E3E0F8BCA436}"/>
+          <p:cNvPr id="7" name="Title 1">
+            <a:extLst>
+              <a:ext uri="{FF2B5EF4-FFF2-40B4-BE49-F238E27FC236}">
+                <a16:creationId xmlns:a16="http://schemas.microsoft.com/office/drawing/2014/main" id="{12732B46-CB3D-86AF-F5C0-E7A3060781F6}"/>
               </a:ext>
             </a:extLst>
           </p:cNvPr>
@@ -4893,8 +3429,8 @@
         </p:nvSpPr>
         <p:spPr>
           <a:xfrm>
-            <a:off x="326590" y="101175"/>
-            <a:ext cx="10881880" cy="827009"/>
+            <a:off x="177800" y="101175"/>
+            <a:ext cx="11836400" cy="626793"/>
           </a:xfrm>
           <a:prstGeom prst="rect">
             <a:avLst/>
@@ -4918,19 +3454,49 @@
           </a:lstStyle>
           <a:p>
             <a:r>
-              <a:rPr lang="en-US"/>
+              <a:rPr lang="en-US" dirty="0"/>
               <a:t>Click to edit Master title style</a:t>
             </a:r>
             <a:endParaRPr lang="en-GB" dirty="0"/>
           </a:p>
         </p:txBody>
       </p:sp>
-      <p:sp>
-        <p:nvSpPr>
-          <p:cNvPr id="12" name="Slide Number Placeholder 5">
-            <a:extLst>
-              <a:ext uri="{FF2B5EF4-FFF2-40B4-BE49-F238E27FC236}">
-                <a16:creationId xmlns:a16="http://schemas.microsoft.com/office/drawing/2014/main" id="{26D26384-FFA6-46A5-CD52-9800186C7F07}"/>
+    </p:spTree>
+    <p:extLst>
+      <p:ext uri="{BB962C8B-B14F-4D97-AF65-F5344CB8AC3E}">
+        <p14:creationId xmlns:p14="http://schemas.microsoft.com/office/powerpoint/2010/main" val="49639326"/>
+      </p:ext>
+    </p:extLst>
+  </p:cSld>
+  <p:clrMapOvr>
+    <a:masterClrMapping/>
+  </p:clrMapOvr>
+</p:sldLayout>
+</file>
+
+<file path=ppt/slideLayouts/slideLayout8.xml><?xml version="1.0" encoding="utf-8"?>
+<p:sldLayout xmlns:a="http://schemas.openxmlformats.org/drawingml/2006/main" xmlns:r="http://schemas.openxmlformats.org/officeDocument/2006/relationships" xmlns:p="http://schemas.openxmlformats.org/presentationml/2006/main" preserve="1" userDrawn="1">
+  <p:cSld name="Comparison - No Colour">
+    <p:spTree>
+      <p:nvGrpSpPr>
+        <p:cNvPr id="1" name=""/>
+        <p:cNvGrpSpPr/>
+        <p:nvPr/>
+      </p:nvGrpSpPr>
+      <p:grpSpPr>
+        <a:xfrm>
+          <a:off x="0" y="0"/>
+          <a:ext cx="0" cy="0"/>
+          <a:chOff x="0" y="0"/>
+          <a:chExt cx="0" cy="0"/>
+        </a:xfrm>
+      </p:grpSpPr>
+      <p:sp>
+        <p:nvSpPr>
+          <p:cNvPr id="3" name="Text Placeholder 2">
+            <a:extLst>
+              <a:ext uri="{FF2B5EF4-FFF2-40B4-BE49-F238E27FC236}">
+                <a16:creationId xmlns:a16="http://schemas.microsoft.com/office/drawing/2014/main" id="{A7EE70C0-0004-DA5B-411C-22A2E3426F32}"/>
               </a:ext>
             </a:extLst>
           </p:cNvPr>
@@ -4938,7 +3504,264 @@
             <a:spLocks noGrp="1"/>
           </p:cNvSpPr>
           <p:nvPr>
-            <p:ph type="sldNum" sz="quarter" idx="4"/>
+            <p:ph type="body" idx="1"/>
+          </p:nvPr>
+        </p:nvSpPr>
+        <p:spPr>
+          <a:xfrm>
+            <a:off x="177800" y="870930"/>
+            <a:ext cx="5842000" cy="659877"/>
+          </a:xfrm>
+          <a:prstGeom prst="rect">
+            <a:avLst/>
+          </a:prstGeom>
+          <a:noFill/>
+        </p:spPr>
+        <p:txBody>
+          <a:bodyPr anchor="b"/>
+          <a:lstStyle>
+            <a:lvl1pPr marL="0" indent="0">
+              <a:buNone/>
+              <a:defRPr sz="2800" b="1">
+                <a:solidFill>
+                  <a:schemeClr val="tx1"/>
+                </a:solidFill>
+              </a:defRPr>
+            </a:lvl1pPr>
+            <a:lvl2pPr marL="457200" indent="0">
+              <a:buNone/>
+              <a:defRPr sz="2000" b="1"/>
+            </a:lvl2pPr>
+            <a:lvl3pPr marL="914400" indent="0">
+              <a:buNone/>
+              <a:defRPr sz="1800" b="1"/>
+            </a:lvl3pPr>
+            <a:lvl4pPr marL="1371600" indent="0">
+              <a:buNone/>
+              <a:defRPr sz="1600" b="1"/>
+            </a:lvl4pPr>
+            <a:lvl5pPr marL="1828800" indent="0">
+              <a:buNone/>
+              <a:defRPr sz="1600" b="1"/>
+            </a:lvl5pPr>
+            <a:lvl6pPr marL="2286000" indent="0">
+              <a:buNone/>
+              <a:defRPr sz="1600" b="1"/>
+            </a:lvl6pPr>
+            <a:lvl7pPr marL="2743200" indent="0">
+              <a:buNone/>
+              <a:defRPr sz="1600" b="1"/>
+            </a:lvl7pPr>
+            <a:lvl8pPr marL="3200400" indent="0">
+              <a:buNone/>
+              <a:defRPr sz="1600" b="1"/>
+            </a:lvl8pPr>
+            <a:lvl9pPr marL="3657600" indent="0">
+              <a:buNone/>
+              <a:defRPr sz="1600" b="1"/>
+            </a:lvl9pPr>
+          </a:lstStyle>
+          <a:p>
+            <a:pPr lvl="0"/>
+            <a:r>
+              <a:rPr lang="en-US"/>
+              <a:t>Click to edit Master text styles</a:t>
+            </a:r>
+          </a:p>
+        </p:txBody>
+      </p:sp>
+      <p:sp>
+        <p:nvSpPr>
+          <p:cNvPr id="4" name="Content Placeholder 3">
+            <a:extLst>
+              <a:ext uri="{FF2B5EF4-FFF2-40B4-BE49-F238E27FC236}">
+                <a16:creationId xmlns:a16="http://schemas.microsoft.com/office/drawing/2014/main" id="{433E7C9F-2EEC-6475-AE93-1246752B2204}"/>
+              </a:ext>
+            </a:extLst>
+          </p:cNvPr>
+          <p:cNvSpPr>
+            <a:spLocks noGrp="1"/>
+          </p:cNvSpPr>
+          <p:nvPr>
+            <p:ph sz="half" idx="2"/>
+          </p:nvPr>
+        </p:nvSpPr>
+        <p:spPr>
+          <a:xfrm>
+            <a:off x="177800" y="1597981"/>
+            <a:ext cx="5842000" cy="4831099"/>
+          </a:xfrm>
+          <a:prstGeom prst="rect">
+            <a:avLst/>
+          </a:prstGeom>
+        </p:spPr>
+        <p:txBody>
+          <a:bodyPr/>
+          <a:lstStyle/>
+          <a:p>
+            <a:pPr lvl="0"/>
+            <a:r>
+              <a:rPr lang="en-US" dirty="0"/>
+              <a:t>Click to edit Master text styles</a:t>
+            </a:r>
+          </a:p>
+          <a:p>
+            <a:pPr lvl="1"/>
+            <a:r>
+              <a:rPr lang="en-US" dirty="0"/>
+              <a:t>Second level</a:t>
+            </a:r>
+          </a:p>
+          <a:p>
+            <a:pPr lvl="2"/>
+            <a:r>
+              <a:rPr lang="en-US" dirty="0"/>
+              <a:t>Third level</a:t>
+            </a:r>
+          </a:p>
+          <a:p>
+            <a:pPr lvl="3"/>
+            <a:r>
+              <a:rPr lang="en-US" dirty="0"/>
+              <a:t>Fourth level</a:t>
+            </a:r>
+          </a:p>
+          <a:p>
+            <a:pPr lvl="4"/>
+            <a:r>
+              <a:rPr lang="en-US" dirty="0"/>
+              <a:t>Fifth level</a:t>
+            </a:r>
+            <a:endParaRPr lang="en-GB" dirty="0"/>
+          </a:p>
+        </p:txBody>
+      </p:sp>
+      <p:sp>
+        <p:nvSpPr>
+          <p:cNvPr id="5" name="Text Placeholder 4">
+            <a:extLst>
+              <a:ext uri="{FF2B5EF4-FFF2-40B4-BE49-F238E27FC236}">
+                <a16:creationId xmlns:a16="http://schemas.microsoft.com/office/drawing/2014/main" id="{6581B006-631F-4BB6-7AFB-4D358EC005E0}"/>
+              </a:ext>
+            </a:extLst>
+          </p:cNvPr>
+          <p:cNvSpPr>
+            <a:spLocks noGrp="1"/>
+          </p:cNvSpPr>
+          <p:nvPr>
+            <p:ph type="body" sz="quarter" idx="3"/>
+          </p:nvPr>
+        </p:nvSpPr>
+        <p:spPr>
+          <a:xfrm>
+            <a:off x="6172199" y="870929"/>
+            <a:ext cx="5842000" cy="659877"/>
+          </a:xfrm>
+          <a:prstGeom prst="rect">
+            <a:avLst/>
+          </a:prstGeom>
+          <a:noFill/>
+        </p:spPr>
+        <p:txBody>
+          <a:bodyPr vert="horz" lIns="91440" tIns="45720" rIns="91440" bIns="45720" rtlCol="0" anchor="b">
+            <a:normAutofit/>
+          </a:bodyPr>
+          <a:lstStyle>
+            <a:lvl1pPr>
+              <a:defRPr lang="en-US" b="1" dirty="0"/>
+            </a:lvl1pPr>
+          </a:lstStyle>
+          <a:p>
+            <a:pPr marL="0" lvl="0" indent="0">
+              <a:buNone/>
+            </a:pPr>
+            <a:r>
+              <a:rPr lang="en-US"/>
+              <a:t>Click to edit Master text styles</a:t>
+            </a:r>
+          </a:p>
+        </p:txBody>
+      </p:sp>
+      <p:sp>
+        <p:nvSpPr>
+          <p:cNvPr id="6" name="Content Placeholder 5">
+            <a:extLst>
+              <a:ext uri="{FF2B5EF4-FFF2-40B4-BE49-F238E27FC236}">
+                <a16:creationId xmlns:a16="http://schemas.microsoft.com/office/drawing/2014/main" id="{4D14FAB4-C3D5-5802-AC62-3F1B0FEE0444}"/>
+              </a:ext>
+            </a:extLst>
+          </p:cNvPr>
+          <p:cNvSpPr>
+            <a:spLocks noGrp="1"/>
+          </p:cNvSpPr>
+          <p:nvPr>
+            <p:ph sz="quarter" idx="4"/>
+          </p:nvPr>
+        </p:nvSpPr>
+        <p:spPr>
+          <a:xfrm>
+            <a:off x="6172199" y="1597981"/>
+            <a:ext cx="5842000" cy="4831099"/>
+          </a:xfrm>
+          <a:prstGeom prst="rect">
+            <a:avLst/>
+          </a:prstGeom>
+        </p:spPr>
+        <p:txBody>
+          <a:bodyPr/>
+          <a:lstStyle/>
+          <a:p>
+            <a:pPr lvl="0"/>
+            <a:r>
+              <a:rPr lang="en-US" dirty="0"/>
+              <a:t>Click to edit Master text styles</a:t>
+            </a:r>
+          </a:p>
+          <a:p>
+            <a:pPr lvl="1"/>
+            <a:r>
+              <a:rPr lang="en-US" dirty="0"/>
+              <a:t>Second level</a:t>
+            </a:r>
+          </a:p>
+          <a:p>
+            <a:pPr lvl="2"/>
+            <a:r>
+              <a:rPr lang="en-US" dirty="0"/>
+              <a:t>Third level</a:t>
+            </a:r>
+          </a:p>
+          <a:p>
+            <a:pPr lvl="3"/>
+            <a:r>
+              <a:rPr lang="en-US" dirty="0"/>
+              <a:t>Fourth level</a:t>
+            </a:r>
+          </a:p>
+          <a:p>
+            <a:pPr lvl="4"/>
+            <a:r>
+              <a:rPr lang="en-US" dirty="0"/>
+              <a:t>Fifth level</a:t>
+            </a:r>
+            <a:endParaRPr lang="en-GB" dirty="0"/>
+          </a:p>
+        </p:txBody>
+      </p:sp>
+      <p:sp>
+        <p:nvSpPr>
+          <p:cNvPr id="13" name="Slide Number Placeholder 5">
+            <a:extLst>
+              <a:ext uri="{FF2B5EF4-FFF2-40B4-BE49-F238E27FC236}">
+                <a16:creationId xmlns:a16="http://schemas.microsoft.com/office/drawing/2014/main" id="{B0D63A05-1B5F-F916-3C25-1C57B251A0A9}"/>
+              </a:ext>
+            </a:extLst>
+          </p:cNvPr>
+          <p:cNvSpPr>
+            <a:spLocks noGrp="1"/>
+          </p:cNvSpPr>
+          <p:nvPr>
+            <p:ph type="sldNum" sz="quarter" idx="10"/>
           </p:nvPr>
         </p:nvSpPr>
         <p:spPr>
@@ -4973,26 +3796,26 @@
       </p:sp>
       <p:sp>
         <p:nvSpPr>
-          <p:cNvPr id="8" name="Parallelogram 7">
-            <a:extLst>
-              <a:ext uri="{FF2B5EF4-FFF2-40B4-BE49-F238E27FC236}">
-                <a16:creationId xmlns:a16="http://schemas.microsoft.com/office/drawing/2014/main" id="{FB879F90-1078-4FC5-A771-BFBDADE11095}"/>
+          <p:cNvPr id="8" name="Rectangle 7">
+            <a:extLst>
+              <a:ext uri="{FF2B5EF4-FFF2-40B4-BE49-F238E27FC236}">
+                <a16:creationId xmlns:a16="http://schemas.microsoft.com/office/drawing/2014/main" id="{CDC1049D-005C-9A98-92A6-EA26837768FF}"/>
               </a:ext>
             </a:extLst>
           </p:cNvPr>
           <p:cNvSpPr/>
-          <p:nvPr/>
-        </p:nvSpPr>
-        <p:spPr>
-          <a:xfrm>
-            <a:off x="11208471" y="159685"/>
-            <a:ext cx="848382" cy="709988"/>
-          </a:xfrm>
-          <a:prstGeom prst="parallelogram">
-            <a:avLst/>
-          </a:prstGeom>
-          <a:solidFill>
-            <a:srgbClr val="F4DB52"/>
+          <p:nvPr userDrawn="1"/>
+        </p:nvSpPr>
+        <p:spPr>
+          <a:xfrm>
+            <a:off x="0" y="101176"/>
+            <a:ext cx="12191999" cy="626793"/>
+          </a:xfrm>
+          <a:prstGeom prst="rect">
+            <a:avLst/>
+          </a:prstGeom>
+          <a:solidFill>
+            <a:srgbClr val="245391"/>
           </a:solidFill>
           <a:ln>
             <a:noFill/>
@@ -5023,49 +3846,60 @@
           </a:p>
         </p:txBody>
       </p:sp>
-      <p:pic>
-        <p:nvPicPr>
-          <p:cNvPr id="11" name="Graphic 10">
-            <a:extLst>
-              <a:ext uri="{FF2B5EF4-FFF2-40B4-BE49-F238E27FC236}">
-                <a16:creationId xmlns:a16="http://schemas.microsoft.com/office/drawing/2014/main" id="{93128CC8-C4FD-AF51-EA57-50FE77C8C227}"/>
-              </a:ext>
-            </a:extLst>
-          </p:cNvPr>
-          <p:cNvPicPr>
-            <a:picLocks noChangeAspect="1"/>
-          </p:cNvPicPr>
-          <p:nvPr/>
-        </p:nvPicPr>
-        <p:blipFill>
-          <a:blip r:embed="rId2">
-            <a:extLst>
-              <a:ext uri="{28A0092B-C50C-407E-A947-70E740481C1C}">
-                <a14:useLocalDpi xmlns:a14="http://schemas.microsoft.com/office/drawing/2010/main" val="0"/>
-              </a:ext>
-              <a:ext uri="{96DAC541-7B7A-43D3-8B79-37D633B846F1}">
-                <asvg:svgBlip xmlns:asvg="http://schemas.microsoft.com/office/drawing/2016/SVG/main" r:embed="rId3"/>
-              </a:ext>
-            </a:extLst>
-          </a:blip>
-          <a:stretch>
-            <a:fillRect/>
-          </a:stretch>
-        </p:blipFill>
-        <p:spPr>
-          <a:xfrm>
-            <a:off x="11419250" y="203307"/>
-            <a:ext cx="426823" cy="622742"/>
-          </a:xfrm>
-          <a:prstGeom prst="rect">
-            <a:avLst/>
-          </a:prstGeom>
-        </p:spPr>
-      </p:pic>
+      <p:sp>
+        <p:nvSpPr>
+          <p:cNvPr id="9" name="Title 1">
+            <a:extLst>
+              <a:ext uri="{FF2B5EF4-FFF2-40B4-BE49-F238E27FC236}">
+                <a16:creationId xmlns:a16="http://schemas.microsoft.com/office/drawing/2014/main" id="{C3611728-BACF-15C0-BBD3-8DA0E07C209A}"/>
+              </a:ext>
+            </a:extLst>
+          </p:cNvPr>
+          <p:cNvSpPr>
+            <a:spLocks noGrp="1"/>
+          </p:cNvSpPr>
+          <p:nvPr>
+            <p:ph type="title"/>
+          </p:nvPr>
+        </p:nvSpPr>
+        <p:spPr>
+          <a:xfrm>
+            <a:off x="177800" y="101175"/>
+            <a:ext cx="11836400" cy="626793"/>
+          </a:xfrm>
+          <a:prstGeom prst="rect">
+            <a:avLst/>
+          </a:prstGeom>
+          <a:solidFill>
+            <a:srgbClr val="245391"/>
+          </a:solidFill>
+        </p:spPr>
+        <p:txBody>
+          <a:bodyPr>
+            <a:normAutofit/>
+          </a:bodyPr>
+          <a:lstStyle>
+            <a:lvl1pPr marL="0" indent="0">
+              <a:defRPr sz="3200" b="1">
+                <a:solidFill>
+                  <a:schemeClr val="bg1"/>
+                </a:solidFill>
+              </a:defRPr>
+            </a:lvl1pPr>
+          </a:lstStyle>
+          <a:p>
+            <a:r>
+              <a:rPr lang="en-US" dirty="0"/>
+              <a:t>Click to edit Master title style</a:t>
+            </a:r>
+            <a:endParaRPr lang="en-GB" dirty="0"/>
+          </a:p>
+        </p:txBody>
+      </p:sp>
     </p:spTree>
     <p:extLst>
       <p:ext uri="{BB962C8B-B14F-4D97-AF65-F5344CB8AC3E}">
-        <p14:creationId xmlns:p14="http://schemas.microsoft.com/office/powerpoint/2010/main" val="2738861046"/>
+        <p14:creationId xmlns:p14="http://schemas.microsoft.com/office/powerpoint/2010/main" val="1632882156"/>
       </p:ext>
     </p:extLst>
   </p:cSld>
@@ -5075,9 +3909,9 @@
 </p:sldLayout>
 </file>
 
-<file path=ppt/slideLayouts/slideLayout7.xml><?xml version="1.0" encoding="utf-8"?>
-<p:sldLayout xmlns:a="http://schemas.openxmlformats.org/drawingml/2006/main" xmlns:r="http://schemas.openxmlformats.org/officeDocument/2006/relationships" xmlns:p="http://schemas.openxmlformats.org/presentationml/2006/main" preserve="1">
-  <p:cSld name="Two Content - Light Blue Green">
+<file path=ppt/slideLayouts/slideLayout9.xml><?xml version="1.0" encoding="utf-8"?>
+<p:sldLayout xmlns:a="http://schemas.openxmlformats.org/drawingml/2006/main" xmlns:r="http://schemas.openxmlformats.org/officeDocument/2006/relationships" xmlns:p="http://schemas.openxmlformats.org/presentationml/2006/main" preserve="1" userDrawn="1">
+  <p:cSld name="Title Only">
     <p:spTree>
       <p:nvGrpSpPr>
         <p:cNvPr id="1" name=""/>
@@ -5094,10 +3928,10 @@
       </p:grpSpPr>
       <p:sp>
         <p:nvSpPr>
-          <p:cNvPr id="3" name="Content Placeholder 2">
-            <a:extLst>
-              <a:ext uri="{FF2B5EF4-FFF2-40B4-BE49-F238E27FC236}">
-                <a16:creationId xmlns:a16="http://schemas.microsoft.com/office/drawing/2014/main" id="{FFB3E276-45A6-3182-E191-0D21CECBD5BF}"/>
+          <p:cNvPr id="9" name="Slide Number Placeholder 5">
+            <a:extLst>
+              <a:ext uri="{FF2B5EF4-FFF2-40B4-BE49-F238E27FC236}">
+                <a16:creationId xmlns:a16="http://schemas.microsoft.com/office/drawing/2014/main" id="{D40D9E9B-695B-7E25-3359-992FB8379BE0}"/>
               </a:ext>
             </a:extLst>
           </p:cNvPr>
@@ -5105,147 +3939,54 @@
             <a:spLocks noGrp="1"/>
           </p:cNvSpPr>
           <p:nvPr>
-            <p:ph sz="half" idx="1"/>
+            <p:ph type="sldNum" sz="quarter" idx="4"/>
           </p:nvPr>
         </p:nvSpPr>
         <p:spPr>
           <a:xfrm>
-            <a:off x="326590" y="1150070"/>
-            <a:ext cx="5693210" cy="5279010"/>
-          </a:xfrm>
-          <a:prstGeom prst="rect">
-            <a:avLst/>
-          </a:prstGeom>
-          <a:solidFill>
-            <a:srgbClr val="90D098"/>
-          </a:solidFill>
+            <a:off x="11484634" y="6650966"/>
+            <a:ext cx="370936" cy="207034"/>
+          </a:xfrm>
+          <a:prstGeom prst="rect">
+            <a:avLst/>
+          </a:prstGeom>
         </p:spPr>
         <p:txBody>
           <a:bodyPr/>
-          <a:lstStyle/>
-          <a:p>
-            <a:pPr lvl="0"/>
-            <a:r>
-              <a:rPr lang="en-US"/>
-              <a:t>Click to edit Master text styles</a:t>
-            </a:r>
-          </a:p>
-          <a:p>
-            <a:pPr lvl="1"/>
-            <a:r>
-              <a:rPr lang="en-US"/>
-              <a:t>Second level</a:t>
-            </a:r>
-          </a:p>
-          <a:p>
-            <a:pPr lvl="2"/>
-            <a:r>
-              <a:rPr lang="en-US"/>
-              <a:t>Third level</a:t>
-            </a:r>
-          </a:p>
-          <a:p>
-            <a:pPr lvl="3"/>
-            <a:r>
-              <a:rPr lang="en-US"/>
-              <a:t>Fourth level</a:t>
-            </a:r>
-          </a:p>
-          <a:p>
-            <a:pPr lvl="4"/>
-            <a:r>
-              <a:rPr lang="en-US"/>
-              <a:t>Fifth level</a:t>
-            </a:r>
-            <a:endParaRPr lang="en-GB" dirty="0"/>
-          </a:p>
-        </p:txBody>
-      </p:sp>
-      <p:sp>
-        <p:nvSpPr>
-          <p:cNvPr id="4" name="Content Placeholder 3">
-            <a:extLst>
-              <a:ext uri="{FF2B5EF4-FFF2-40B4-BE49-F238E27FC236}">
-                <a16:creationId xmlns:a16="http://schemas.microsoft.com/office/drawing/2014/main" id="{24DAC9F3-A161-D5C8-4EB3-26AE99A810B4}"/>
-              </a:ext>
-            </a:extLst>
-          </p:cNvPr>
-          <p:cNvSpPr>
-            <a:spLocks noGrp="1"/>
-          </p:cNvSpPr>
-          <p:nvPr>
-            <p:ph sz="half" idx="2"/>
-          </p:nvPr>
-        </p:nvSpPr>
-        <p:spPr>
-          <a:xfrm>
-            <a:off x="6172202" y="1150070"/>
-            <a:ext cx="5683368" cy="5279010"/>
-          </a:xfrm>
-          <a:prstGeom prst="rect">
-            <a:avLst/>
-          </a:prstGeom>
-          <a:solidFill>
-            <a:srgbClr val="93E3FF"/>
-          </a:solidFill>
-        </p:spPr>
-        <p:txBody>
-          <a:bodyPr/>
-          <a:lstStyle/>
-          <a:p>
-            <a:pPr lvl="0"/>
-            <a:r>
-              <a:rPr lang="en-US"/>
-              <a:t>Click to edit Master text styles</a:t>
-            </a:r>
-          </a:p>
-          <a:p>
-            <a:pPr lvl="1"/>
-            <a:r>
-              <a:rPr lang="en-US"/>
-              <a:t>Second level</a:t>
-            </a:r>
-          </a:p>
-          <a:p>
-            <a:pPr lvl="2"/>
-            <a:r>
-              <a:rPr lang="en-US"/>
-              <a:t>Third level</a:t>
-            </a:r>
-          </a:p>
-          <a:p>
-            <a:pPr lvl="3"/>
-            <a:r>
-              <a:rPr lang="en-US"/>
-              <a:t>Fourth level</a:t>
-            </a:r>
-          </a:p>
-          <a:p>
-            <a:pPr lvl="4"/>
-            <a:r>
-              <a:rPr lang="en-US"/>
-              <a:t>Fifth level</a:t>
-            </a:r>
-            <a:endParaRPr lang="en-GB" dirty="0"/>
-          </a:p>
-        </p:txBody>
-      </p:sp>
-      <p:sp>
-        <p:nvSpPr>
-          <p:cNvPr id="9" name="Rectangle 8">
-            <a:extLst>
-              <a:ext uri="{FF2B5EF4-FFF2-40B4-BE49-F238E27FC236}">
-                <a16:creationId xmlns:a16="http://schemas.microsoft.com/office/drawing/2014/main" id="{43E97568-94FD-F797-00D0-A204C8758D41}"/>
+          <a:lstStyle>
+            <a:lvl1pPr algn="r">
+              <a:defRPr sz="1000">
+                <a:solidFill>
+                  <a:schemeClr val="bg1"/>
+                </a:solidFill>
+              </a:defRPr>
+            </a:lvl1pPr>
+          </a:lstStyle>
+          <a:p>
+            <a:fld id="{7767393B-85A6-40C1-AB65-A74DA355DB56}" type="slidenum">
+              <a:rPr lang="en-GB" smtClean="0"/>
+              <a:t>‹#›</a:t>
+            </a:fld>
+            <a:endParaRPr lang="en-GB"/>
+          </a:p>
+        </p:txBody>
+      </p:sp>
+      <p:sp>
+        <p:nvSpPr>
+          <p:cNvPr id="2" name="Rectangle 1">
+            <a:extLst>
+              <a:ext uri="{FF2B5EF4-FFF2-40B4-BE49-F238E27FC236}">
+                <a16:creationId xmlns:a16="http://schemas.microsoft.com/office/drawing/2014/main" id="{2840CFFE-17F8-F107-DB82-0F90AA96BCAF}"/>
               </a:ext>
             </a:extLst>
           </p:cNvPr>
           <p:cNvSpPr/>
-          <p:nvPr/>
+          <p:nvPr userDrawn="1"/>
         </p:nvSpPr>
         <p:spPr>
           <a:xfrm>
             <a:off x="0" y="101176"/>
-            <a:ext cx="12191999" cy="827008"/>
+            <a:ext cx="12191999" cy="626793"/>
           </a:xfrm>
           <a:prstGeom prst="rect">
             <a:avLst/>
@@ -5284,10 +4025,10 @@
       </p:sp>
       <p:sp>
         <p:nvSpPr>
-          <p:cNvPr id="10" name="Title 1">
-            <a:extLst>
-              <a:ext uri="{FF2B5EF4-FFF2-40B4-BE49-F238E27FC236}">
-                <a16:creationId xmlns:a16="http://schemas.microsoft.com/office/drawing/2014/main" id="{D9F72F79-6B14-C5F0-EDC1-E3E0F8BCA436}"/>
+          <p:cNvPr id="3" name="Title 1">
+            <a:extLst>
+              <a:ext uri="{FF2B5EF4-FFF2-40B4-BE49-F238E27FC236}">
+                <a16:creationId xmlns:a16="http://schemas.microsoft.com/office/drawing/2014/main" id="{F784284F-4D91-6A88-EF4B-E2107692B7FF}"/>
               </a:ext>
             </a:extLst>
           </p:cNvPr>
@@ -5300,8 +4041,8 @@
         </p:nvSpPr>
         <p:spPr>
           <a:xfrm>
-            <a:off x="326590" y="101175"/>
-            <a:ext cx="10881880" cy="827009"/>
+            <a:off x="177800" y="101175"/>
+            <a:ext cx="11836400" cy="626793"/>
           </a:xfrm>
           <a:prstGeom prst="rect">
             <a:avLst/>
@@ -5325,1095 +4066,17 @@
           </a:lstStyle>
           <a:p>
             <a:r>
-              <a:rPr lang="en-US"/>
+              <a:rPr lang="en-US" dirty="0"/>
               <a:t>Click to edit Master title style</a:t>
             </a:r>
             <a:endParaRPr lang="en-GB" dirty="0"/>
           </a:p>
         </p:txBody>
       </p:sp>
-      <p:sp>
-        <p:nvSpPr>
-          <p:cNvPr id="12" name="Slide Number Placeholder 5">
-            <a:extLst>
-              <a:ext uri="{FF2B5EF4-FFF2-40B4-BE49-F238E27FC236}">
-                <a16:creationId xmlns:a16="http://schemas.microsoft.com/office/drawing/2014/main" id="{26D26384-FFA6-46A5-CD52-9800186C7F07}"/>
-              </a:ext>
-            </a:extLst>
-          </p:cNvPr>
-          <p:cNvSpPr>
-            <a:spLocks noGrp="1"/>
-          </p:cNvSpPr>
-          <p:nvPr>
-            <p:ph type="sldNum" sz="quarter" idx="4"/>
-          </p:nvPr>
-        </p:nvSpPr>
-        <p:spPr>
-          <a:xfrm>
-            <a:off x="11484634" y="6650966"/>
-            <a:ext cx="370936" cy="207034"/>
-          </a:xfrm>
-          <a:prstGeom prst="rect">
-            <a:avLst/>
-          </a:prstGeom>
-        </p:spPr>
-        <p:txBody>
-          <a:bodyPr/>
-          <a:lstStyle>
-            <a:lvl1pPr algn="r">
-              <a:defRPr sz="1000">
-                <a:solidFill>
-                  <a:schemeClr val="bg1"/>
-                </a:solidFill>
-              </a:defRPr>
-            </a:lvl1pPr>
-          </a:lstStyle>
-          <a:p>
-            <a:fld id="{7767393B-85A6-40C1-AB65-A74DA355DB56}" type="slidenum">
-              <a:rPr lang="en-GB" smtClean="0"/>
-              <a:pPr/>
-              <a:t>‹#›</a:t>
-            </a:fld>
-            <a:endParaRPr lang="en-GB"/>
-          </a:p>
-        </p:txBody>
-      </p:sp>
-      <p:sp>
-        <p:nvSpPr>
-          <p:cNvPr id="8" name="Parallelogram 7">
-            <a:extLst>
-              <a:ext uri="{FF2B5EF4-FFF2-40B4-BE49-F238E27FC236}">
-                <a16:creationId xmlns:a16="http://schemas.microsoft.com/office/drawing/2014/main" id="{618BE6D4-32A9-CFD0-42B7-4B6C09268313}"/>
-              </a:ext>
-            </a:extLst>
-          </p:cNvPr>
-          <p:cNvSpPr/>
-          <p:nvPr/>
-        </p:nvSpPr>
-        <p:spPr>
-          <a:xfrm>
-            <a:off x="11208471" y="159685"/>
-            <a:ext cx="848382" cy="709988"/>
-          </a:xfrm>
-          <a:prstGeom prst="parallelogram">
-            <a:avLst/>
-          </a:prstGeom>
-          <a:solidFill>
-            <a:srgbClr val="F4DB52"/>
-          </a:solidFill>
-          <a:ln>
-            <a:noFill/>
-          </a:ln>
-        </p:spPr>
-        <p:style>
-          <a:lnRef idx="2">
-            <a:schemeClr val="accent1">
-              <a:shade val="50000"/>
-            </a:schemeClr>
-          </a:lnRef>
-          <a:fillRef idx="1">
-            <a:schemeClr val="accent1"/>
-          </a:fillRef>
-          <a:effectRef idx="0">
-            <a:schemeClr val="accent1"/>
-          </a:effectRef>
-          <a:fontRef idx="minor">
-            <a:schemeClr val="lt1"/>
-          </a:fontRef>
-        </p:style>
-        <p:txBody>
-          <a:bodyPr rtlCol="0" anchor="ctr"/>
-          <a:lstStyle/>
-          <a:p>
-            <a:pPr algn="ctr"/>
-            <a:endParaRPr lang="en-GB"/>
-          </a:p>
-        </p:txBody>
-      </p:sp>
-      <p:pic>
-        <p:nvPicPr>
-          <p:cNvPr id="11" name="Graphic 10">
-            <a:extLst>
-              <a:ext uri="{FF2B5EF4-FFF2-40B4-BE49-F238E27FC236}">
-                <a16:creationId xmlns:a16="http://schemas.microsoft.com/office/drawing/2014/main" id="{4951A4F1-A570-0653-2E48-7C6806CF6C7B}"/>
-              </a:ext>
-            </a:extLst>
-          </p:cNvPr>
-          <p:cNvPicPr>
-            <a:picLocks noChangeAspect="1"/>
-          </p:cNvPicPr>
-          <p:nvPr/>
-        </p:nvPicPr>
-        <p:blipFill>
-          <a:blip r:embed="rId2">
-            <a:extLst>
-              <a:ext uri="{28A0092B-C50C-407E-A947-70E740481C1C}">
-                <a14:useLocalDpi xmlns:a14="http://schemas.microsoft.com/office/drawing/2010/main" val="0"/>
-              </a:ext>
-              <a:ext uri="{96DAC541-7B7A-43D3-8B79-37D633B846F1}">
-                <asvg:svgBlip xmlns:asvg="http://schemas.microsoft.com/office/drawing/2016/SVG/main" r:embed="rId3"/>
-              </a:ext>
-            </a:extLst>
-          </a:blip>
-          <a:stretch>
-            <a:fillRect/>
-          </a:stretch>
-        </p:blipFill>
-        <p:spPr>
-          <a:xfrm>
-            <a:off x="11419250" y="203307"/>
-            <a:ext cx="426823" cy="622742"/>
-          </a:xfrm>
-          <a:prstGeom prst="rect">
-            <a:avLst/>
-          </a:prstGeom>
-        </p:spPr>
-      </p:pic>
     </p:spTree>
     <p:extLst>
       <p:ext uri="{BB962C8B-B14F-4D97-AF65-F5344CB8AC3E}">
-        <p14:creationId xmlns:p14="http://schemas.microsoft.com/office/powerpoint/2010/main" val="3306355477"/>
-      </p:ext>
-    </p:extLst>
-  </p:cSld>
-  <p:clrMapOvr>
-    <a:masterClrMapping/>
-  </p:clrMapOvr>
-</p:sldLayout>
-</file>
-
-<file path=ppt/slideLayouts/slideLayout8.xml><?xml version="1.0" encoding="utf-8"?>
-<p:sldLayout xmlns:a="http://schemas.openxmlformats.org/drawingml/2006/main" xmlns:r="http://schemas.openxmlformats.org/officeDocument/2006/relationships" xmlns:p="http://schemas.openxmlformats.org/presentationml/2006/main" preserve="1">
-  <p:cSld name="Two Content - Yellow Light Blue">
-    <p:spTree>
-      <p:nvGrpSpPr>
-        <p:cNvPr id="1" name=""/>
-        <p:cNvGrpSpPr/>
-        <p:nvPr/>
-      </p:nvGrpSpPr>
-      <p:grpSpPr>
-        <a:xfrm>
-          <a:off x="0" y="0"/>
-          <a:ext cx="0" cy="0"/>
-          <a:chOff x="0" y="0"/>
-          <a:chExt cx="0" cy="0"/>
-        </a:xfrm>
-      </p:grpSpPr>
-      <p:sp>
-        <p:nvSpPr>
-          <p:cNvPr id="3" name="Content Placeholder 2">
-            <a:extLst>
-              <a:ext uri="{FF2B5EF4-FFF2-40B4-BE49-F238E27FC236}">
-                <a16:creationId xmlns:a16="http://schemas.microsoft.com/office/drawing/2014/main" id="{FFB3E276-45A6-3182-E191-0D21CECBD5BF}"/>
-              </a:ext>
-            </a:extLst>
-          </p:cNvPr>
-          <p:cNvSpPr>
-            <a:spLocks noGrp="1"/>
-          </p:cNvSpPr>
-          <p:nvPr>
-            <p:ph sz="half" idx="1"/>
-          </p:nvPr>
-        </p:nvSpPr>
-        <p:spPr>
-          <a:xfrm>
-            <a:off x="326590" y="1150070"/>
-            <a:ext cx="5693210" cy="5279010"/>
-          </a:xfrm>
-          <a:prstGeom prst="rect">
-            <a:avLst/>
-          </a:prstGeom>
-          <a:solidFill>
-            <a:srgbClr val="F8E992"/>
-          </a:solidFill>
-        </p:spPr>
-        <p:txBody>
-          <a:bodyPr/>
-          <a:lstStyle/>
-          <a:p>
-            <a:pPr lvl="0"/>
-            <a:r>
-              <a:rPr lang="en-US"/>
-              <a:t>Click to edit Master text styles</a:t>
-            </a:r>
-          </a:p>
-          <a:p>
-            <a:pPr lvl="1"/>
-            <a:r>
-              <a:rPr lang="en-US"/>
-              <a:t>Second level</a:t>
-            </a:r>
-          </a:p>
-          <a:p>
-            <a:pPr lvl="2"/>
-            <a:r>
-              <a:rPr lang="en-US"/>
-              <a:t>Third level</a:t>
-            </a:r>
-          </a:p>
-          <a:p>
-            <a:pPr lvl="3"/>
-            <a:r>
-              <a:rPr lang="en-US"/>
-              <a:t>Fourth level</a:t>
-            </a:r>
-          </a:p>
-          <a:p>
-            <a:pPr lvl="4"/>
-            <a:r>
-              <a:rPr lang="en-US"/>
-              <a:t>Fifth level</a:t>
-            </a:r>
-            <a:endParaRPr lang="en-GB"/>
-          </a:p>
-        </p:txBody>
-      </p:sp>
-      <p:sp>
-        <p:nvSpPr>
-          <p:cNvPr id="4" name="Content Placeholder 3">
-            <a:extLst>
-              <a:ext uri="{FF2B5EF4-FFF2-40B4-BE49-F238E27FC236}">
-                <a16:creationId xmlns:a16="http://schemas.microsoft.com/office/drawing/2014/main" id="{24DAC9F3-A161-D5C8-4EB3-26AE99A810B4}"/>
-              </a:ext>
-            </a:extLst>
-          </p:cNvPr>
-          <p:cNvSpPr>
-            <a:spLocks noGrp="1"/>
-          </p:cNvSpPr>
-          <p:nvPr>
-            <p:ph sz="half" idx="2"/>
-          </p:nvPr>
-        </p:nvSpPr>
-        <p:spPr>
-          <a:xfrm>
-            <a:off x="6172202" y="1150070"/>
-            <a:ext cx="5683368" cy="5279010"/>
-          </a:xfrm>
-          <a:prstGeom prst="rect">
-            <a:avLst/>
-          </a:prstGeom>
-          <a:solidFill>
-            <a:srgbClr val="93E3FF"/>
-          </a:solidFill>
-        </p:spPr>
-        <p:txBody>
-          <a:bodyPr/>
-          <a:lstStyle/>
-          <a:p>
-            <a:pPr lvl="0"/>
-            <a:r>
-              <a:rPr lang="en-US"/>
-              <a:t>Click to edit Master text styles</a:t>
-            </a:r>
-          </a:p>
-          <a:p>
-            <a:pPr lvl="1"/>
-            <a:r>
-              <a:rPr lang="en-US"/>
-              <a:t>Second level</a:t>
-            </a:r>
-          </a:p>
-          <a:p>
-            <a:pPr lvl="2"/>
-            <a:r>
-              <a:rPr lang="en-US"/>
-              <a:t>Third level</a:t>
-            </a:r>
-          </a:p>
-          <a:p>
-            <a:pPr lvl="3"/>
-            <a:r>
-              <a:rPr lang="en-US"/>
-              <a:t>Fourth level</a:t>
-            </a:r>
-          </a:p>
-          <a:p>
-            <a:pPr lvl="4"/>
-            <a:r>
-              <a:rPr lang="en-US"/>
-              <a:t>Fifth level</a:t>
-            </a:r>
-            <a:endParaRPr lang="en-GB"/>
-          </a:p>
-        </p:txBody>
-      </p:sp>
-      <p:sp>
-        <p:nvSpPr>
-          <p:cNvPr id="9" name="Rectangle 8">
-            <a:extLst>
-              <a:ext uri="{FF2B5EF4-FFF2-40B4-BE49-F238E27FC236}">
-                <a16:creationId xmlns:a16="http://schemas.microsoft.com/office/drawing/2014/main" id="{43E97568-94FD-F797-00D0-A204C8758D41}"/>
-              </a:ext>
-            </a:extLst>
-          </p:cNvPr>
-          <p:cNvSpPr/>
-          <p:nvPr/>
-        </p:nvSpPr>
-        <p:spPr>
-          <a:xfrm>
-            <a:off x="0" y="101176"/>
-            <a:ext cx="12191999" cy="827008"/>
-          </a:xfrm>
-          <a:prstGeom prst="rect">
-            <a:avLst/>
-          </a:prstGeom>
-          <a:solidFill>
-            <a:srgbClr val="245391"/>
-          </a:solidFill>
-          <a:ln>
-            <a:noFill/>
-          </a:ln>
-        </p:spPr>
-        <p:style>
-          <a:lnRef idx="2">
-            <a:schemeClr val="accent1">
-              <a:shade val="50000"/>
-            </a:schemeClr>
-          </a:lnRef>
-          <a:fillRef idx="1">
-            <a:schemeClr val="accent1"/>
-          </a:fillRef>
-          <a:effectRef idx="0">
-            <a:schemeClr val="accent1"/>
-          </a:effectRef>
-          <a:fontRef idx="minor">
-            <a:schemeClr val="lt1"/>
-          </a:fontRef>
-        </p:style>
-        <p:txBody>
-          <a:bodyPr rtlCol="0" anchor="ctr"/>
-          <a:lstStyle/>
-          <a:p>
-            <a:pPr algn="ctr"/>
-            <a:endParaRPr lang="en-GB"/>
-          </a:p>
-        </p:txBody>
-      </p:sp>
-      <p:sp>
-        <p:nvSpPr>
-          <p:cNvPr id="10" name="Title 1">
-            <a:extLst>
-              <a:ext uri="{FF2B5EF4-FFF2-40B4-BE49-F238E27FC236}">
-                <a16:creationId xmlns:a16="http://schemas.microsoft.com/office/drawing/2014/main" id="{D9F72F79-6B14-C5F0-EDC1-E3E0F8BCA436}"/>
-              </a:ext>
-            </a:extLst>
-          </p:cNvPr>
-          <p:cNvSpPr>
-            <a:spLocks noGrp="1"/>
-          </p:cNvSpPr>
-          <p:nvPr>
-            <p:ph type="title"/>
-          </p:nvPr>
-        </p:nvSpPr>
-        <p:spPr>
-          <a:xfrm>
-            <a:off x="326590" y="101175"/>
-            <a:ext cx="10881880" cy="827009"/>
-          </a:xfrm>
-          <a:prstGeom prst="rect">
-            <a:avLst/>
-          </a:prstGeom>
-          <a:solidFill>
-            <a:srgbClr val="245391"/>
-          </a:solidFill>
-        </p:spPr>
-        <p:txBody>
-          <a:bodyPr>
-            <a:normAutofit/>
-          </a:bodyPr>
-          <a:lstStyle>
-            <a:lvl1pPr marL="0" indent="0">
-              <a:defRPr sz="3200" b="1">
-                <a:solidFill>
-                  <a:schemeClr val="bg1"/>
-                </a:solidFill>
-              </a:defRPr>
-            </a:lvl1pPr>
-          </a:lstStyle>
-          <a:p>
-            <a:r>
-              <a:rPr lang="en-US"/>
-              <a:t>Click to edit Master title style</a:t>
-            </a:r>
-            <a:endParaRPr lang="en-GB" dirty="0"/>
-          </a:p>
-        </p:txBody>
-      </p:sp>
-      <p:sp>
-        <p:nvSpPr>
-          <p:cNvPr id="12" name="Slide Number Placeholder 5">
-            <a:extLst>
-              <a:ext uri="{FF2B5EF4-FFF2-40B4-BE49-F238E27FC236}">
-                <a16:creationId xmlns:a16="http://schemas.microsoft.com/office/drawing/2014/main" id="{26D26384-FFA6-46A5-CD52-9800186C7F07}"/>
-              </a:ext>
-            </a:extLst>
-          </p:cNvPr>
-          <p:cNvSpPr>
-            <a:spLocks noGrp="1"/>
-          </p:cNvSpPr>
-          <p:nvPr>
-            <p:ph type="sldNum" sz="quarter" idx="4"/>
-          </p:nvPr>
-        </p:nvSpPr>
-        <p:spPr>
-          <a:xfrm>
-            <a:off x="11484634" y="6650966"/>
-            <a:ext cx="370936" cy="207034"/>
-          </a:xfrm>
-          <a:prstGeom prst="rect">
-            <a:avLst/>
-          </a:prstGeom>
-        </p:spPr>
-        <p:txBody>
-          <a:bodyPr/>
-          <a:lstStyle>
-            <a:lvl1pPr algn="r">
-              <a:defRPr sz="1000">
-                <a:solidFill>
-                  <a:schemeClr val="bg1"/>
-                </a:solidFill>
-              </a:defRPr>
-            </a:lvl1pPr>
-          </a:lstStyle>
-          <a:p>
-            <a:fld id="{7767393B-85A6-40C1-AB65-A74DA355DB56}" type="slidenum">
-              <a:rPr lang="en-GB" smtClean="0"/>
-              <a:pPr/>
-              <a:t>‹#›</a:t>
-            </a:fld>
-            <a:endParaRPr lang="en-GB"/>
-          </a:p>
-        </p:txBody>
-      </p:sp>
-      <p:sp>
-        <p:nvSpPr>
-          <p:cNvPr id="8" name="Parallelogram 7">
-            <a:extLst>
-              <a:ext uri="{FF2B5EF4-FFF2-40B4-BE49-F238E27FC236}">
-                <a16:creationId xmlns:a16="http://schemas.microsoft.com/office/drawing/2014/main" id="{82DA5731-8A5B-69D6-3C61-E5683620AAE5}"/>
-              </a:ext>
-            </a:extLst>
-          </p:cNvPr>
-          <p:cNvSpPr/>
-          <p:nvPr/>
-        </p:nvSpPr>
-        <p:spPr>
-          <a:xfrm>
-            <a:off x="11208471" y="159685"/>
-            <a:ext cx="848382" cy="709988"/>
-          </a:xfrm>
-          <a:prstGeom prst="parallelogram">
-            <a:avLst/>
-          </a:prstGeom>
-          <a:solidFill>
-            <a:srgbClr val="F4DB52"/>
-          </a:solidFill>
-          <a:ln>
-            <a:noFill/>
-          </a:ln>
-        </p:spPr>
-        <p:style>
-          <a:lnRef idx="2">
-            <a:schemeClr val="accent1">
-              <a:shade val="50000"/>
-            </a:schemeClr>
-          </a:lnRef>
-          <a:fillRef idx="1">
-            <a:schemeClr val="accent1"/>
-          </a:fillRef>
-          <a:effectRef idx="0">
-            <a:schemeClr val="accent1"/>
-          </a:effectRef>
-          <a:fontRef idx="minor">
-            <a:schemeClr val="lt1"/>
-          </a:fontRef>
-        </p:style>
-        <p:txBody>
-          <a:bodyPr rtlCol="0" anchor="ctr"/>
-          <a:lstStyle/>
-          <a:p>
-            <a:pPr algn="ctr"/>
-            <a:endParaRPr lang="en-GB"/>
-          </a:p>
-        </p:txBody>
-      </p:sp>
-      <p:pic>
-        <p:nvPicPr>
-          <p:cNvPr id="11" name="Graphic 10">
-            <a:extLst>
-              <a:ext uri="{FF2B5EF4-FFF2-40B4-BE49-F238E27FC236}">
-                <a16:creationId xmlns:a16="http://schemas.microsoft.com/office/drawing/2014/main" id="{1FCA787E-B59B-AC95-10A3-295C6F4C534D}"/>
-              </a:ext>
-            </a:extLst>
-          </p:cNvPr>
-          <p:cNvPicPr>
-            <a:picLocks noChangeAspect="1"/>
-          </p:cNvPicPr>
-          <p:nvPr/>
-        </p:nvPicPr>
-        <p:blipFill>
-          <a:blip r:embed="rId2">
-            <a:extLst>
-              <a:ext uri="{28A0092B-C50C-407E-A947-70E740481C1C}">
-                <a14:useLocalDpi xmlns:a14="http://schemas.microsoft.com/office/drawing/2010/main" val="0"/>
-              </a:ext>
-              <a:ext uri="{96DAC541-7B7A-43D3-8B79-37D633B846F1}">
-                <asvg:svgBlip xmlns:asvg="http://schemas.microsoft.com/office/drawing/2016/SVG/main" r:embed="rId3"/>
-              </a:ext>
-            </a:extLst>
-          </a:blip>
-          <a:stretch>
-            <a:fillRect/>
-          </a:stretch>
-        </p:blipFill>
-        <p:spPr>
-          <a:xfrm>
-            <a:off x="11419250" y="203307"/>
-            <a:ext cx="426823" cy="622742"/>
-          </a:xfrm>
-          <a:prstGeom prst="rect">
-            <a:avLst/>
-          </a:prstGeom>
-        </p:spPr>
-      </p:pic>
-    </p:spTree>
-    <p:extLst>
-      <p:ext uri="{BB962C8B-B14F-4D97-AF65-F5344CB8AC3E}">
-        <p14:creationId xmlns:p14="http://schemas.microsoft.com/office/powerpoint/2010/main" val="430681399"/>
-      </p:ext>
-    </p:extLst>
-  </p:cSld>
-  <p:clrMapOvr>
-    <a:masterClrMapping/>
-  </p:clrMapOvr>
-</p:sldLayout>
-</file>
-
-<file path=ppt/slideLayouts/slideLayout9.xml><?xml version="1.0" encoding="utf-8"?>
-<p:sldLayout xmlns:a="http://schemas.openxmlformats.org/drawingml/2006/main" xmlns:r="http://schemas.openxmlformats.org/officeDocument/2006/relationships" xmlns:p="http://schemas.openxmlformats.org/presentationml/2006/main" preserve="1">
-  <p:cSld name="Comparison - Light Blue Sub-Header">
-    <p:spTree>
-      <p:nvGrpSpPr>
-        <p:cNvPr id="1" name=""/>
-        <p:cNvGrpSpPr/>
-        <p:nvPr/>
-      </p:nvGrpSpPr>
-      <p:grpSpPr>
-        <a:xfrm>
-          <a:off x="0" y="0"/>
-          <a:ext cx="0" cy="0"/>
-          <a:chOff x="0" y="0"/>
-          <a:chExt cx="0" cy="0"/>
-        </a:xfrm>
-      </p:grpSpPr>
-      <p:sp>
-        <p:nvSpPr>
-          <p:cNvPr id="3" name="Text Placeholder 2">
-            <a:extLst>
-              <a:ext uri="{FF2B5EF4-FFF2-40B4-BE49-F238E27FC236}">
-                <a16:creationId xmlns:a16="http://schemas.microsoft.com/office/drawing/2014/main" id="{A7EE70C0-0004-DA5B-411C-22A2E3426F32}"/>
-              </a:ext>
-            </a:extLst>
-          </p:cNvPr>
-          <p:cNvSpPr>
-            <a:spLocks noGrp="1"/>
-          </p:cNvSpPr>
-          <p:nvPr>
-            <p:ph type="body" idx="1"/>
-          </p:nvPr>
-        </p:nvSpPr>
-        <p:spPr>
-          <a:xfrm>
-            <a:off x="326590" y="1150069"/>
-            <a:ext cx="5693210" cy="659877"/>
-          </a:xfrm>
-          <a:prstGeom prst="rect">
-            <a:avLst/>
-          </a:prstGeom>
-          <a:solidFill>
-            <a:srgbClr val="00A1D7"/>
-          </a:solidFill>
-        </p:spPr>
-        <p:txBody>
-          <a:bodyPr anchor="b"/>
-          <a:lstStyle>
-            <a:lvl1pPr marL="0" indent="0">
-              <a:buNone/>
-              <a:defRPr sz="2800" b="1">
-                <a:solidFill>
-                  <a:schemeClr val="bg1"/>
-                </a:solidFill>
-              </a:defRPr>
-            </a:lvl1pPr>
-            <a:lvl2pPr marL="457200" indent="0">
-              <a:buNone/>
-              <a:defRPr sz="2000" b="1"/>
-            </a:lvl2pPr>
-            <a:lvl3pPr marL="914400" indent="0">
-              <a:buNone/>
-              <a:defRPr sz="1800" b="1"/>
-            </a:lvl3pPr>
-            <a:lvl4pPr marL="1371600" indent="0">
-              <a:buNone/>
-              <a:defRPr sz="1600" b="1"/>
-            </a:lvl4pPr>
-            <a:lvl5pPr marL="1828800" indent="0">
-              <a:buNone/>
-              <a:defRPr sz="1600" b="1"/>
-            </a:lvl5pPr>
-            <a:lvl6pPr marL="2286000" indent="0">
-              <a:buNone/>
-              <a:defRPr sz="1600" b="1"/>
-            </a:lvl6pPr>
-            <a:lvl7pPr marL="2743200" indent="0">
-              <a:buNone/>
-              <a:defRPr sz="1600" b="1"/>
-            </a:lvl7pPr>
-            <a:lvl8pPr marL="3200400" indent="0">
-              <a:buNone/>
-              <a:defRPr sz="1600" b="1"/>
-            </a:lvl8pPr>
-            <a:lvl9pPr marL="3657600" indent="0">
-              <a:buNone/>
-              <a:defRPr sz="1600" b="1"/>
-            </a:lvl9pPr>
-          </a:lstStyle>
-          <a:p>
-            <a:pPr lvl="0"/>
-            <a:r>
-              <a:rPr lang="en-US"/>
-              <a:t>Click to edit Master text styles</a:t>
-            </a:r>
-          </a:p>
-        </p:txBody>
-      </p:sp>
-      <p:sp>
-        <p:nvSpPr>
-          <p:cNvPr id="4" name="Content Placeholder 3">
-            <a:extLst>
-              <a:ext uri="{FF2B5EF4-FFF2-40B4-BE49-F238E27FC236}">
-                <a16:creationId xmlns:a16="http://schemas.microsoft.com/office/drawing/2014/main" id="{433E7C9F-2EEC-6475-AE93-1246752B2204}"/>
-              </a:ext>
-            </a:extLst>
-          </p:cNvPr>
-          <p:cNvSpPr>
-            <a:spLocks noGrp="1"/>
-          </p:cNvSpPr>
-          <p:nvPr>
-            <p:ph sz="half" idx="2"/>
-          </p:nvPr>
-        </p:nvSpPr>
-        <p:spPr>
-          <a:xfrm>
-            <a:off x="326590" y="1809946"/>
-            <a:ext cx="5693210" cy="4619134"/>
-          </a:xfrm>
-          <a:prstGeom prst="rect">
-            <a:avLst/>
-          </a:prstGeom>
-        </p:spPr>
-        <p:txBody>
-          <a:bodyPr/>
-          <a:lstStyle/>
-          <a:p>
-            <a:pPr lvl="0"/>
-            <a:r>
-              <a:rPr lang="en-US"/>
-              <a:t>Click to edit Master text styles</a:t>
-            </a:r>
-          </a:p>
-          <a:p>
-            <a:pPr lvl="1"/>
-            <a:r>
-              <a:rPr lang="en-US"/>
-              <a:t>Second level</a:t>
-            </a:r>
-          </a:p>
-          <a:p>
-            <a:pPr lvl="2"/>
-            <a:r>
-              <a:rPr lang="en-US"/>
-              <a:t>Third level</a:t>
-            </a:r>
-          </a:p>
-          <a:p>
-            <a:pPr lvl="3"/>
-            <a:r>
-              <a:rPr lang="en-US"/>
-              <a:t>Fourth level</a:t>
-            </a:r>
-          </a:p>
-          <a:p>
-            <a:pPr lvl="4"/>
-            <a:r>
-              <a:rPr lang="en-US"/>
-              <a:t>Fifth level</a:t>
-            </a:r>
-            <a:endParaRPr lang="en-GB" dirty="0"/>
-          </a:p>
-        </p:txBody>
-      </p:sp>
-      <p:sp>
-        <p:nvSpPr>
-          <p:cNvPr id="5" name="Text Placeholder 4">
-            <a:extLst>
-              <a:ext uri="{FF2B5EF4-FFF2-40B4-BE49-F238E27FC236}">
-                <a16:creationId xmlns:a16="http://schemas.microsoft.com/office/drawing/2014/main" id="{6581B006-631F-4BB6-7AFB-4D358EC005E0}"/>
-              </a:ext>
-            </a:extLst>
-          </p:cNvPr>
-          <p:cNvSpPr>
-            <a:spLocks noGrp="1"/>
-          </p:cNvSpPr>
-          <p:nvPr>
-            <p:ph type="body" sz="quarter" idx="3"/>
-          </p:nvPr>
-        </p:nvSpPr>
-        <p:spPr>
-          <a:xfrm>
-            <a:off x="6172199" y="1150069"/>
-            <a:ext cx="5683371" cy="659877"/>
-          </a:xfrm>
-          <a:prstGeom prst="rect">
-            <a:avLst/>
-          </a:prstGeom>
-          <a:solidFill>
-            <a:srgbClr val="00A1D7"/>
-          </a:solidFill>
-        </p:spPr>
-        <p:txBody>
-          <a:bodyPr vert="horz" lIns="91440" tIns="45720" rIns="91440" bIns="45720" rtlCol="0" anchor="b">
-            <a:normAutofit/>
-          </a:bodyPr>
-          <a:lstStyle>
-            <a:lvl1pPr>
-              <a:defRPr lang="en-US" b="1" dirty="0">
-                <a:solidFill>
-                  <a:schemeClr val="bg1"/>
-                </a:solidFill>
-              </a:defRPr>
-            </a:lvl1pPr>
-          </a:lstStyle>
-          <a:p>
-            <a:pPr marL="0" lvl="0" indent="0">
-              <a:buNone/>
-            </a:pPr>
-            <a:r>
-              <a:rPr lang="en-US"/>
-              <a:t>Click to edit Master text styles</a:t>
-            </a:r>
-          </a:p>
-        </p:txBody>
-      </p:sp>
-      <p:sp>
-        <p:nvSpPr>
-          <p:cNvPr id="6" name="Content Placeholder 5">
-            <a:extLst>
-              <a:ext uri="{FF2B5EF4-FFF2-40B4-BE49-F238E27FC236}">
-                <a16:creationId xmlns:a16="http://schemas.microsoft.com/office/drawing/2014/main" id="{4D14FAB4-C3D5-5802-AC62-3F1B0FEE0444}"/>
-              </a:ext>
-            </a:extLst>
-          </p:cNvPr>
-          <p:cNvSpPr>
-            <a:spLocks noGrp="1"/>
-          </p:cNvSpPr>
-          <p:nvPr>
-            <p:ph sz="quarter" idx="4"/>
-          </p:nvPr>
-        </p:nvSpPr>
-        <p:spPr>
-          <a:xfrm>
-            <a:off x="6172199" y="1809946"/>
-            <a:ext cx="5673525" cy="4619134"/>
-          </a:xfrm>
-          <a:prstGeom prst="rect">
-            <a:avLst/>
-          </a:prstGeom>
-        </p:spPr>
-        <p:txBody>
-          <a:bodyPr/>
-          <a:lstStyle/>
-          <a:p>
-            <a:pPr lvl="0"/>
-            <a:r>
-              <a:rPr lang="en-US"/>
-              <a:t>Click to edit Master text styles</a:t>
-            </a:r>
-          </a:p>
-          <a:p>
-            <a:pPr lvl="1"/>
-            <a:r>
-              <a:rPr lang="en-US"/>
-              <a:t>Second level</a:t>
-            </a:r>
-          </a:p>
-          <a:p>
-            <a:pPr lvl="2"/>
-            <a:r>
-              <a:rPr lang="en-US"/>
-              <a:t>Third level</a:t>
-            </a:r>
-          </a:p>
-          <a:p>
-            <a:pPr lvl="3"/>
-            <a:r>
-              <a:rPr lang="en-US"/>
-              <a:t>Fourth level</a:t>
-            </a:r>
-          </a:p>
-          <a:p>
-            <a:pPr lvl="4"/>
-            <a:r>
-              <a:rPr lang="en-US"/>
-              <a:t>Fifth level</a:t>
-            </a:r>
-            <a:endParaRPr lang="en-GB"/>
-          </a:p>
-        </p:txBody>
-      </p:sp>
-      <p:sp>
-        <p:nvSpPr>
-          <p:cNvPr id="11" name="Rectangle 10">
-            <a:extLst>
-              <a:ext uri="{FF2B5EF4-FFF2-40B4-BE49-F238E27FC236}">
-                <a16:creationId xmlns:a16="http://schemas.microsoft.com/office/drawing/2014/main" id="{EBB802B9-F88A-543F-655F-6F4D0B19FEA3}"/>
-              </a:ext>
-            </a:extLst>
-          </p:cNvPr>
-          <p:cNvSpPr/>
-          <p:nvPr/>
-        </p:nvSpPr>
-        <p:spPr>
-          <a:xfrm>
-            <a:off x="0" y="101176"/>
-            <a:ext cx="12191999" cy="827008"/>
-          </a:xfrm>
-          <a:prstGeom prst="rect">
-            <a:avLst/>
-          </a:prstGeom>
-          <a:solidFill>
-            <a:srgbClr val="245391"/>
-          </a:solidFill>
-          <a:ln>
-            <a:noFill/>
-          </a:ln>
-        </p:spPr>
-        <p:style>
-          <a:lnRef idx="2">
-            <a:schemeClr val="accent1">
-              <a:shade val="50000"/>
-            </a:schemeClr>
-          </a:lnRef>
-          <a:fillRef idx="1">
-            <a:schemeClr val="accent1"/>
-          </a:fillRef>
-          <a:effectRef idx="0">
-            <a:schemeClr val="accent1"/>
-          </a:effectRef>
-          <a:fontRef idx="minor">
-            <a:schemeClr val="lt1"/>
-          </a:fontRef>
-        </p:style>
-        <p:txBody>
-          <a:bodyPr rtlCol="0" anchor="ctr"/>
-          <a:lstStyle/>
-          <a:p>
-            <a:pPr algn="ctr"/>
-            <a:endParaRPr lang="en-GB"/>
-          </a:p>
-        </p:txBody>
-      </p:sp>
-      <p:sp>
-        <p:nvSpPr>
-          <p:cNvPr id="12" name="Title 1">
-            <a:extLst>
-              <a:ext uri="{FF2B5EF4-FFF2-40B4-BE49-F238E27FC236}">
-                <a16:creationId xmlns:a16="http://schemas.microsoft.com/office/drawing/2014/main" id="{661E29F3-04F3-2EEC-DB5E-CE1144A482CA}"/>
-              </a:ext>
-            </a:extLst>
-          </p:cNvPr>
-          <p:cNvSpPr>
-            <a:spLocks noGrp="1"/>
-          </p:cNvSpPr>
-          <p:nvPr>
-            <p:ph type="title"/>
-          </p:nvPr>
-        </p:nvSpPr>
-        <p:spPr>
-          <a:xfrm>
-            <a:off x="326590" y="101175"/>
-            <a:ext cx="10881880" cy="827009"/>
-          </a:xfrm>
-          <a:prstGeom prst="rect">
-            <a:avLst/>
-          </a:prstGeom>
-          <a:solidFill>
-            <a:srgbClr val="245391"/>
-          </a:solidFill>
-        </p:spPr>
-        <p:txBody>
-          <a:bodyPr>
-            <a:normAutofit/>
-          </a:bodyPr>
-          <a:lstStyle>
-            <a:lvl1pPr marL="0" indent="0">
-              <a:defRPr sz="3200" b="1">
-                <a:solidFill>
-                  <a:schemeClr val="bg1"/>
-                </a:solidFill>
-              </a:defRPr>
-            </a:lvl1pPr>
-          </a:lstStyle>
-          <a:p>
-            <a:r>
-              <a:rPr lang="en-US"/>
-              <a:t>Click to edit Master title style</a:t>
-            </a:r>
-            <a:endParaRPr lang="en-GB" dirty="0"/>
-          </a:p>
-        </p:txBody>
-      </p:sp>
-      <p:sp>
-        <p:nvSpPr>
-          <p:cNvPr id="13" name="Slide Number Placeholder 5">
-            <a:extLst>
-              <a:ext uri="{FF2B5EF4-FFF2-40B4-BE49-F238E27FC236}">
-                <a16:creationId xmlns:a16="http://schemas.microsoft.com/office/drawing/2014/main" id="{B0D63A05-1B5F-F916-3C25-1C57B251A0A9}"/>
-              </a:ext>
-            </a:extLst>
-          </p:cNvPr>
-          <p:cNvSpPr>
-            <a:spLocks noGrp="1"/>
-          </p:cNvSpPr>
-          <p:nvPr>
-            <p:ph type="sldNum" sz="quarter" idx="10"/>
-          </p:nvPr>
-        </p:nvSpPr>
-        <p:spPr>
-          <a:xfrm>
-            <a:off x="11484634" y="6650966"/>
-            <a:ext cx="370936" cy="207034"/>
-          </a:xfrm>
-          <a:prstGeom prst="rect">
-            <a:avLst/>
-          </a:prstGeom>
-        </p:spPr>
-        <p:txBody>
-          <a:bodyPr/>
-          <a:lstStyle>
-            <a:lvl1pPr algn="r">
-              <a:defRPr sz="1000">
-                <a:solidFill>
-                  <a:schemeClr val="bg1"/>
-                </a:solidFill>
-              </a:defRPr>
-            </a:lvl1pPr>
-          </a:lstStyle>
-          <a:p>
-            <a:fld id="{7767393B-85A6-40C1-AB65-A74DA355DB56}" type="slidenum">
-              <a:rPr lang="en-GB" smtClean="0"/>
-              <a:pPr/>
-              <a:t>‹#›</a:t>
-            </a:fld>
-            <a:endParaRPr lang="en-GB"/>
-          </a:p>
-        </p:txBody>
-      </p:sp>
-      <p:sp>
-        <p:nvSpPr>
-          <p:cNvPr id="10" name="Parallelogram 9">
-            <a:extLst>
-              <a:ext uri="{FF2B5EF4-FFF2-40B4-BE49-F238E27FC236}">
-                <a16:creationId xmlns:a16="http://schemas.microsoft.com/office/drawing/2014/main" id="{A8BEBF3B-172E-2413-9A25-866F82E4CB89}"/>
-              </a:ext>
-            </a:extLst>
-          </p:cNvPr>
-          <p:cNvSpPr/>
-          <p:nvPr/>
-        </p:nvSpPr>
-        <p:spPr>
-          <a:xfrm>
-            <a:off x="11208471" y="159685"/>
-            <a:ext cx="848382" cy="709988"/>
-          </a:xfrm>
-          <a:prstGeom prst="parallelogram">
-            <a:avLst/>
-          </a:prstGeom>
-          <a:solidFill>
-            <a:srgbClr val="F4DB52"/>
-          </a:solidFill>
-          <a:ln>
-            <a:noFill/>
-          </a:ln>
-        </p:spPr>
-        <p:style>
-          <a:lnRef idx="2">
-            <a:schemeClr val="accent1">
-              <a:shade val="50000"/>
-            </a:schemeClr>
-          </a:lnRef>
-          <a:fillRef idx="1">
-            <a:schemeClr val="accent1"/>
-          </a:fillRef>
-          <a:effectRef idx="0">
-            <a:schemeClr val="accent1"/>
-          </a:effectRef>
-          <a:fontRef idx="minor">
-            <a:schemeClr val="lt1"/>
-          </a:fontRef>
-        </p:style>
-        <p:txBody>
-          <a:bodyPr rtlCol="0" anchor="ctr"/>
-          <a:lstStyle/>
-          <a:p>
-            <a:pPr algn="ctr"/>
-            <a:endParaRPr lang="en-GB"/>
-          </a:p>
-        </p:txBody>
-      </p:sp>
-      <p:pic>
-        <p:nvPicPr>
-          <p:cNvPr id="14" name="Graphic 13">
-            <a:extLst>
-              <a:ext uri="{FF2B5EF4-FFF2-40B4-BE49-F238E27FC236}">
-                <a16:creationId xmlns:a16="http://schemas.microsoft.com/office/drawing/2014/main" id="{B21F8D27-112C-1D59-B934-D55D42264835}"/>
-              </a:ext>
-            </a:extLst>
-          </p:cNvPr>
-          <p:cNvPicPr>
-            <a:picLocks noChangeAspect="1"/>
-          </p:cNvPicPr>
-          <p:nvPr/>
-        </p:nvPicPr>
-        <p:blipFill>
-          <a:blip r:embed="rId2">
-            <a:extLst>
-              <a:ext uri="{28A0092B-C50C-407E-A947-70E740481C1C}">
-                <a14:useLocalDpi xmlns:a14="http://schemas.microsoft.com/office/drawing/2010/main" val="0"/>
-              </a:ext>
-              <a:ext uri="{96DAC541-7B7A-43D3-8B79-37D633B846F1}">
-                <asvg:svgBlip xmlns:asvg="http://schemas.microsoft.com/office/drawing/2016/SVG/main" r:embed="rId3"/>
-              </a:ext>
-            </a:extLst>
-          </a:blip>
-          <a:stretch>
-            <a:fillRect/>
-          </a:stretch>
-        </p:blipFill>
-        <p:spPr>
-          <a:xfrm>
-            <a:off x="11419250" y="203307"/>
-            <a:ext cx="426823" cy="622742"/>
-          </a:xfrm>
-          <a:prstGeom prst="rect">
-            <a:avLst/>
-          </a:prstGeom>
-        </p:spPr>
-      </p:pic>
-    </p:spTree>
-    <p:extLst>
-      <p:ext uri="{BB962C8B-B14F-4D97-AF65-F5344CB8AC3E}">
-        <p14:creationId xmlns:p14="http://schemas.microsoft.com/office/powerpoint/2010/main" val="49639326"/>
+        <p14:creationId xmlns:p14="http://schemas.microsoft.com/office/powerpoint/2010/main" val="315990423"/>
       </p:ext>
     </p:extLst>
   </p:cSld>
@@ -6769,16 +4432,12 @@
     <p:sldLayoutId id="2147483664" r:id="rId4"/>
     <p:sldLayoutId id="2147483665" r:id="rId5"/>
     <p:sldLayoutId id="2147483666" r:id="rId6"/>
-    <p:sldLayoutId id="2147483667" r:id="rId7"/>
-    <p:sldLayoutId id="2147483668" r:id="rId8"/>
-    <p:sldLayoutId id="2147483669" r:id="rId9"/>
-    <p:sldLayoutId id="2147483670" r:id="rId10"/>
-    <p:sldLayoutId id="2147483671" r:id="rId11"/>
-    <p:sldLayoutId id="2147483672" r:id="rId12"/>
-    <p:sldLayoutId id="2147483673" r:id="rId13"/>
-    <p:sldLayoutId id="2147483674" r:id="rId14"/>
-    <p:sldLayoutId id="2147483675" r:id="rId15"/>
-    <p:sldLayoutId id="2147483676" r:id="rId16"/>
+    <p:sldLayoutId id="2147483669" r:id="rId7"/>
+    <p:sldLayoutId id="2147483672" r:id="rId8"/>
+    <p:sldLayoutId id="2147483673" r:id="rId9"/>
+    <p:sldLayoutId id="2147483674" r:id="rId10"/>
+    <p:sldLayoutId id="2147483675" r:id="rId11"/>
+    <p:sldLayoutId id="2147483676" r:id="rId12"/>
   </p:sldLayoutIdLst>
   <p:txStyles>
     <p:titleStyle>

</xml_diff>

<commit_message>
updated seee template, removed templates for other schools
</commit_message>
<xml_diff>
--- a/Slides/Schools Snapshot/AssessmentOverview_SEEE_202306.pptx
+++ b/Slides/Schools Snapshot/AssessmentOverview_SEEE_202306.pptx
@@ -4,13 +4,17 @@
   <p:sldMasterIdLst>
     <p:sldMasterId id="2147483660" r:id="rId1"/>
   </p:sldMasterIdLst>
+  <p:notesMasterIdLst>
+    <p:notesMasterId r:id="rId9"/>
+  </p:notesMasterIdLst>
   <p:sldIdLst>
     <p:sldId id="262" r:id="rId2"/>
-    <p:sldId id="257" r:id="rId3"/>
-    <p:sldId id="258" r:id="rId4"/>
-    <p:sldId id="259" r:id="rId5"/>
-    <p:sldId id="260" r:id="rId6"/>
-    <p:sldId id="261" r:id="rId7"/>
+    <p:sldId id="263" r:id="rId3"/>
+    <p:sldId id="257" r:id="rId4"/>
+    <p:sldId id="258" r:id="rId5"/>
+    <p:sldId id="259" r:id="rId6"/>
+    <p:sldId id="260" r:id="rId7"/>
+    <p:sldId id="261" r:id="rId8"/>
   </p:sldIdLst>
   <p:sldSz cx="12192000" cy="6858000"/>
   <p:notesSz cx="6858000" cy="9144000"/>
@@ -117,6 +121,356 @@
 </p:presentation>
 </file>
 
+<file path=ppt/notesMasters/notesMaster1.xml><?xml version="1.0" encoding="utf-8"?>
+<p:notesMaster xmlns:a="http://schemas.openxmlformats.org/drawingml/2006/main" xmlns:r="http://schemas.openxmlformats.org/officeDocument/2006/relationships" xmlns:p="http://schemas.openxmlformats.org/presentationml/2006/main">
+  <p:cSld>
+    <p:bg>
+      <p:bgRef idx="1001">
+        <a:schemeClr val="bg1"/>
+      </p:bgRef>
+    </p:bg>
+    <p:spTree>
+      <p:nvGrpSpPr>
+        <p:cNvPr id="1" name=""/>
+        <p:cNvGrpSpPr/>
+        <p:nvPr/>
+      </p:nvGrpSpPr>
+      <p:grpSpPr>
+        <a:xfrm>
+          <a:off x="0" y="0"/>
+          <a:ext cx="0" cy="0"/>
+          <a:chOff x="0" y="0"/>
+          <a:chExt cx="0" cy="0"/>
+        </a:xfrm>
+      </p:grpSpPr>
+      <p:sp>
+        <p:nvSpPr>
+          <p:cNvPr id="2" name="Header Placeholder 1"/>
+          <p:cNvSpPr>
+            <a:spLocks noGrp="1"/>
+          </p:cNvSpPr>
+          <p:nvPr>
+            <p:ph type="hdr" sz="quarter"/>
+          </p:nvPr>
+        </p:nvSpPr>
+        <p:spPr>
+          <a:xfrm>
+            <a:off x="0" y="0"/>
+            <a:ext cx="2971800" cy="458788"/>
+          </a:xfrm>
+          <a:prstGeom prst="rect">
+            <a:avLst/>
+          </a:prstGeom>
+        </p:spPr>
+        <p:txBody>
+          <a:bodyPr vert="horz" lIns="91440" tIns="45720" rIns="91440" bIns="45720" rtlCol="0"/>
+          <a:lstStyle>
+            <a:lvl1pPr algn="l">
+              <a:defRPr sz="1200"/>
+            </a:lvl1pPr>
+          </a:lstStyle>
+          <a:p>
+            <a:endParaRPr lang="en-GB"/>
+          </a:p>
+        </p:txBody>
+      </p:sp>
+      <p:sp>
+        <p:nvSpPr>
+          <p:cNvPr id="3" name="Date Placeholder 2"/>
+          <p:cNvSpPr>
+            <a:spLocks noGrp="1"/>
+          </p:cNvSpPr>
+          <p:nvPr>
+            <p:ph type="dt" idx="1"/>
+          </p:nvPr>
+        </p:nvSpPr>
+        <p:spPr>
+          <a:xfrm>
+            <a:off x="3884613" y="0"/>
+            <a:ext cx="2971800" cy="458788"/>
+          </a:xfrm>
+          <a:prstGeom prst="rect">
+            <a:avLst/>
+          </a:prstGeom>
+        </p:spPr>
+        <p:txBody>
+          <a:bodyPr vert="horz" lIns="91440" tIns="45720" rIns="91440" bIns="45720" rtlCol="0"/>
+          <a:lstStyle>
+            <a:lvl1pPr algn="r">
+              <a:defRPr sz="1200"/>
+            </a:lvl1pPr>
+          </a:lstStyle>
+          <a:p>
+            <a:fld id="{0ECDE342-CBC9-4C93-B443-47D1BF256F00}" type="datetimeFigureOut">
+              <a:rPr lang="en-GB" smtClean="0"/>
+              <a:t>21/06/2023</a:t>
+            </a:fld>
+            <a:endParaRPr lang="en-GB"/>
+          </a:p>
+        </p:txBody>
+      </p:sp>
+      <p:sp>
+        <p:nvSpPr>
+          <p:cNvPr id="4" name="Slide Image Placeholder 3"/>
+          <p:cNvSpPr>
+            <a:spLocks noGrp="1" noRot="1" noChangeAspect="1"/>
+          </p:cNvSpPr>
+          <p:nvPr>
+            <p:ph type="sldImg" idx="2"/>
+          </p:nvPr>
+        </p:nvSpPr>
+        <p:spPr>
+          <a:xfrm>
+            <a:off x="685800" y="1143000"/>
+            <a:ext cx="5486400" cy="3086100"/>
+          </a:xfrm>
+          <a:prstGeom prst="rect">
+            <a:avLst/>
+          </a:prstGeom>
+          <a:noFill/>
+          <a:ln w="12700">
+            <a:solidFill>
+              <a:prstClr val="black"/>
+            </a:solidFill>
+          </a:ln>
+        </p:spPr>
+        <p:txBody>
+          <a:bodyPr vert="horz" lIns="91440" tIns="45720" rIns="91440" bIns="45720" rtlCol="0" anchor="ctr"/>
+          <a:lstStyle/>
+          <a:p>
+            <a:endParaRPr lang="en-GB"/>
+          </a:p>
+        </p:txBody>
+      </p:sp>
+      <p:sp>
+        <p:nvSpPr>
+          <p:cNvPr id="5" name="Notes Placeholder 4"/>
+          <p:cNvSpPr>
+            <a:spLocks noGrp="1"/>
+          </p:cNvSpPr>
+          <p:nvPr>
+            <p:ph type="body" sz="quarter" idx="3"/>
+          </p:nvPr>
+        </p:nvSpPr>
+        <p:spPr>
+          <a:xfrm>
+            <a:off x="685800" y="4400550"/>
+            <a:ext cx="5486400" cy="3600450"/>
+          </a:xfrm>
+          <a:prstGeom prst="rect">
+            <a:avLst/>
+          </a:prstGeom>
+        </p:spPr>
+        <p:txBody>
+          <a:bodyPr vert="horz" lIns="91440" tIns="45720" rIns="91440" bIns="45720" rtlCol="0"/>
+          <a:lstStyle/>
+          <a:p>
+            <a:pPr lvl="0"/>
+            <a:r>
+              <a:rPr lang="en-US"/>
+              <a:t>Click to edit Master text styles</a:t>
+            </a:r>
+          </a:p>
+          <a:p>
+            <a:pPr lvl="1"/>
+            <a:r>
+              <a:rPr lang="en-US"/>
+              <a:t>Second level</a:t>
+            </a:r>
+          </a:p>
+          <a:p>
+            <a:pPr lvl="2"/>
+            <a:r>
+              <a:rPr lang="en-US"/>
+              <a:t>Third level</a:t>
+            </a:r>
+          </a:p>
+          <a:p>
+            <a:pPr lvl="3"/>
+            <a:r>
+              <a:rPr lang="en-US"/>
+              <a:t>Fourth level</a:t>
+            </a:r>
+          </a:p>
+          <a:p>
+            <a:pPr lvl="4"/>
+            <a:r>
+              <a:rPr lang="en-US"/>
+              <a:t>Fifth level</a:t>
+            </a:r>
+            <a:endParaRPr lang="en-GB"/>
+          </a:p>
+        </p:txBody>
+      </p:sp>
+      <p:sp>
+        <p:nvSpPr>
+          <p:cNvPr id="6" name="Footer Placeholder 5"/>
+          <p:cNvSpPr>
+            <a:spLocks noGrp="1"/>
+          </p:cNvSpPr>
+          <p:nvPr>
+            <p:ph type="ftr" sz="quarter" idx="4"/>
+          </p:nvPr>
+        </p:nvSpPr>
+        <p:spPr>
+          <a:xfrm>
+            <a:off x="0" y="8685213"/>
+            <a:ext cx="2971800" cy="458787"/>
+          </a:xfrm>
+          <a:prstGeom prst="rect">
+            <a:avLst/>
+          </a:prstGeom>
+        </p:spPr>
+        <p:txBody>
+          <a:bodyPr vert="horz" lIns="91440" tIns="45720" rIns="91440" bIns="45720" rtlCol="0" anchor="b"/>
+          <a:lstStyle>
+            <a:lvl1pPr algn="l">
+              <a:defRPr sz="1200"/>
+            </a:lvl1pPr>
+          </a:lstStyle>
+          <a:p>
+            <a:endParaRPr lang="en-GB"/>
+          </a:p>
+        </p:txBody>
+      </p:sp>
+      <p:sp>
+        <p:nvSpPr>
+          <p:cNvPr id="7" name="Slide Number Placeholder 6"/>
+          <p:cNvSpPr>
+            <a:spLocks noGrp="1"/>
+          </p:cNvSpPr>
+          <p:nvPr>
+            <p:ph type="sldNum" sz="quarter" idx="5"/>
+          </p:nvPr>
+        </p:nvSpPr>
+        <p:spPr>
+          <a:xfrm>
+            <a:off x="3884613" y="8685213"/>
+            <a:ext cx="2971800" cy="458787"/>
+          </a:xfrm>
+          <a:prstGeom prst="rect">
+            <a:avLst/>
+          </a:prstGeom>
+        </p:spPr>
+        <p:txBody>
+          <a:bodyPr vert="horz" lIns="91440" tIns="45720" rIns="91440" bIns="45720" rtlCol="0" anchor="b"/>
+          <a:lstStyle>
+            <a:lvl1pPr algn="r">
+              <a:defRPr sz="1200"/>
+            </a:lvl1pPr>
+          </a:lstStyle>
+          <a:p>
+            <a:fld id="{5988C16B-98BD-42BC-8B23-CC143877B252}" type="slidenum">
+              <a:rPr lang="en-GB" smtClean="0"/>
+              <a:t>‹#›</a:t>
+            </a:fld>
+            <a:endParaRPr lang="en-GB"/>
+          </a:p>
+        </p:txBody>
+      </p:sp>
+    </p:spTree>
+    <p:extLst>
+      <p:ext uri="{BB962C8B-B14F-4D97-AF65-F5344CB8AC3E}">
+        <p14:creationId xmlns:p14="http://schemas.microsoft.com/office/powerpoint/2010/main" val="695560298"/>
+      </p:ext>
+    </p:extLst>
+  </p:cSld>
+  <p:clrMap bg1="lt1" tx1="dk1" bg2="lt2" tx2="dk2" accent1="accent1" accent2="accent2" accent3="accent3" accent4="accent4" accent5="accent5" accent6="accent6" hlink="hlink" folHlink="folHlink"/>
+  <p:notesStyle>
+    <a:lvl1pPr marL="0" algn="l" defTabSz="914400" rtl="0" eaLnBrk="1" latinLnBrk="0" hangingPunct="1">
+      <a:defRPr sz="1200" kern="1200">
+        <a:solidFill>
+          <a:schemeClr val="tx1"/>
+        </a:solidFill>
+        <a:latin typeface="+mn-lt"/>
+        <a:ea typeface="+mn-ea"/>
+        <a:cs typeface="+mn-cs"/>
+      </a:defRPr>
+    </a:lvl1pPr>
+    <a:lvl2pPr marL="457200" algn="l" defTabSz="914400" rtl="0" eaLnBrk="1" latinLnBrk="0" hangingPunct="1">
+      <a:defRPr sz="1200" kern="1200">
+        <a:solidFill>
+          <a:schemeClr val="tx1"/>
+        </a:solidFill>
+        <a:latin typeface="+mn-lt"/>
+        <a:ea typeface="+mn-ea"/>
+        <a:cs typeface="+mn-cs"/>
+      </a:defRPr>
+    </a:lvl2pPr>
+    <a:lvl3pPr marL="914400" algn="l" defTabSz="914400" rtl="0" eaLnBrk="1" latinLnBrk="0" hangingPunct="1">
+      <a:defRPr sz="1200" kern="1200">
+        <a:solidFill>
+          <a:schemeClr val="tx1"/>
+        </a:solidFill>
+        <a:latin typeface="+mn-lt"/>
+        <a:ea typeface="+mn-ea"/>
+        <a:cs typeface="+mn-cs"/>
+      </a:defRPr>
+    </a:lvl3pPr>
+    <a:lvl4pPr marL="1371600" algn="l" defTabSz="914400" rtl="0" eaLnBrk="1" latinLnBrk="0" hangingPunct="1">
+      <a:defRPr sz="1200" kern="1200">
+        <a:solidFill>
+          <a:schemeClr val="tx1"/>
+        </a:solidFill>
+        <a:latin typeface="+mn-lt"/>
+        <a:ea typeface="+mn-ea"/>
+        <a:cs typeface="+mn-cs"/>
+      </a:defRPr>
+    </a:lvl4pPr>
+    <a:lvl5pPr marL="1828800" algn="l" defTabSz="914400" rtl="0" eaLnBrk="1" latinLnBrk="0" hangingPunct="1">
+      <a:defRPr sz="1200" kern="1200">
+        <a:solidFill>
+          <a:schemeClr val="tx1"/>
+        </a:solidFill>
+        <a:latin typeface="+mn-lt"/>
+        <a:ea typeface="+mn-ea"/>
+        <a:cs typeface="+mn-cs"/>
+      </a:defRPr>
+    </a:lvl5pPr>
+    <a:lvl6pPr marL="2286000" algn="l" defTabSz="914400" rtl="0" eaLnBrk="1" latinLnBrk="0" hangingPunct="1">
+      <a:defRPr sz="1200" kern="1200">
+        <a:solidFill>
+          <a:schemeClr val="tx1"/>
+        </a:solidFill>
+        <a:latin typeface="+mn-lt"/>
+        <a:ea typeface="+mn-ea"/>
+        <a:cs typeface="+mn-cs"/>
+      </a:defRPr>
+    </a:lvl6pPr>
+    <a:lvl7pPr marL="2743200" algn="l" defTabSz="914400" rtl="0" eaLnBrk="1" latinLnBrk="0" hangingPunct="1">
+      <a:defRPr sz="1200" kern="1200">
+        <a:solidFill>
+          <a:schemeClr val="tx1"/>
+        </a:solidFill>
+        <a:latin typeface="+mn-lt"/>
+        <a:ea typeface="+mn-ea"/>
+        <a:cs typeface="+mn-cs"/>
+      </a:defRPr>
+    </a:lvl7pPr>
+    <a:lvl8pPr marL="3200400" algn="l" defTabSz="914400" rtl="0" eaLnBrk="1" latinLnBrk="0" hangingPunct="1">
+      <a:defRPr sz="1200" kern="1200">
+        <a:solidFill>
+          <a:schemeClr val="tx1"/>
+        </a:solidFill>
+        <a:latin typeface="+mn-lt"/>
+        <a:ea typeface="+mn-ea"/>
+        <a:cs typeface="+mn-cs"/>
+      </a:defRPr>
+    </a:lvl8pPr>
+    <a:lvl9pPr marL="3657600" algn="l" defTabSz="914400" rtl="0" eaLnBrk="1" latinLnBrk="0" hangingPunct="1">
+      <a:defRPr sz="1200" kern="1200">
+        <a:solidFill>
+          <a:schemeClr val="tx1"/>
+        </a:solidFill>
+        <a:latin typeface="+mn-lt"/>
+        <a:ea typeface="+mn-ea"/>
+        <a:cs typeface="+mn-cs"/>
+      </a:defRPr>
+    </a:lvl9pPr>
+  </p:notesStyle>
+</p:notesMaster>
+</file>
+
 <file path=ppt/slideLayouts/slideLayout1.xml><?xml version="1.0" encoding="utf-8"?>
 <p:sldLayout xmlns:a="http://schemas.openxmlformats.org/drawingml/2006/main" xmlns:r="http://schemas.openxmlformats.org/officeDocument/2006/relationships" xmlns:p="http://schemas.openxmlformats.org/presentationml/2006/main" preserve="1">
   <p:cSld name="Title Slide with Speaker &amp; Event Details">
@@ -204,7 +558,7 @@
             </a:extLst>
           </p:cNvPr>
           <p:cNvSpPr/>
-          <p:nvPr/>
+          <p:nvPr userDrawn="1"/>
         </p:nvSpPr>
         <p:spPr>
           <a:xfrm>
@@ -488,12 +842,51 @@
           </a:p>
         </p:txBody>
       </p:sp>
-      <p:sp>
-        <p:nvSpPr>
-          <p:cNvPr id="12" name="Slide Number Placeholder 5">
-            <a:extLst>
-              <a:ext uri="{FF2B5EF4-FFF2-40B4-BE49-F238E27FC236}">
-                <a16:creationId xmlns:a16="http://schemas.microsoft.com/office/drawing/2014/main" id="{95BB70A1-8F26-ADBA-F763-A810A461C1CB}"/>
+      <p:pic>
+        <p:nvPicPr>
+          <p:cNvPr id="13" name="Graphic 12">
+            <a:extLst>
+              <a:ext uri="{FF2B5EF4-FFF2-40B4-BE49-F238E27FC236}">
+                <a16:creationId xmlns:a16="http://schemas.microsoft.com/office/drawing/2014/main" id="{B7F7C33A-2520-FBB8-B114-F234A7261972}"/>
+              </a:ext>
+            </a:extLst>
+          </p:cNvPr>
+          <p:cNvPicPr>
+            <a:picLocks noChangeAspect="1"/>
+          </p:cNvPicPr>
+          <p:nvPr/>
+        </p:nvPicPr>
+        <p:blipFill>
+          <a:blip r:embed="rId2">
+            <a:extLst>
+              <a:ext uri="{28A0092B-C50C-407E-A947-70E740481C1C}">
+                <a14:useLocalDpi xmlns:a14="http://schemas.microsoft.com/office/drawing/2010/main" val="0"/>
+              </a:ext>
+              <a:ext uri="{96DAC541-7B7A-43D3-8B79-37D633B846F1}">
+                <asvg:svgBlip xmlns:asvg="http://schemas.microsoft.com/office/drawing/2016/SVG/main" r:embed="rId3"/>
+              </a:ext>
+            </a:extLst>
+          </a:blip>
+          <a:stretch>
+            <a:fillRect/>
+          </a:stretch>
+        </p:blipFill>
+        <p:spPr>
+          <a:xfrm>
+            <a:off x="10439400" y="4331999"/>
+            <a:ext cx="1416170" cy="2066214"/>
+          </a:xfrm>
+          <a:prstGeom prst="rect">
+            <a:avLst/>
+          </a:prstGeom>
+        </p:spPr>
+      </p:pic>
+      <p:sp>
+        <p:nvSpPr>
+          <p:cNvPr id="4" name="Slide Number Placeholder 5">
+            <a:extLst>
+              <a:ext uri="{FF2B5EF4-FFF2-40B4-BE49-F238E27FC236}">
+                <a16:creationId xmlns:a16="http://schemas.microsoft.com/office/drawing/2014/main" id="{D967CEED-3C99-FEBF-227B-51302B6A527B}"/>
               </a:ext>
             </a:extLst>
           </p:cNvPr>
@@ -506,7 +899,7 @@
         </p:nvSpPr>
         <p:spPr>
           <a:xfrm>
-            <a:off x="11484634" y="6650966"/>
+            <a:off x="11643264" y="6646203"/>
             <a:ext cx="370936" cy="207034"/>
           </a:xfrm>
           <a:prstGeom prst="rect">
@@ -514,7 +907,7 @@
           </a:prstGeom>
         </p:spPr>
         <p:txBody>
-          <a:bodyPr/>
+          <a:bodyPr anchor="ctr"/>
           <a:lstStyle>
             <a:lvl1pPr algn="r">
               <a:defRPr sz="1000">
@@ -527,52 +920,12 @@
           <a:p>
             <a:fld id="{7767393B-85A6-40C1-AB65-A74DA355DB56}" type="slidenum">
               <a:rPr lang="en-GB" smtClean="0"/>
-              <a:pPr/>
               <a:t>‹#›</a:t>
             </a:fld>
-            <a:endParaRPr lang="en-GB"/>
-          </a:p>
-        </p:txBody>
-      </p:sp>
-      <p:pic>
-        <p:nvPicPr>
-          <p:cNvPr id="13" name="Graphic 12">
-            <a:extLst>
-              <a:ext uri="{FF2B5EF4-FFF2-40B4-BE49-F238E27FC236}">
-                <a16:creationId xmlns:a16="http://schemas.microsoft.com/office/drawing/2014/main" id="{B7F7C33A-2520-FBB8-B114-F234A7261972}"/>
-              </a:ext>
-            </a:extLst>
-          </p:cNvPr>
-          <p:cNvPicPr>
-            <a:picLocks noChangeAspect="1"/>
-          </p:cNvPicPr>
-          <p:nvPr/>
-        </p:nvPicPr>
-        <p:blipFill>
-          <a:blip r:embed="rId2">
-            <a:extLst>
-              <a:ext uri="{28A0092B-C50C-407E-A947-70E740481C1C}">
-                <a14:useLocalDpi xmlns:a14="http://schemas.microsoft.com/office/drawing/2010/main" val="0"/>
-              </a:ext>
-              <a:ext uri="{96DAC541-7B7A-43D3-8B79-37D633B846F1}">
-                <asvg:svgBlip xmlns:asvg="http://schemas.microsoft.com/office/drawing/2016/SVG/main" r:embed="rId3"/>
-              </a:ext>
-            </a:extLst>
-          </a:blip>
-          <a:stretch>
-            <a:fillRect/>
-          </a:stretch>
-        </p:blipFill>
-        <p:spPr>
-          <a:xfrm>
-            <a:off x="10439400" y="4331999"/>
-            <a:ext cx="1416170" cy="2066214"/>
-          </a:xfrm>
-          <a:prstGeom prst="rect">
-            <a:avLst/>
-          </a:prstGeom>
-        </p:spPr>
-      </p:pic>
+            <a:endParaRPr lang="en-GB" dirty="0"/>
+          </a:p>
+        </p:txBody>
+      </p:sp>
     </p:spTree>
     <p:extLst>
       <p:ext uri="{BB962C8B-B14F-4D97-AF65-F5344CB8AC3E}">
@@ -1786,12 +2139,51 @@
           </a:p>
         </p:txBody>
       </p:sp>
-      <p:sp>
-        <p:nvSpPr>
-          <p:cNvPr id="16" name="Slide Number Placeholder 5">
-            <a:extLst>
-              <a:ext uri="{FF2B5EF4-FFF2-40B4-BE49-F238E27FC236}">
-                <a16:creationId xmlns:a16="http://schemas.microsoft.com/office/drawing/2014/main" id="{89B524E3-A2A0-9DA2-1995-B4BB4D9925F0}"/>
+      <p:pic>
+        <p:nvPicPr>
+          <p:cNvPr id="6" name="Graphic 5">
+            <a:extLst>
+              <a:ext uri="{FF2B5EF4-FFF2-40B4-BE49-F238E27FC236}">
+                <a16:creationId xmlns:a16="http://schemas.microsoft.com/office/drawing/2014/main" id="{D3BBF434-5C6A-EA49-4EEC-481BEFABF4B5}"/>
+              </a:ext>
+            </a:extLst>
+          </p:cNvPr>
+          <p:cNvPicPr>
+            <a:picLocks noChangeAspect="1"/>
+          </p:cNvPicPr>
+          <p:nvPr/>
+        </p:nvPicPr>
+        <p:blipFill>
+          <a:blip r:embed="rId2">
+            <a:extLst>
+              <a:ext uri="{28A0092B-C50C-407E-A947-70E740481C1C}">
+                <a14:useLocalDpi xmlns:a14="http://schemas.microsoft.com/office/drawing/2010/main" val="0"/>
+              </a:ext>
+              <a:ext uri="{96DAC541-7B7A-43D3-8B79-37D633B846F1}">
+                <asvg:svgBlip xmlns:asvg="http://schemas.microsoft.com/office/drawing/2016/SVG/main" r:embed="rId3"/>
+              </a:ext>
+            </a:extLst>
+          </a:blip>
+          <a:stretch>
+            <a:fillRect/>
+          </a:stretch>
+        </p:blipFill>
+        <p:spPr>
+          <a:xfrm>
+            <a:off x="10173441" y="1143000"/>
+            <a:ext cx="1371154" cy="2000536"/>
+          </a:xfrm>
+          <a:prstGeom prst="rect">
+            <a:avLst/>
+          </a:prstGeom>
+        </p:spPr>
+      </p:pic>
+      <p:sp>
+        <p:nvSpPr>
+          <p:cNvPr id="2" name="Slide Number Placeholder 5">
+            <a:extLst>
+              <a:ext uri="{FF2B5EF4-FFF2-40B4-BE49-F238E27FC236}">
+                <a16:creationId xmlns:a16="http://schemas.microsoft.com/office/drawing/2014/main" id="{95271991-AFA8-D194-FFB7-0FD53DCC12AD}"/>
               </a:ext>
             </a:extLst>
           </p:cNvPr>
@@ -1804,7 +2196,7 @@
         </p:nvSpPr>
         <p:spPr>
           <a:xfrm>
-            <a:off x="11484634" y="6650966"/>
+            <a:off x="11643264" y="6646203"/>
             <a:ext cx="370936" cy="207034"/>
           </a:xfrm>
           <a:prstGeom prst="rect">
@@ -1812,7 +2204,7 @@
           </a:prstGeom>
         </p:spPr>
         <p:txBody>
-          <a:bodyPr/>
+          <a:bodyPr anchor="ctr"/>
           <a:lstStyle>
             <a:lvl1pPr algn="r">
               <a:defRPr sz="1000">
@@ -1825,52 +2217,12 @@
           <a:p>
             <a:fld id="{7767393B-85A6-40C1-AB65-A74DA355DB56}" type="slidenum">
               <a:rPr lang="en-GB" smtClean="0"/>
-              <a:pPr/>
               <a:t>‹#›</a:t>
             </a:fld>
             <a:endParaRPr lang="en-GB" dirty="0"/>
           </a:p>
         </p:txBody>
       </p:sp>
-      <p:pic>
-        <p:nvPicPr>
-          <p:cNvPr id="6" name="Graphic 5">
-            <a:extLst>
-              <a:ext uri="{FF2B5EF4-FFF2-40B4-BE49-F238E27FC236}">
-                <a16:creationId xmlns:a16="http://schemas.microsoft.com/office/drawing/2014/main" id="{D3BBF434-5C6A-EA49-4EEC-481BEFABF4B5}"/>
-              </a:ext>
-            </a:extLst>
-          </p:cNvPr>
-          <p:cNvPicPr>
-            <a:picLocks noChangeAspect="1"/>
-          </p:cNvPicPr>
-          <p:nvPr/>
-        </p:nvPicPr>
-        <p:blipFill>
-          <a:blip r:embed="rId2">
-            <a:extLst>
-              <a:ext uri="{28A0092B-C50C-407E-A947-70E740481C1C}">
-                <a14:useLocalDpi xmlns:a14="http://schemas.microsoft.com/office/drawing/2010/main" val="0"/>
-              </a:ext>
-              <a:ext uri="{96DAC541-7B7A-43D3-8B79-37D633B846F1}">
-                <asvg:svgBlip xmlns:asvg="http://schemas.microsoft.com/office/drawing/2016/SVG/main" r:embed="rId3"/>
-              </a:ext>
-            </a:extLst>
-          </a:blip>
-          <a:stretch>
-            <a:fillRect/>
-          </a:stretch>
-        </p:blipFill>
-        <p:spPr>
-          <a:xfrm>
-            <a:off x="10173441" y="1143000"/>
-            <a:ext cx="1371154" cy="2000536"/>
-          </a:xfrm>
-          <a:prstGeom prst="rect">
-            <a:avLst/>
-          </a:prstGeom>
-        </p:spPr>
-      </p:pic>
     </p:spTree>
     <p:extLst>
       <p:ext uri="{BB962C8B-B14F-4D97-AF65-F5344CB8AC3E}">
@@ -2365,7 +2717,7 @@
         </p:nvSpPr>
         <p:spPr>
           <a:xfrm>
-            <a:off x="11643264" y="6650966"/>
+            <a:off x="11643264" y="6646203"/>
             <a:ext cx="370936" cy="207034"/>
           </a:xfrm>
           <a:prstGeom prst="rect">
@@ -2373,7 +2725,7 @@
           </a:prstGeom>
         </p:spPr>
         <p:txBody>
-          <a:bodyPr/>
+          <a:bodyPr anchor="ctr"/>
           <a:lstStyle>
             <a:lvl1pPr algn="r">
               <a:defRPr sz="1000">
@@ -4439,6 +4791,7 @@
     <p:sldLayoutId id="2147483675" r:id="rId11"/>
     <p:sldLayoutId id="2147483676" r:id="rId12"/>
   </p:sldLayoutIdLst>
+  <p:hf hdr="0" ftr="0" dt="0"/>
   <p:txStyles>
     <p:titleStyle>
       <a:lvl1pPr algn="l" defTabSz="914400" rtl="0" eaLnBrk="1" latinLnBrk="0" hangingPunct="1">
@@ -4765,8 +5118,8 @@
         </p:nvSpPr>
         <p:spPr>
           <a:xfrm>
-            <a:off x="0" y="736600"/>
-            <a:ext cx="12192000" cy="2000536"/>
+            <a:off x="0" y="707683"/>
+            <a:ext cx="12192000" cy="1968500"/>
           </a:xfrm>
           <a:solidFill>
             <a:srgbClr val="3C9E27"/>
@@ -4831,8 +5184,8 @@
         </p:nvSpPr>
         <p:spPr>
           <a:xfrm>
-            <a:off x="-2" y="2934144"/>
-            <a:ext cx="12192002" cy="989711"/>
+            <a:off x="0" y="2917824"/>
+            <a:ext cx="12191998" cy="824610"/>
           </a:xfrm>
         </p:spPr>
         <p:txBody>
@@ -4880,6 +5233,36 @@
               </a:rPr>
               <a:t>June 2023</a:t>
             </a:r>
+          </a:p>
+        </p:txBody>
+      </p:sp>
+      <p:sp>
+        <p:nvSpPr>
+          <p:cNvPr id="6" name="Slide Number Placeholder 5">
+            <a:extLst>
+              <a:ext uri="{FF2B5EF4-FFF2-40B4-BE49-F238E27FC236}">
+                <a16:creationId xmlns:a16="http://schemas.microsoft.com/office/drawing/2014/main" id="{ABADD05C-B8D6-1C30-50C5-781559946BAD}"/>
+              </a:ext>
+            </a:extLst>
+          </p:cNvPr>
+          <p:cNvSpPr>
+            <a:spLocks noGrp="1"/>
+          </p:cNvSpPr>
+          <p:nvPr>
+            <p:ph type="sldNum" sz="quarter" idx="4"/>
+          </p:nvPr>
+        </p:nvSpPr>
+        <p:spPr/>
+        <p:txBody>
+          <a:bodyPr/>
+          <a:lstStyle/>
+          <a:p>
+            <a:fld id="{7767393B-85A6-40C1-AB65-A74DA355DB56}" type="slidenum">
+              <a:rPr lang="en-GB" smtClean="0"/>
+              <a:pPr/>
+              <a:t>1</a:t>
+            </a:fld>
+            <a:endParaRPr lang="en-GB"/>
           </a:p>
         </p:txBody>
       </p:sp>
@@ -4980,7 +5363,7 @@
           <p:cNvPr id="2" name="Title 1">
             <a:extLst>
               <a:ext uri="{FF2B5EF4-FFF2-40B4-BE49-F238E27FC236}">
-                <a16:creationId xmlns:a16="http://schemas.microsoft.com/office/drawing/2014/main" id="{FC375652-71D6-56BA-7F82-AA3B37FAD651}"/>
+                <a16:creationId xmlns:a16="http://schemas.microsoft.com/office/drawing/2014/main" id="{E8D30BF3-4DAF-5EBA-FA12-D5932C55CCFF}"/>
               </a:ext>
             </a:extLst>
           </p:cNvPr>
@@ -4989,37 +5372,6 @@
           </p:cNvSpPr>
           <p:nvPr>
             <p:ph type="title"/>
-          </p:nvPr>
-        </p:nvSpPr>
-        <p:spPr/>
-        <p:txBody>
-          <a:bodyPr>
-            <a:normAutofit/>
-          </a:bodyPr>
-          <a:lstStyle/>
-          <a:p>
-            <a:r>
-              <a:rPr lang="en-IE" dirty="0"/>
-              <a:t>College of Engineering &amp; Architecture</a:t>
-            </a:r>
-            <a:endParaRPr lang="en-GB" dirty="0"/>
-          </a:p>
-        </p:txBody>
-      </p:sp>
-      <p:sp>
-        <p:nvSpPr>
-          <p:cNvPr id="3" name="Content Placeholder 2">
-            <a:extLst>
-              <a:ext uri="{FF2B5EF4-FFF2-40B4-BE49-F238E27FC236}">
-                <a16:creationId xmlns:a16="http://schemas.microsoft.com/office/drawing/2014/main" id="{E2C740A0-846D-3D07-61A6-5AB181FFF773}"/>
-              </a:ext>
-            </a:extLst>
-          </p:cNvPr>
-          <p:cNvSpPr>
-            <a:spLocks noGrp="1"/>
-          </p:cNvSpPr>
-          <p:nvPr>
-            <p:ph idx="1"/>
           </p:nvPr>
         </p:nvSpPr>
         <p:spPr/>
@@ -5028,9 +5380,62 @@
           <a:lstStyle/>
           <a:p>
             <a:r>
-              <a:rPr lang="en-IE" dirty="0"/>
-              <a:t>(Pie + Bar Chart showing all modules at all levels across the college)</a:t>
-            </a:r>
+              <a:rPr lang="en-GB" dirty="0"/>
+              <a:t>Introduction</a:t>
+            </a:r>
+          </a:p>
+        </p:txBody>
+      </p:sp>
+      <p:sp>
+        <p:nvSpPr>
+          <p:cNvPr id="3" name="Content Placeholder 2">
+            <a:extLst>
+              <a:ext uri="{FF2B5EF4-FFF2-40B4-BE49-F238E27FC236}">
+                <a16:creationId xmlns:a16="http://schemas.microsoft.com/office/drawing/2014/main" id="{69F90EE4-6828-63AB-9418-F9FD01BBA4FD}"/>
+              </a:ext>
+            </a:extLst>
+          </p:cNvPr>
+          <p:cNvSpPr>
+            <a:spLocks noGrp="1"/>
+          </p:cNvSpPr>
+          <p:nvPr>
+            <p:ph idx="1"/>
+          </p:nvPr>
+        </p:nvSpPr>
+        <p:spPr/>
+        <p:txBody>
+          <a:bodyPr/>
+          <a:lstStyle/>
+          <a:p>
+            <a:endParaRPr lang="en-GB" dirty="0"/>
+          </a:p>
+        </p:txBody>
+      </p:sp>
+      <p:sp>
+        <p:nvSpPr>
+          <p:cNvPr id="4" name="Slide Number Placeholder 3">
+            <a:extLst>
+              <a:ext uri="{FF2B5EF4-FFF2-40B4-BE49-F238E27FC236}">
+                <a16:creationId xmlns:a16="http://schemas.microsoft.com/office/drawing/2014/main" id="{AC7DFA78-4EBE-51AA-98C2-26A39E2F7ABD}"/>
+              </a:ext>
+            </a:extLst>
+          </p:cNvPr>
+          <p:cNvSpPr>
+            <a:spLocks noGrp="1"/>
+          </p:cNvSpPr>
+          <p:nvPr>
+            <p:ph type="sldNum" sz="quarter" idx="4"/>
+          </p:nvPr>
+        </p:nvSpPr>
+        <p:spPr/>
+        <p:txBody>
+          <a:bodyPr/>
+          <a:lstStyle/>
+          <a:p>
+            <a:fld id="{7767393B-85A6-40C1-AB65-A74DA355DB56}" type="slidenum">
+              <a:rPr lang="en-GB" smtClean="0"/>
+              <a:t>2</a:t>
+            </a:fld>
             <a:endParaRPr lang="en-GB" dirty="0"/>
           </a:p>
         </p:txBody>
@@ -5038,7 +5443,7 @@
     </p:spTree>
     <p:extLst>
       <p:ext uri="{BB962C8B-B14F-4D97-AF65-F5344CB8AC3E}">
-        <p14:creationId xmlns:p14="http://schemas.microsoft.com/office/powerpoint/2010/main" val="2458326504"/>
+        <p14:creationId xmlns:p14="http://schemas.microsoft.com/office/powerpoint/2010/main" val="600488653"/>
       </p:ext>
     </p:extLst>
   </p:cSld>
@@ -5070,7 +5475,7 @@
           <p:cNvPr id="2" name="Title 1">
             <a:extLst>
               <a:ext uri="{FF2B5EF4-FFF2-40B4-BE49-F238E27FC236}">
-                <a16:creationId xmlns:a16="http://schemas.microsoft.com/office/drawing/2014/main" id="{FBC76673-21B3-83C2-436D-19B3C50CB4D5}"/>
+                <a16:creationId xmlns:a16="http://schemas.microsoft.com/office/drawing/2014/main" id="{FC375652-71D6-56BA-7F82-AA3B37FAD651}"/>
               </a:ext>
             </a:extLst>
           </p:cNvPr>
@@ -5079,6 +5484,37 @@
           </p:cNvSpPr>
           <p:nvPr>
             <p:ph type="title"/>
+          </p:nvPr>
+        </p:nvSpPr>
+        <p:spPr/>
+        <p:txBody>
+          <a:bodyPr>
+            <a:normAutofit/>
+          </a:bodyPr>
+          <a:lstStyle/>
+          <a:p>
+            <a:r>
+              <a:rPr lang="en-IE" dirty="0"/>
+              <a:t>College of Engineering &amp; Architecture</a:t>
+            </a:r>
+            <a:endParaRPr lang="en-GB" dirty="0"/>
+          </a:p>
+        </p:txBody>
+      </p:sp>
+      <p:sp>
+        <p:nvSpPr>
+          <p:cNvPr id="3" name="Content Placeholder 2">
+            <a:extLst>
+              <a:ext uri="{FF2B5EF4-FFF2-40B4-BE49-F238E27FC236}">
+                <a16:creationId xmlns:a16="http://schemas.microsoft.com/office/drawing/2014/main" id="{E2C740A0-846D-3D07-61A6-5AB181FFF773}"/>
+              </a:ext>
+            </a:extLst>
+          </p:cNvPr>
+          <p:cNvSpPr>
+            <a:spLocks noGrp="1"/>
+          </p:cNvSpPr>
+          <p:nvPr>
+            <p:ph idx="1"/>
           </p:nvPr>
         </p:nvSpPr>
         <p:spPr/>
@@ -5088,7 +5524,7 @@
           <a:p>
             <a:r>
               <a:rPr lang="en-IE" dirty="0"/>
-              <a:t>School of Electrical &amp; Electronic Engineering</a:t>
+              <a:t>(Pie + Bar Chart showing all modules at all levels across the college)</a:t>
             </a:r>
             <a:endParaRPr lang="en-GB" dirty="0"/>
           </a:p>
@@ -5096,18 +5532,18 @@
       </p:sp>
       <p:sp>
         <p:nvSpPr>
-          <p:cNvPr id="3" name="Content Placeholder 2">
-            <a:extLst>
-              <a:ext uri="{FF2B5EF4-FFF2-40B4-BE49-F238E27FC236}">
-                <a16:creationId xmlns:a16="http://schemas.microsoft.com/office/drawing/2014/main" id="{3BEF61A5-413F-9EEF-534A-2975C6042238}"/>
-              </a:ext>
-            </a:extLst>
-          </p:cNvPr>
-          <p:cNvSpPr>
-            <a:spLocks noGrp="1"/>
-          </p:cNvSpPr>
-          <p:nvPr>
-            <p:ph idx="1"/>
+          <p:cNvPr id="4" name="Slide Number Placeholder 3">
+            <a:extLst>
+              <a:ext uri="{FF2B5EF4-FFF2-40B4-BE49-F238E27FC236}">
+                <a16:creationId xmlns:a16="http://schemas.microsoft.com/office/drawing/2014/main" id="{05521CA3-70D0-A5AC-7848-71600960EAFB}"/>
+              </a:ext>
+            </a:extLst>
+          </p:cNvPr>
+          <p:cNvSpPr>
+            <a:spLocks noGrp="1"/>
+          </p:cNvSpPr>
+          <p:nvPr>
+            <p:ph type="sldNum" sz="quarter" idx="4"/>
           </p:nvPr>
         </p:nvSpPr>
         <p:spPr/>
@@ -5115,13 +5551,10 @@
           <a:bodyPr/>
           <a:lstStyle/>
           <a:p>
-            <a:r>
-              <a:rPr lang="en-IE" dirty="0"/>
-              <a:t>(Pie + Bar Chart showing all modules at all levels across the school)</a:t>
-            </a:r>
-            <a:endParaRPr lang="en-GB" dirty="0"/>
-          </a:p>
-          <a:p>
+            <a:fld id="{7767393B-85A6-40C1-AB65-A74DA355DB56}" type="slidenum">
+              <a:rPr lang="en-GB" smtClean="0"/>
+              <a:t>3</a:t>
+            </a:fld>
             <a:endParaRPr lang="en-GB" dirty="0"/>
           </a:p>
         </p:txBody>
@@ -5129,7 +5562,7 @@
     </p:spTree>
     <p:extLst>
       <p:ext uri="{BB962C8B-B14F-4D97-AF65-F5344CB8AC3E}">
-        <p14:creationId xmlns:p14="http://schemas.microsoft.com/office/powerpoint/2010/main" val="3467183463"/>
+        <p14:creationId xmlns:p14="http://schemas.microsoft.com/office/powerpoint/2010/main" val="2458326504"/>
       </p:ext>
     </p:extLst>
   </p:cSld>
@@ -5161,7 +5594,7 @@
           <p:cNvPr id="2" name="Title 1">
             <a:extLst>
               <a:ext uri="{FF2B5EF4-FFF2-40B4-BE49-F238E27FC236}">
-                <a16:creationId xmlns:a16="http://schemas.microsoft.com/office/drawing/2014/main" id="{87F11013-2145-A8B7-020D-468A2B81EC22}"/>
+                <a16:creationId xmlns:a16="http://schemas.microsoft.com/office/drawing/2014/main" id="{FBC76673-21B3-83C2-436D-19B3C50CB4D5}"/>
               </a:ext>
             </a:extLst>
           </p:cNvPr>
@@ -5179,7 +5612,7 @@
           <a:p>
             <a:r>
               <a:rPr lang="en-IE" dirty="0"/>
-              <a:t>ME Electronic &amp; Computer Engineering</a:t>
+              <a:t>School of Electrical &amp; Electronic Engineering</a:t>
             </a:r>
             <a:endParaRPr lang="en-GB" dirty="0"/>
           </a:p>
@@ -5190,7 +5623,7 @@
           <p:cNvPr id="3" name="Content Placeholder 2">
             <a:extLst>
               <a:ext uri="{FF2B5EF4-FFF2-40B4-BE49-F238E27FC236}">
-                <a16:creationId xmlns:a16="http://schemas.microsoft.com/office/drawing/2014/main" id="{A3810FBB-AF67-B1FA-3313-17566B70125E}"/>
+                <a16:creationId xmlns:a16="http://schemas.microsoft.com/office/drawing/2014/main" id="{3BEF61A5-413F-9EEF-534A-2975C6042238}"/>
               </a:ext>
             </a:extLst>
           </p:cNvPr>
@@ -5207,16 +5640,49 @@
           <a:lstStyle/>
           <a:p>
             <a:r>
-              <a:rPr lang="en-GB" dirty="0"/>
-              <a:t>Stacked bar chart showing all modules across stage 1 – 5 of the integrated masters</a:t>
-            </a:r>
+              <a:rPr lang="en-IE" dirty="0"/>
+              <a:t>(Pie + Bar Chart showing all modules at all levels across the school)</a:t>
+            </a:r>
+            <a:endParaRPr lang="en-GB" dirty="0"/>
+          </a:p>
+          <a:p>
+            <a:endParaRPr lang="en-GB" dirty="0"/>
+          </a:p>
+        </p:txBody>
+      </p:sp>
+      <p:sp>
+        <p:nvSpPr>
+          <p:cNvPr id="4" name="Slide Number Placeholder 3">
+            <a:extLst>
+              <a:ext uri="{FF2B5EF4-FFF2-40B4-BE49-F238E27FC236}">
+                <a16:creationId xmlns:a16="http://schemas.microsoft.com/office/drawing/2014/main" id="{4C9CF680-C8E0-1F39-5277-814878557697}"/>
+              </a:ext>
+            </a:extLst>
+          </p:cNvPr>
+          <p:cNvSpPr>
+            <a:spLocks noGrp="1"/>
+          </p:cNvSpPr>
+          <p:nvPr>
+            <p:ph type="sldNum" sz="quarter" idx="4"/>
+          </p:nvPr>
+        </p:nvSpPr>
+        <p:spPr/>
+        <p:txBody>
+          <a:bodyPr/>
+          <a:lstStyle/>
+          <a:p>
+            <a:fld id="{7767393B-85A6-40C1-AB65-A74DA355DB56}" type="slidenum">
+              <a:rPr lang="en-GB" smtClean="0"/>
+              <a:t>4</a:t>
+            </a:fld>
+            <a:endParaRPr lang="en-GB" dirty="0"/>
           </a:p>
         </p:txBody>
       </p:sp>
     </p:spTree>
     <p:extLst>
       <p:ext uri="{BB962C8B-B14F-4D97-AF65-F5344CB8AC3E}">
-        <p14:creationId xmlns:p14="http://schemas.microsoft.com/office/powerpoint/2010/main" val="2446378066"/>
+        <p14:creationId xmlns:p14="http://schemas.microsoft.com/office/powerpoint/2010/main" val="3467183463"/>
       </p:ext>
     </p:extLst>
   </p:cSld>
@@ -5248,7 +5714,7 @@
           <p:cNvPr id="2" name="Title 1">
             <a:extLst>
               <a:ext uri="{FF2B5EF4-FFF2-40B4-BE49-F238E27FC236}">
-                <a16:creationId xmlns:a16="http://schemas.microsoft.com/office/drawing/2014/main" id="{34B1F956-F358-44D8-1CE1-401B87634C21}"/>
+                <a16:creationId xmlns:a16="http://schemas.microsoft.com/office/drawing/2014/main" id="{87F11013-2145-A8B7-020D-468A2B81EC22}"/>
               </a:ext>
             </a:extLst>
           </p:cNvPr>
@@ -5266,7 +5732,7 @@
           <a:p>
             <a:r>
               <a:rPr lang="en-IE" dirty="0"/>
-              <a:t>ME Electrical Power Engineering</a:t>
+              <a:t>ME Electronic &amp; Computer Engineering</a:t>
             </a:r>
             <a:endParaRPr lang="en-GB" dirty="0"/>
           </a:p>
@@ -5277,7 +5743,7 @@
           <p:cNvPr id="3" name="Content Placeholder 2">
             <a:extLst>
               <a:ext uri="{FF2B5EF4-FFF2-40B4-BE49-F238E27FC236}">
-                <a16:creationId xmlns:a16="http://schemas.microsoft.com/office/drawing/2014/main" id="{92DEF0A0-9C31-20E5-7F9B-7EC0C554D7FC}"/>
+                <a16:creationId xmlns:a16="http://schemas.microsoft.com/office/drawing/2014/main" id="{A3810FBB-AF67-B1FA-3313-17566B70125E}"/>
               </a:ext>
             </a:extLst>
           </p:cNvPr>
@@ -5298,10 +5764,155 @@
               <a:t>Stacked bar chart showing all modules across stage 1 – 5 of the integrated masters</a:t>
             </a:r>
           </a:p>
+        </p:txBody>
+      </p:sp>
+      <p:sp>
+        <p:nvSpPr>
+          <p:cNvPr id="4" name="Slide Number Placeholder 3">
+            <a:extLst>
+              <a:ext uri="{FF2B5EF4-FFF2-40B4-BE49-F238E27FC236}">
+                <a16:creationId xmlns:a16="http://schemas.microsoft.com/office/drawing/2014/main" id="{70C08D24-582B-5736-4A69-EBA498D62ACC}"/>
+              </a:ext>
+            </a:extLst>
+          </p:cNvPr>
+          <p:cNvSpPr>
+            <a:spLocks noGrp="1"/>
+          </p:cNvSpPr>
+          <p:nvPr>
+            <p:ph type="sldNum" sz="quarter" idx="4"/>
+          </p:nvPr>
+        </p:nvSpPr>
+        <p:spPr/>
+        <p:txBody>
+          <a:bodyPr/>
+          <a:lstStyle/>
+          <a:p>
+            <a:fld id="{7767393B-85A6-40C1-AB65-A74DA355DB56}" type="slidenum">
+              <a:rPr lang="en-GB" smtClean="0"/>
+              <a:t>5</a:t>
+            </a:fld>
+            <a:endParaRPr lang="en-GB" dirty="0"/>
+          </a:p>
+        </p:txBody>
+      </p:sp>
+    </p:spTree>
+    <p:extLst>
+      <p:ext uri="{BB962C8B-B14F-4D97-AF65-F5344CB8AC3E}">
+        <p14:creationId xmlns:p14="http://schemas.microsoft.com/office/powerpoint/2010/main" val="2446378066"/>
+      </p:ext>
+    </p:extLst>
+  </p:cSld>
+  <p:clrMapOvr>
+    <a:masterClrMapping/>
+  </p:clrMapOvr>
+</p:sld>
+</file>
+
+<file path=ppt/slides/slide6.xml><?xml version="1.0" encoding="utf-8"?>
+<p:sld xmlns:a="http://schemas.openxmlformats.org/drawingml/2006/main" xmlns:r="http://schemas.openxmlformats.org/officeDocument/2006/relationships" xmlns:p="http://schemas.openxmlformats.org/presentationml/2006/main">
+  <p:cSld>
+    <p:spTree>
+      <p:nvGrpSpPr>
+        <p:cNvPr id="1" name=""/>
+        <p:cNvGrpSpPr/>
+        <p:nvPr/>
+      </p:nvGrpSpPr>
+      <p:grpSpPr>
+        <a:xfrm>
+          <a:off x="0" y="0"/>
+          <a:ext cx="0" cy="0"/>
+          <a:chOff x="0" y="0"/>
+          <a:chExt cx="0" cy="0"/>
+        </a:xfrm>
+      </p:grpSpPr>
+      <p:sp>
+        <p:nvSpPr>
+          <p:cNvPr id="2" name="Title 1">
+            <a:extLst>
+              <a:ext uri="{FF2B5EF4-FFF2-40B4-BE49-F238E27FC236}">
+                <a16:creationId xmlns:a16="http://schemas.microsoft.com/office/drawing/2014/main" id="{34B1F956-F358-44D8-1CE1-401B87634C21}"/>
+              </a:ext>
+            </a:extLst>
+          </p:cNvPr>
+          <p:cNvSpPr>
+            <a:spLocks noGrp="1"/>
+          </p:cNvSpPr>
+          <p:nvPr>
+            <p:ph type="title"/>
+          </p:nvPr>
+        </p:nvSpPr>
+        <p:spPr/>
+        <p:txBody>
+          <a:bodyPr/>
+          <a:lstStyle/>
+          <a:p>
+            <a:r>
+              <a:rPr lang="en-IE" dirty="0"/>
+              <a:t>ME Electrical Power Engineering</a:t>
+            </a:r>
+            <a:endParaRPr lang="en-GB" dirty="0"/>
+          </a:p>
+        </p:txBody>
+      </p:sp>
+      <p:sp>
+        <p:nvSpPr>
+          <p:cNvPr id="3" name="Content Placeholder 2">
+            <a:extLst>
+              <a:ext uri="{FF2B5EF4-FFF2-40B4-BE49-F238E27FC236}">
+                <a16:creationId xmlns:a16="http://schemas.microsoft.com/office/drawing/2014/main" id="{92DEF0A0-9C31-20E5-7F9B-7EC0C554D7FC}"/>
+              </a:ext>
+            </a:extLst>
+          </p:cNvPr>
+          <p:cNvSpPr>
+            <a:spLocks noGrp="1"/>
+          </p:cNvSpPr>
+          <p:nvPr>
+            <p:ph idx="1"/>
+          </p:nvPr>
+        </p:nvSpPr>
+        <p:spPr/>
+        <p:txBody>
+          <a:bodyPr/>
+          <a:lstStyle/>
+          <a:p>
+            <a:r>
+              <a:rPr lang="en-GB" dirty="0"/>
+              <a:t>Stacked bar chart showing all modules across stage 1 – 5 of the integrated masters</a:t>
+            </a:r>
+          </a:p>
           <a:p>
             <a:pPr marL="34925" indent="0">
               <a:buNone/>
             </a:pPr>
+            <a:endParaRPr lang="en-GB" dirty="0"/>
+          </a:p>
+        </p:txBody>
+      </p:sp>
+      <p:sp>
+        <p:nvSpPr>
+          <p:cNvPr id="4" name="Slide Number Placeholder 3">
+            <a:extLst>
+              <a:ext uri="{FF2B5EF4-FFF2-40B4-BE49-F238E27FC236}">
+                <a16:creationId xmlns:a16="http://schemas.microsoft.com/office/drawing/2014/main" id="{7C6CB816-00BE-0CE5-0752-89C75F2837C0}"/>
+              </a:ext>
+            </a:extLst>
+          </p:cNvPr>
+          <p:cNvSpPr>
+            <a:spLocks noGrp="1"/>
+          </p:cNvSpPr>
+          <p:nvPr>
+            <p:ph type="sldNum" sz="quarter" idx="4"/>
+          </p:nvPr>
+        </p:nvSpPr>
+        <p:spPr/>
+        <p:txBody>
+          <a:bodyPr/>
+          <a:lstStyle/>
+          <a:p>
+            <a:fld id="{7767393B-85A6-40C1-AB65-A74DA355DB56}" type="slidenum">
+              <a:rPr lang="en-GB" smtClean="0"/>
+              <a:t>6</a:t>
+            </a:fld>
             <a:endParaRPr lang="en-GB" dirty="0"/>
           </a:p>
         </p:txBody>
@@ -5319,7 +5930,7 @@
 </p:sld>
 </file>
 
-<file path=ppt/slides/slide6.xml><?xml version="1.0" encoding="utf-8"?>
+<file path=ppt/slides/slide7.xml><?xml version="1.0" encoding="utf-8"?>
 <p:sld xmlns:a="http://schemas.openxmlformats.org/drawingml/2006/main" xmlns:r="http://schemas.openxmlformats.org/officeDocument/2006/relationships" xmlns:p="http://schemas.openxmlformats.org/presentationml/2006/main">
   <p:cSld>
     <p:bg>
@@ -5362,8 +5973,8 @@
         </p:nvSpPr>
         <p:spPr>
           <a:xfrm>
-            <a:off x="149811" y="3429000"/>
-            <a:ext cx="11892378" cy="2387600"/>
+            <a:off x="0" y="3606800"/>
+            <a:ext cx="9544051" cy="2000536"/>
           </a:xfrm>
           <a:noFill/>
         </p:spPr>
@@ -5449,6 +6060,36 @@
                 <a:schemeClr val="bg1"/>
               </a:solidFill>
             </a:endParaRPr>
+          </a:p>
+        </p:txBody>
+      </p:sp>
+      <p:sp>
+        <p:nvSpPr>
+          <p:cNvPr id="3" name="Slide Number Placeholder 2">
+            <a:extLst>
+              <a:ext uri="{FF2B5EF4-FFF2-40B4-BE49-F238E27FC236}">
+                <a16:creationId xmlns:a16="http://schemas.microsoft.com/office/drawing/2014/main" id="{34A08643-71F9-48C3-FE72-9CC7ABEAFABF}"/>
+              </a:ext>
+            </a:extLst>
+          </p:cNvPr>
+          <p:cNvSpPr>
+            <a:spLocks noGrp="1"/>
+          </p:cNvSpPr>
+          <p:nvPr>
+            <p:ph type="sldNum" sz="quarter" idx="4"/>
+          </p:nvPr>
+        </p:nvSpPr>
+        <p:spPr/>
+        <p:txBody>
+          <a:bodyPr/>
+          <a:lstStyle/>
+          <a:p>
+            <a:fld id="{7767393B-85A6-40C1-AB65-A74DA355DB56}" type="slidenum">
+              <a:rPr lang="en-GB" smtClean="0"/>
+              <a:pPr/>
+              <a:t>7</a:t>
+            </a:fld>
+            <a:endParaRPr lang="en-GB" dirty="0"/>
           </a:p>
         </p:txBody>
       </p:sp>
@@ -5664,4 +6305,299 @@
     </a:ext>
   </a:extLst>
 </a:theme>
+</file>
+
+<file path=ppt/theme/theme2.xml><?xml version="1.0" encoding="utf-8"?>
+<a:theme xmlns:a="http://schemas.openxmlformats.org/drawingml/2006/main" name="Office Theme">
+  <a:themeElements>
+    <a:clrScheme name="Office">
+      <a:dk1>
+        <a:sysClr val="windowText" lastClr="000000"/>
+      </a:dk1>
+      <a:lt1>
+        <a:sysClr val="window" lastClr="FFFFFF"/>
+      </a:lt1>
+      <a:dk2>
+        <a:srgbClr val="44546A"/>
+      </a:dk2>
+      <a:lt2>
+        <a:srgbClr val="E7E6E6"/>
+      </a:lt2>
+      <a:accent1>
+        <a:srgbClr val="4472C4"/>
+      </a:accent1>
+      <a:accent2>
+        <a:srgbClr val="ED7D31"/>
+      </a:accent2>
+      <a:accent3>
+        <a:srgbClr val="A5A5A5"/>
+      </a:accent3>
+      <a:accent4>
+        <a:srgbClr val="FFC000"/>
+      </a:accent4>
+      <a:accent5>
+        <a:srgbClr val="5B9BD5"/>
+      </a:accent5>
+      <a:accent6>
+        <a:srgbClr val="70AD47"/>
+      </a:accent6>
+      <a:hlink>
+        <a:srgbClr val="0563C1"/>
+      </a:hlink>
+      <a:folHlink>
+        <a:srgbClr val="954F72"/>
+      </a:folHlink>
+    </a:clrScheme>
+    <a:fontScheme name="Office">
+      <a:majorFont>
+        <a:latin typeface="Calibri Light" panose="020F0302020204030204"/>
+        <a:ea typeface=""/>
+        <a:cs typeface=""/>
+        <a:font script="Jpan" typeface="游ゴシック Light"/>
+        <a:font script="Hang" typeface="맑은 고딕"/>
+        <a:font script="Hans" typeface="等线 Light"/>
+        <a:font script="Hant" typeface="新細明體"/>
+        <a:font script="Arab" typeface="Times New Roman"/>
+        <a:font script="Hebr" typeface="Times New Roman"/>
+        <a:font script="Thai" typeface="Angsana New"/>
+        <a:font script="Ethi" typeface="Nyala"/>
+        <a:font script="Beng" typeface="Vrinda"/>
+        <a:font script="Gujr" typeface="Shruti"/>
+        <a:font script="Khmr" typeface="MoolBoran"/>
+        <a:font script="Knda" typeface="Tunga"/>
+        <a:font script="Guru" typeface="Raavi"/>
+        <a:font script="Cans" typeface="Euphemia"/>
+        <a:font script="Cher" typeface="Plantagenet Cherokee"/>
+        <a:font script="Yiii" typeface="Microsoft Yi Baiti"/>
+        <a:font script="Tibt" typeface="Microsoft Himalaya"/>
+        <a:font script="Thaa" typeface="MV Boli"/>
+        <a:font script="Deva" typeface="Mangal"/>
+        <a:font script="Telu" typeface="Gautami"/>
+        <a:font script="Taml" typeface="Latha"/>
+        <a:font script="Syrc" typeface="Estrangelo Edessa"/>
+        <a:font script="Orya" typeface="Kalinga"/>
+        <a:font script="Mlym" typeface="Kartika"/>
+        <a:font script="Laoo" typeface="DokChampa"/>
+        <a:font script="Sinh" typeface="Iskoola Pota"/>
+        <a:font script="Mong" typeface="Mongolian Baiti"/>
+        <a:font script="Viet" typeface="Times New Roman"/>
+        <a:font script="Uigh" typeface="Microsoft Uighur"/>
+        <a:font script="Geor" typeface="Sylfaen"/>
+        <a:font script="Armn" typeface="Arial"/>
+        <a:font script="Bugi" typeface="Leelawadee UI"/>
+        <a:font script="Bopo" typeface="Microsoft JhengHei"/>
+        <a:font script="Java" typeface="Javanese Text"/>
+        <a:font script="Lisu" typeface="Segoe UI"/>
+        <a:font script="Mymr" typeface="Myanmar Text"/>
+        <a:font script="Nkoo" typeface="Ebrima"/>
+        <a:font script="Olck" typeface="Nirmala UI"/>
+        <a:font script="Osma" typeface="Ebrima"/>
+        <a:font script="Phag" typeface="Phagspa"/>
+        <a:font script="Syrn" typeface="Estrangelo Edessa"/>
+        <a:font script="Syrj" typeface="Estrangelo Edessa"/>
+        <a:font script="Syre" typeface="Estrangelo Edessa"/>
+        <a:font script="Sora" typeface="Nirmala UI"/>
+        <a:font script="Tale" typeface="Microsoft Tai Le"/>
+        <a:font script="Talu" typeface="Microsoft New Tai Lue"/>
+        <a:font script="Tfng" typeface="Ebrima"/>
+      </a:majorFont>
+      <a:minorFont>
+        <a:latin typeface="Calibri" panose="020F0502020204030204"/>
+        <a:ea typeface=""/>
+        <a:cs typeface=""/>
+        <a:font script="Jpan" typeface="游ゴシック"/>
+        <a:font script="Hang" typeface="맑은 고딕"/>
+        <a:font script="Hans" typeface="等线"/>
+        <a:font script="Hant" typeface="新細明體"/>
+        <a:font script="Arab" typeface="Arial"/>
+        <a:font script="Hebr" typeface="Arial"/>
+        <a:font script="Thai" typeface="Cordia New"/>
+        <a:font script="Ethi" typeface="Nyala"/>
+        <a:font script="Beng" typeface="Vrinda"/>
+        <a:font script="Gujr" typeface="Shruti"/>
+        <a:font script="Khmr" typeface="DaunPenh"/>
+        <a:font script="Knda" typeface="Tunga"/>
+        <a:font script="Guru" typeface="Raavi"/>
+        <a:font script="Cans" typeface="Euphemia"/>
+        <a:font script="Cher" typeface="Plantagenet Cherokee"/>
+        <a:font script="Yiii" typeface="Microsoft Yi Baiti"/>
+        <a:font script="Tibt" typeface="Microsoft Himalaya"/>
+        <a:font script="Thaa" typeface="MV Boli"/>
+        <a:font script="Deva" typeface="Mangal"/>
+        <a:font script="Telu" typeface="Gautami"/>
+        <a:font script="Taml" typeface="Latha"/>
+        <a:font script="Syrc" typeface="Estrangelo Edessa"/>
+        <a:font script="Orya" typeface="Kalinga"/>
+        <a:font script="Mlym" typeface="Kartika"/>
+        <a:font script="Laoo" typeface="DokChampa"/>
+        <a:font script="Sinh" typeface="Iskoola Pota"/>
+        <a:font script="Mong" typeface="Mongolian Baiti"/>
+        <a:font script="Viet" typeface="Arial"/>
+        <a:font script="Uigh" typeface="Microsoft Uighur"/>
+        <a:font script="Geor" typeface="Sylfaen"/>
+        <a:font script="Armn" typeface="Arial"/>
+        <a:font script="Bugi" typeface="Leelawadee UI"/>
+        <a:font script="Bopo" typeface="Microsoft JhengHei"/>
+        <a:font script="Java" typeface="Javanese Text"/>
+        <a:font script="Lisu" typeface="Segoe UI"/>
+        <a:font script="Mymr" typeface="Myanmar Text"/>
+        <a:font script="Nkoo" typeface="Ebrima"/>
+        <a:font script="Olck" typeface="Nirmala UI"/>
+        <a:font script="Osma" typeface="Ebrima"/>
+        <a:font script="Phag" typeface="Phagspa"/>
+        <a:font script="Syrn" typeface="Estrangelo Edessa"/>
+        <a:font script="Syrj" typeface="Estrangelo Edessa"/>
+        <a:font script="Syre" typeface="Estrangelo Edessa"/>
+        <a:font script="Sora" typeface="Nirmala UI"/>
+        <a:font script="Tale" typeface="Microsoft Tai Le"/>
+        <a:font script="Talu" typeface="Microsoft New Tai Lue"/>
+        <a:font script="Tfng" typeface="Ebrima"/>
+      </a:minorFont>
+    </a:fontScheme>
+    <a:fmtScheme name="Office">
+      <a:fillStyleLst>
+        <a:solidFill>
+          <a:schemeClr val="phClr"/>
+        </a:solidFill>
+        <a:gradFill rotWithShape="1">
+          <a:gsLst>
+            <a:gs pos="0">
+              <a:schemeClr val="phClr">
+                <a:lumMod val="110000"/>
+                <a:satMod val="105000"/>
+                <a:tint val="67000"/>
+              </a:schemeClr>
+            </a:gs>
+            <a:gs pos="50000">
+              <a:schemeClr val="phClr">
+                <a:lumMod val="105000"/>
+                <a:satMod val="103000"/>
+                <a:tint val="73000"/>
+              </a:schemeClr>
+            </a:gs>
+            <a:gs pos="100000">
+              <a:schemeClr val="phClr">
+                <a:lumMod val="105000"/>
+                <a:satMod val="109000"/>
+                <a:tint val="81000"/>
+              </a:schemeClr>
+            </a:gs>
+          </a:gsLst>
+          <a:lin ang="5400000" scaled="0"/>
+        </a:gradFill>
+        <a:gradFill rotWithShape="1">
+          <a:gsLst>
+            <a:gs pos="0">
+              <a:schemeClr val="phClr">
+                <a:satMod val="103000"/>
+                <a:lumMod val="102000"/>
+                <a:tint val="94000"/>
+              </a:schemeClr>
+            </a:gs>
+            <a:gs pos="50000">
+              <a:schemeClr val="phClr">
+                <a:satMod val="110000"/>
+                <a:lumMod val="100000"/>
+                <a:shade val="100000"/>
+              </a:schemeClr>
+            </a:gs>
+            <a:gs pos="100000">
+              <a:schemeClr val="phClr">
+                <a:lumMod val="99000"/>
+                <a:satMod val="120000"/>
+                <a:shade val="78000"/>
+              </a:schemeClr>
+            </a:gs>
+          </a:gsLst>
+          <a:lin ang="5400000" scaled="0"/>
+        </a:gradFill>
+      </a:fillStyleLst>
+      <a:lnStyleLst>
+        <a:ln w="6350" cap="flat" cmpd="sng" algn="ctr">
+          <a:solidFill>
+            <a:schemeClr val="phClr"/>
+          </a:solidFill>
+          <a:prstDash val="solid"/>
+          <a:miter lim="800000"/>
+        </a:ln>
+        <a:ln w="12700" cap="flat" cmpd="sng" algn="ctr">
+          <a:solidFill>
+            <a:schemeClr val="phClr"/>
+          </a:solidFill>
+          <a:prstDash val="solid"/>
+          <a:miter lim="800000"/>
+        </a:ln>
+        <a:ln w="19050" cap="flat" cmpd="sng" algn="ctr">
+          <a:solidFill>
+            <a:schemeClr val="phClr"/>
+          </a:solidFill>
+          <a:prstDash val="solid"/>
+          <a:miter lim="800000"/>
+        </a:ln>
+      </a:lnStyleLst>
+      <a:effectStyleLst>
+        <a:effectStyle>
+          <a:effectLst/>
+        </a:effectStyle>
+        <a:effectStyle>
+          <a:effectLst/>
+        </a:effectStyle>
+        <a:effectStyle>
+          <a:effectLst>
+            <a:outerShdw blurRad="57150" dist="19050" dir="5400000" algn="ctr" rotWithShape="0">
+              <a:srgbClr val="000000">
+                <a:alpha val="63000"/>
+              </a:srgbClr>
+            </a:outerShdw>
+          </a:effectLst>
+        </a:effectStyle>
+      </a:effectStyleLst>
+      <a:bgFillStyleLst>
+        <a:solidFill>
+          <a:schemeClr val="phClr"/>
+        </a:solidFill>
+        <a:solidFill>
+          <a:schemeClr val="phClr">
+            <a:tint val="95000"/>
+            <a:satMod val="170000"/>
+          </a:schemeClr>
+        </a:solidFill>
+        <a:gradFill rotWithShape="1">
+          <a:gsLst>
+            <a:gs pos="0">
+              <a:schemeClr val="phClr">
+                <a:tint val="93000"/>
+                <a:satMod val="150000"/>
+                <a:shade val="98000"/>
+                <a:lumMod val="102000"/>
+              </a:schemeClr>
+            </a:gs>
+            <a:gs pos="50000">
+              <a:schemeClr val="phClr">
+                <a:tint val="98000"/>
+                <a:satMod val="130000"/>
+                <a:shade val="90000"/>
+                <a:lumMod val="103000"/>
+              </a:schemeClr>
+            </a:gs>
+            <a:gs pos="100000">
+              <a:schemeClr val="phClr">
+                <a:shade val="63000"/>
+                <a:satMod val="120000"/>
+              </a:schemeClr>
+            </a:gs>
+          </a:gsLst>
+          <a:lin ang="5400000" scaled="0"/>
+        </a:gradFill>
+      </a:bgFillStyleLst>
+    </a:fmtScheme>
+  </a:themeElements>
+  <a:objectDefaults/>
+  <a:extraClrSchemeLst/>
+  <a:extLst>
+    <a:ext uri="{05A4C25C-085E-4340-85A3-A5531E510DB2}">
+      <thm15:themeFamily xmlns:thm15="http://schemas.microsoft.com/office/thememl/2012/main" name="Office Theme" id="{62F939B6-93AF-4DB8-9C6B-D6C7DFDC589F}" vid="{4A3C46E8-61CC-4603-A589-7422A47A8E4A}"/>
+    </a:ext>
+  </a:extLst>
+</a:theme>
 </file>
</xml_diff>

<commit_message>
slides updated, notebook used to create graphs hence update
</commit_message>
<xml_diff>
--- a/Slides/Schools Snapshot/AssessmentOverview_SEEE_202306.pptx
+++ b/Slides/Schools Snapshot/AssessmentOverview_SEEE_202306.pptx
@@ -10,9 +10,9 @@
   <p:sldIdLst>
     <p:sldId id="262" r:id="rId2"/>
     <p:sldId id="264" r:id="rId3"/>
-    <p:sldId id="263" r:id="rId4"/>
-    <p:sldId id="265" r:id="rId5"/>
-    <p:sldId id="257" r:id="rId6"/>
+    <p:sldId id="266" r:id="rId4"/>
+    <p:sldId id="267" r:id="rId5"/>
+    <p:sldId id="265" r:id="rId6"/>
     <p:sldId id="258" r:id="rId7"/>
     <p:sldId id="259" r:id="rId8"/>
     <p:sldId id="260" r:id="rId9"/>
@@ -5326,7 +5326,7 @@
             <a:pPr marL="2333625"/>
             <a:r>
               <a:rPr lang="en-GB" sz="1100" dirty="0"/>
-              <a:t>School of X in 2022/23</a:t>
+              <a:t>School of  in 2022/23</a:t>
             </a:r>
           </a:p>
         </p:txBody>
@@ -5471,12 +5471,20 @@
           <a:p>
             <a:pPr algn="ctr"/>
             <a:r>
+              <a:rPr lang="en-GB" sz="4800" b="1">
+                <a:solidFill>
+                  <a:schemeClr val="tx1"/>
+                </a:solidFill>
+              </a:rPr>
+              <a:t>14</a:t>
+            </a:r>
+            <a:r>
               <a:rPr lang="en-GB" sz="4800" b="1" dirty="0">
                 <a:solidFill>
                   <a:schemeClr val="tx1"/>
                 </a:solidFill>
               </a:rPr>
-              <a:t>X</a:t>
+              <a:t>5</a:t>
             </a:r>
           </a:p>
           <a:p>
@@ -6233,7 +6241,7 @@
             <a:pPr algn="ctr"/>
             <a:r>
               <a:rPr lang="en-GB" sz="2000" b="1" dirty="0"/>
-              <a:t>Portfolio</a:t>
+              <a:t>Attendance</a:t>
             </a:r>
           </a:p>
           <a:p>
@@ -6858,7 +6866,7 @@
 </file>
 
 <file path=ppt/slides/slide3.xml><?xml version="1.0" encoding="utf-8"?>
-<p:sld xmlns:a="http://schemas.openxmlformats.org/drawingml/2006/main" xmlns:r="http://schemas.openxmlformats.org/officeDocument/2006/relationships" xmlns:p="http://schemas.openxmlformats.org/presentationml/2006/main" show="0">
+<p:sld xmlns:a="http://schemas.openxmlformats.org/drawingml/2006/main" xmlns:r="http://schemas.openxmlformats.org/officeDocument/2006/relationships" xmlns:p="http://schemas.openxmlformats.org/presentationml/2006/main">
   <p:cSld>
     <p:spTree>
       <p:nvGrpSpPr>
@@ -6876,140 +6884,10 @@
       </p:grpSpPr>
       <p:sp>
         <p:nvSpPr>
-          <p:cNvPr id="2" name="Title 1">
-            <a:extLst>
-              <a:ext uri="{FF2B5EF4-FFF2-40B4-BE49-F238E27FC236}">
-                <a16:creationId xmlns:a16="http://schemas.microsoft.com/office/drawing/2014/main" id="{E8D30BF3-4DAF-5EBA-FA12-D5932C55CCFF}"/>
-              </a:ext>
-            </a:extLst>
-          </p:cNvPr>
-          <p:cNvSpPr>
-            <a:spLocks noGrp="1"/>
-          </p:cNvSpPr>
-          <p:nvPr>
-            <p:ph type="title"/>
-          </p:nvPr>
-        </p:nvSpPr>
-        <p:spPr/>
-        <p:txBody>
-          <a:bodyPr/>
-          <a:lstStyle/>
-          <a:p>
-            <a:r>
-              <a:rPr lang="en-GB" dirty="0"/>
-              <a:t>Introduction</a:t>
-            </a:r>
-          </a:p>
-        </p:txBody>
-      </p:sp>
-      <p:sp>
-        <p:nvSpPr>
-          <p:cNvPr id="3" name="Content Placeholder 2">
-            <a:extLst>
-              <a:ext uri="{FF2B5EF4-FFF2-40B4-BE49-F238E27FC236}">
-                <a16:creationId xmlns:a16="http://schemas.microsoft.com/office/drawing/2014/main" id="{69F90EE4-6828-63AB-9418-F9FD01BBA4FD}"/>
-              </a:ext>
-            </a:extLst>
-          </p:cNvPr>
-          <p:cNvSpPr>
-            <a:spLocks noGrp="1"/>
-          </p:cNvSpPr>
-          <p:nvPr>
-            <p:ph idx="1"/>
-          </p:nvPr>
-        </p:nvSpPr>
-        <p:spPr/>
-        <p:txBody>
-          <a:bodyPr/>
-          <a:lstStyle/>
-          <a:p>
-            <a:r>
-              <a:rPr lang="en-GB" dirty="0"/>
-              <a:t>Taught Credits = Assessment Weighting </a:t>
-            </a:r>
-            <a:r>
-              <a:rPr lang="en-GB" dirty="0">
-                <a:latin typeface="Lato" panose="020F0502020204030203" pitchFamily="34" charset="0"/>
-              </a:rPr>
-              <a:t>× </a:t>
-            </a:r>
-            <a:r>
-              <a:rPr lang="en-GB" dirty="0"/>
-              <a:t>ECTS Credits </a:t>
-            </a:r>
-            <a:r>
-              <a:rPr lang="en-GB" dirty="0">
-                <a:latin typeface="Lato" panose="020F0502020204030203" pitchFamily="34" charset="0"/>
-              </a:rPr>
-              <a:t>× 2022/23 Enrolled Students</a:t>
-            </a:r>
-          </a:p>
-          <a:p>
-            <a:pPr lvl="1"/>
-            <a:r>
-              <a:rPr lang="en-GB" dirty="0">
-                <a:latin typeface="Lato" panose="020F0502020204030203" pitchFamily="34" charset="0"/>
-              </a:rPr>
-              <a:t>e.g., a 10% essay assignment in a 5-credit module with 20 enrolled students is worth 10% × 5 × 20 = 10 taught credits</a:t>
-            </a:r>
-          </a:p>
-          <a:p>
-            <a:r>
-              <a:rPr lang="en-GB" dirty="0">
-                <a:latin typeface="Lato" panose="020F0502020204030203" pitchFamily="34" charset="0"/>
-              </a:rPr>
-              <a:t>(Modules in College)</a:t>
-            </a:r>
-          </a:p>
-          <a:p>
-            <a:r>
-              <a:rPr lang="en-GB" dirty="0">
-                <a:latin typeface="Lato" panose="020F0502020204030203" pitchFamily="34" charset="0"/>
-              </a:rPr>
-              <a:t>(Modules in School)</a:t>
-            </a:r>
-          </a:p>
-          <a:p>
-            <a:r>
-              <a:rPr lang="en-GB" dirty="0">
-                <a:latin typeface="Lato" panose="020F0502020204030203" pitchFamily="34" charset="0"/>
-              </a:rPr>
-              <a:t>(Number of 5/10 etc. credit modules in School)</a:t>
-            </a:r>
-          </a:p>
-          <a:p>
-            <a:r>
-              <a:rPr lang="en-GB" dirty="0">
-                <a:latin typeface="Lato" panose="020F0502020204030203" pitchFamily="34" charset="0"/>
-              </a:rPr>
-              <a:t>(Number of modules offered in Autumn/Spring/Summer Trimesters)</a:t>
-            </a:r>
-          </a:p>
-          <a:p>
-            <a:r>
-              <a:rPr lang="en-GB" dirty="0">
-                <a:latin typeface="Lato" panose="020F0502020204030203" pitchFamily="34" charset="0"/>
-              </a:rPr>
-              <a:t>(Number of different assessed components in School)</a:t>
-            </a:r>
-          </a:p>
-          <a:p>
-            <a:r>
-              <a:rPr lang="en-GB" dirty="0">
-                <a:latin typeface="Lato" panose="020F0502020204030203" pitchFamily="34" charset="0"/>
-              </a:rPr>
-              <a:t>(Flagship course offered by the School)</a:t>
-            </a:r>
-            <a:endParaRPr lang="en-GB" dirty="0"/>
-          </a:p>
-        </p:txBody>
-      </p:sp>
-      <p:sp>
-        <p:nvSpPr>
-          <p:cNvPr id="4" name="Slide Number Placeholder 3">
-            <a:extLst>
-              <a:ext uri="{FF2B5EF4-FFF2-40B4-BE49-F238E27FC236}">
-                <a16:creationId xmlns:a16="http://schemas.microsoft.com/office/drawing/2014/main" id="{AC7DFA78-4EBE-51AA-98C2-26A39E2F7ABD}"/>
+          <p:cNvPr id="2" name="Slide Number Placeholder 1">
+            <a:extLst>
+              <a:ext uri="{FF2B5EF4-FFF2-40B4-BE49-F238E27FC236}">
+                <a16:creationId xmlns:a16="http://schemas.microsoft.com/office/drawing/2014/main" id="{F59CD2F7-87E1-84B6-D556-698704CAD237}"/>
               </a:ext>
             </a:extLst>
           </p:cNvPr>
@@ -7033,10 +6911,46 @@
           </a:p>
         </p:txBody>
       </p:sp>
+      <p:pic>
+        <p:nvPicPr>
+          <p:cNvPr id="8" name="Picture 7" descr="A picture containing text, map, diagram, plan&#10;&#10;Description automatically generated">
+            <a:extLst>
+              <a:ext uri="{FF2B5EF4-FFF2-40B4-BE49-F238E27FC236}">
+                <a16:creationId xmlns:a16="http://schemas.microsoft.com/office/drawing/2014/main" id="{7B6B94B2-1339-B708-319B-ECAC4FD044C3}"/>
+              </a:ext>
+            </a:extLst>
+          </p:cNvPr>
+          <p:cNvPicPr>
+            <a:picLocks noChangeAspect="1"/>
+          </p:cNvPicPr>
+          <p:nvPr/>
+        </p:nvPicPr>
+        <p:blipFill>
+          <a:blip r:embed="rId2">
+            <a:extLst>
+              <a:ext uri="{28A0092B-C50C-407E-A947-70E740481C1C}">
+                <a14:useLocalDpi xmlns:a14="http://schemas.microsoft.com/office/drawing/2010/main" val="0"/>
+              </a:ext>
+            </a:extLst>
+          </a:blip>
+          <a:stretch>
+            <a:fillRect/>
+          </a:stretch>
+        </p:blipFill>
+        <p:spPr>
+          <a:xfrm>
+            <a:off x="305795" y="0"/>
+            <a:ext cx="11580409" cy="6513980"/>
+          </a:xfrm>
+          <a:prstGeom prst="rect">
+            <a:avLst/>
+          </a:prstGeom>
+        </p:spPr>
+      </p:pic>
     </p:spTree>
     <p:extLst>
       <p:ext uri="{BB962C8B-B14F-4D97-AF65-F5344CB8AC3E}">
-        <p14:creationId xmlns:p14="http://schemas.microsoft.com/office/powerpoint/2010/main" val="600488653"/>
+        <p14:creationId xmlns:p14="http://schemas.microsoft.com/office/powerpoint/2010/main" val="2575220126"/>
       </p:ext>
     </p:extLst>
   </p:cSld>
@@ -7065,72 +6979,10 @@
       </p:grpSpPr>
       <p:sp>
         <p:nvSpPr>
-          <p:cNvPr id="2" name="Title 1">
-            <a:extLst>
-              <a:ext uri="{FF2B5EF4-FFF2-40B4-BE49-F238E27FC236}">
-                <a16:creationId xmlns:a16="http://schemas.microsoft.com/office/drawing/2014/main" id="{FC375652-71D6-56BA-7F82-AA3B37FAD651}"/>
-              </a:ext>
-            </a:extLst>
-          </p:cNvPr>
-          <p:cNvSpPr>
-            <a:spLocks noGrp="1"/>
-          </p:cNvSpPr>
-          <p:nvPr>
-            <p:ph type="title"/>
-          </p:nvPr>
-        </p:nvSpPr>
-        <p:spPr/>
-        <p:txBody>
-          <a:bodyPr>
-            <a:normAutofit/>
-          </a:bodyPr>
-          <a:lstStyle/>
-          <a:p>
-            <a:r>
-              <a:rPr lang="en-IE" dirty="0"/>
-              <a:t>College of Engineering &amp; Architecture</a:t>
-            </a:r>
-            <a:endParaRPr lang="en-GB" dirty="0"/>
-          </a:p>
-        </p:txBody>
-      </p:sp>
-      <p:sp>
-        <p:nvSpPr>
-          <p:cNvPr id="3" name="Content Placeholder 2">
-            <a:extLst>
-              <a:ext uri="{FF2B5EF4-FFF2-40B4-BE49-F238E27FC236}">
-                <a16:creationId xmlns:a16="http://schemas.microsoft.com/office/drawing/2014/main" id="{E2C740A0-846D-3D07-61A6-5AB181FFF773}"/>
-              </a:ext>
-            </a:extLst>
-          </p:cNvPr>
-          <p:cNvSpPr>
-            <a:spLocks noGrp="1"/>
-          </p:cNvSpPr>
-          <p:nvPr>
-            <p:ph idx="1"/>
-          </p:nvPr>
-        </p:nvSpPr>
-        <p:spPr/>
-        <p:txBody>
-          <a:bodyPr/>
-          <a:lstStyle/>
-          <a:p>
-            <a:pPr marL="34925" indent="0">
-              <a:buNone/>
-            </a:pPr>
-            <a:r>
-              <a:rPr lang="en-GB" dirty="0"/>
-              <a:t>Tree Map</a:t>
-            </a:r>
-          </a:p>
-        </p:txBody>
-      </p:sp>
-      <p:sp>
-        <p:nvSpPr>
-          <p:cNvPr id="4" name="Slide Number Placeholder 3">
-            <a:extLst>
-              <a:ext uri="{FF2B5EF4-FFF2-40B4-BE49-F238E27FC236}">
-                <a16:creationId xmlns:a16="http://schemas.microsoft.com/office/drawing/2014/main" id="{05521CA3-70D0-A5AC-7848-71600960EAFB}"/>
+          <p:cNvPr id="2" name="Slide Number Placeholder 1">
+            <a:extLst>
+              <a:ext uri="{FF2B5EF4-FFF2-40B4-BE49-F238E27FC236}">
+                <a16:creationId xmlns:a16="http://schemas.microsoft.com/office/drawing/2014/main" id="{F90E04D9-396C-DB02-FD33-FE9735375788}"/>
               </a:ext>
             </a:extLst>
           </p:cNvPr>
@@ -7154,10 +7006,46 @@
           </a:p>
         </p:txBody>
       </p:sp>
+      <p:pic>
+        <p:nvPicPr>
+          <p:cNvPr id="4" name="Picture 3" descr="A picture containing rectangle, square, screenshot, parallel&#10;&#10;Description automatically generated">
+            <a:extLst>
+              <a:ext uri="{FF2B5EF4-FFF2-40B4-BE49-F238E27FC236}">
+                <a16:creationId xmlns:a16="http://schemas.microsoft.com/office/drawing/2014/main" id="{C538AB3A-120C-11AA-A507-8FB8E1F9C2DE}"/>
+              </a:ext>
+            </a:extLst>
+          </p:cNvPr>
+          <p:cNvPicPr>
+            <a:picLocks noChangeAspect="1"/>
+          </p:cNvPicPr>
+          <p:nvPr/>
+        </p:nvPicPr>
+        <p:blipFill>
+          <a:blip r:embed="rId2">
+            <a:extLst>
+              <a:ext uri="{28A0092B-C50C-407E-A947-70E740481C1C}">
+                <a14:useLocalDpi xmlns:a14="http://schemas.microsoft.com/office/drawing/2010/main" val="0"/>
+              </a:ext>
+            </a:extLst>
+          </a:blip>
+          <a:stretch>
+            <a:fillRect/>
+          </a:stretch>
+        </p:blipFill>
+        <p:spPr>
+          <a:xfrm>
+            <a:off x="353908" y="81577"/>
+            <a:ext cx="11474824" cy="6429331"/>
+          </a:xfrm>
+          <a:prstGeom prst="rect">
+            <a:avLst/>
+          </a:prstGeom>
+        </p:spPr>
+      </p:pic>
     </p:spTree>
     <p:extLst>
       <p:ext uri="{BB962C8B-B14F-4D97-AF65-F5344CB8AC3E}">
-        <p14:creationId xmlns:p14="http://schemas.microsoft.com/office/powerpoint/2010/main" val="2502662167"/>
+        <p14:creationId xmlns:p14="http://schemas.microsoft.com/office/powerpoint/2010/main" val="4099051357"/>
       </p:ext>
     </p:extLst>
   </p:cSld>
@@ -7217,41 +7105,6 @@
       </p:sp>
       <p:sp>
         <p:nvSpPr>
-          <p:cNvPr id="3" name="Content Placeholder 2">
-            <a:extLst>
-              <a:ext uri="{FF2B5EF4-FFF2-40B4-BE49-F238E27FC236}">
-                <a16:creationId xmlns:a16="http://schemas.microsoft.com/office/drawing/2014/main" id="{E2C740A0-846D-3D07-61A6-5AB181FFF773}"/>
-              </a:ext>
-            </a:extLst>
-          </p:cNvPr>
-          <p:cNvSpPr>
-            <a:spLocks noGrp="1"/>
-          </p:cNvSpPr>
-          <p:nvPr>
-            <p:ph idx="1"/>
-          </p:nvPr>
-        </p:nvSpPr>
-        <p:spPr/>
-        <p:txBody>
-          <a:bodyPr/>
-          <a:lstStyle/>
-          <a:p>
-            <a:r>
-              <a:rPr lang="en-IE" dirty="0"/>
-              <a:t>(Pie + Bar Chart showing all modules at all levels across the college)</a:t>
-            </a:r>
-            <a:endParaRPr lang="en-GB" dirty="0"/>
-          </a:p>
-          <a:p>
-            <a:pPr marL="34925" indent="0">
-              <a:buNone/>
-            </a:pPr>
-            <a:endParaRPr lang="en-GB" dirty="0"/>
-          </a:p>
-        </p:txBody>
-      </p:sp>
-      <p:sp>
-        <p:nvSpPr>
           <p:cNvPr id="4" name="Slide Number Placeholder 3">
             <a:extLst>
               <a:ext uri="{FF2B5EF4-FFF2-40B4-BE49-F238E27FC236}">
@@ -7279,10 +7132,59 @@
           </a:p>
         </p:txBody>
       </p:sp>
+      <p:pic>
+        <p:nvPicPr>
+          <p:cNvPr id="1026" name="Picture 2">
+            <a:extLst>
+              <a:ext uri="{FF2B5EF4-FFF2-40B4-BE49-F238E27FC236}">
+                <a16:creationId xmlns:a16="http://schemas.microsoft.com/office/drawing/2014/main" id="{85AB78D7-E5DA-0249-D651-26DF038D0C81}"/>
+              </a:ext>
+            </a:extLst>
+          </p:cNvPr>
+          <p:cNvPicPr>
+            <a:picLocks noGrp="1" noChangeAspect="1" noChangeArrowheads="1"/>
+          </p:cNvPicPr>
+          <p:nvPr>
+            <p:ph idx="1"/>
+          </p:nvPr>
+        </p:nvPicPr>
+        <p:blipFill>
+          <a:blip r:embed="rId2">
+            <a:extLst>
+              <a:ext uri="{28A0092B-C50C-407E-A947-70E740481C1C}">
+                <a14:useLocalDpi xmlns:a14="http://schemas.microsoft.com/office/drawing/2010/main" val="0"/>
+              </a:ext>
+            </a:extLst>
+          </a:blip>
+          <a:srcRect/>
+          <a:stretch>
+            <a:fillRect/>
+          </a:stretch>
+        </p:blipFill>
+        <p:spPr bwMode="auto">
+          <a:xfrm>
+            <a:off x="1060879" y="808038"/>
+            <a:ext cx="10070242" cy="5621337"/>
+          </a:xfrm>
+          <a:prstGeom prst="rect">
+            <a:avLst/>
+          </a:prstGeom>
+          <a:noFill/>
+          <a:extLst>
+            <a:ext uri="{909E8E84-426E-40DD-AFC4-6F175D3DCCD1}">
+              <a14:hiddenFill xmlns:a14="http://schemas.microsoft.com/office/drawing/2010/main">
+                <a:solidFill>
+                  <a:srgbClr val="FFFFFF"/>
+                </a:solidFill>
+              </a14:hiddenFill>
+            </a:ext>
+          </a:extLst>
+        </p:spPr>
+      </p:pic>
     </p:spTree>
     <p:extLst>
       <p:ext uri="{BB962C8B-B14F-4D97-AF65-F5344CB8AC3E}">
-        <p14:creationId xmlns:p14="http://schemas.microsoft.com/office/powerpoint/2010/main" val="2458326504"/>
+        <p14:creationId xmlns:p14="http://schemas.microsoft.com/office/powerpoint/2010/main" val="2502662167"/>
       </p:ext>
     </p:extLst>
   </p:cSld>
@@ -7340,38 +7242,6 @@
       </p:sp>
       <p:sp>
         <p:nvSpPr>
-          <p:cNvPr id="3" name="Content Placeholder 2">
-            <a:extLst>
-              <a:ext uri="{FF2B5EF4-FFF2-40B4-BE49-F238E27FC236}">
-                <a16:creationId xmlns:a16="http://schemas.microsoft.com/office/drawing/2014/main" id="{3BEF61A5-413F-9EEF-534A-2975C6042238}"/>
-              </a:ext>
-            </a:extLst>
-          </p:cNvPr>
-          <p:cNvSpPr>
-            <a:spLocks noGrp="1"/>
-          </p:cNvSpPr>
-          <p:nvPr>
-            <p:ph idx="1"/>
-          </p:nvPr>
-        </p:nvSpPr>
-        <p:spPr/>
-        <p:txBody>
-          <a:bodyPr/>
-          <a:lstStyle/>
-          <a:p>
-            <a:r>
-              <a:rPr lang="en-IE" dirty="0"/>
-              <a:t>(Pie + Bar Chart showing all modules at all levels across the school)</a:t>
-            </a:r>
-            <a:endParaRPr lang="en-GB" dirty="0"/>
-          </a:p>
-          <a:p>
-            <a:endParaRPr lang="en-GB" dirty="0"/>
-          </a:p>
-        </p:txBody>
-      </p:sp>
-      <p:sp>
-        <p:nvSpPr>
           <p:cNvPr id="4" name="Slide Number Placeholder 3">
             <a:extLst>
               <a:ext uri="{FF2B5EF4-FFF2-40B4-BE49-F238E27FC236}">
@@ -7399,6 +7269,55 @@
           </a:p>
         </p:txBody>
       </p:sp>
+      <p:pic>
+        <p:nvPicPr>
+          <p:cNvPr id="2052" name="Picture 4">
+            <a:extLst>
+              <a:ext uri="{FF2B5EF4-FFF2-40B4-BE49-F238E27FC236}">
+                <a16:creationId xmlns:a16="http://schemas.microsoft.com/office/drawing/2014/main" id="{1E3006AE-0DD1-CD76-0C10-ED73D7712DED}"/>
+              </a:ext>
+            </a:extLst>
+          </p:cNvPr>
+          <p:cNvPicPr>
+            <a:picLocks noGrp="1" noChangeAspect="1" noChangeArrowheads="1"/>
+          </p:cNvPicPr>
+          <p:nvPr>
+            <p:ph idx="1"/>
+          </p:nvPr>
+        </p:nvPicPr>
+        <p:blipFill>
+          <a:blip r:embed="rId2">
+            <a:extLst>
+              <a:ext uri="{28A0092B-C50C-407E-A947-70E740481C1C}">
+                <a14:useLocalDpi xmlns:a14="http://schemas.microsoft.com/office/drawing/2010/main" val="0"/>
+              </a:ext>
+            </a:extLst>
+          </a:blip>
+          <a:srcRect/>
+          <a:stretch>
+            <a:fillRect/>
+          </a:stretch>
+        </p:blipFill>
+        <p:spPr bwMode="auto">
+          <a:xfrm>
+            <a:off x="1060879" y="808038"/>
+            <a:ext cx="10070242" cy="5621337"/>
+          </a:xfrm>
+          <a:prstGeom prst="rect">
+            <a:avLst/>
+          </a:prstGeom>
+          <a:noFill/>
+          <a:extLst>
+            <a:ext uri="{909E8E84-426E-40DD-AFC4-6F175D3DCCD1}">
+              <a14:hiddenFill xmlns:a14="http://schemas.microsoft.com/office/drawing/2010/main">
+                <a:solidFill>
+                  <a:srgbClr val="FFFFFF"/>
+                </a:solidFill>
+              </a14:hiddenFill>
+            </a:ext>
+          </a:extLst>
+        </p:spPr>
+      </p:pic>
     </p:spTree>
     <p:extLst>
       <p:ext uri="{BB962C8B-B14F-4D97-AF65-F5344CB8AC3E}">
@@ -7479,10 +7398,10 @@
           <a:bodyPr/>
           <a:lstStyle/>
           <a:p>
-            <a:r>
-              <a:rPr lang="en-GB" dirty="0"/>
-              <a:t>Stacked bar chart showing all modules across stage 1 – 5 of the integrated masters</a:t>
-            </a:r>
+            <a:pPr marL="34925" indent="0">
+              <a:buNone/>
+            </a:pPr>
+            <a:endParaRPr lang="en-GB" dirty="0"/>
           </a:p>
         </p:txBody>
       </p:sp>
@@ -7576,40 +7495,6 @@
       </p:sp>
       <p:sp>
         <p:nvSpPr>
-          <p:cNvPr id="3" name="Content Placeholder 2">
-            <a:extLst>
-              <a:ext uri="{FF2B5EF4-FFF2-40B4-BE49-F238E27FC236}">
-                <a16:creationId xmlns:a16="http://schemas.microsoft.com/office/drawing/2014/main" id="{92DEF0A0-9C31-20E5-7F9B-7EC0C554D7FC}"/>
-              </a:ext>
-            </a:extLst>
-          </p:cNvPr>
-          <p:cNvSpPr>
-            <a:spLocks noGrp="1"/>
-          </p:cNvSpPr>
-          <p:nvPr>
-            <p:ph idx="1"/>
-          </p:nvPr>
-        </p:nvSpPr>
-        <p:spPr/>
-        <p:txBody>
-          <a:bodyPr/>
-          <a:lstStyle/>
-          <a:p>
-            <a:r>
-              <a:rPr lang="en-GB" dirty="0"/>
-              <a:t>Stacked bar chart showing all modules across stage 1 – 5 of the integrated masters</a:t>
-            </a:r>
-          </a:p>
-          <a:p>
-            <a:pPr marL="34925" indent="0">
-              <a:buNone/>
-            </a:pPr>
-            <a:endParaRPr lang="en-GB" dirty="0"/>
-          </a:p>
-        </p:txBody>
-      </p:sp>
-      <p:sp>
-        <p:nvSpPr>
           <p:cNvPr id="4" name="Slide Number Placeholder 3">
             <a:extLst>
               <a:ext uri="{FF2B5EF4-FFF2-40B4-BE49-F238E27FC236}">
@@ -7637,6 +7522,55 @@
           </a:p>
         </p:txBody>
       </p:sp>
+      <p:pic>
+        <p:nvPicPr>
+          <p:cNvPr id="3074" name="Picture 2">
+            <a:extLst>
+              <a:ext uri="{FF2B5EF4-FFF2-40B4-BE49-F238E27FC236}">
+                <a16:creationId xmlns:a16="http://schemas.microsoft.com/office/drawing/2014/main" id="{0F20502A-3749-956B-A47D-78ED3660AEAD}"/>
+              </a:ext>
+            </a:extLst>
+          </p:cNvPr>
+          <p:cNvPicPr>
+            <a:picLocks noGrp="1" noChangeAspect="1" noChangeArrowheads="1"/>
+          </p:cNvPicPr>
+          <p:nvPr>
+            <p:ph idx="1"/>
+          </p:nvPr>
+        </p:nvPicPr>
+        <p:blipFill>
+          <a:blip r:embed="rId2">
+            <a:extLst>
+              <a:ext uri="{28A0092B-C50C-407E-A947-70E740481C1C}">
+                <a14:useLocalDpi xmlns:a14="http://schemas.microsoft.com/office/drawing/2010/main" val="0"/>
+              </a:ext>
+            </a:extLst>
+          </a:blip>
+          <a:srcRect/>
+          <a:stretch>
+            <a:fillRect/>
+          </a:stretch>
+        </p:blipFill>
+        <p:spPr bwMode="auto">
+          <a:xfrm>
+            <a:off x="1060879" y="808038"/>
+            <a:ext cx="10070242" cy="5621337"/>
+          </a:xfrm>
+          <a:prstGeom prst="rect">
+            <a:avLst/>
+          </a:prstGeom>
+          <a:noFill/>
+          <a:extLst>
+            <a:ext uri="{909E8E84-426E-40DD-AFC4-6F175D3DCCD1}">
+              <a14:hiddenFill xmlns:a14="http://schemas.microsoft.com/office/drawing/2010/main">
+                <a:solidFill>
+                  <a:srgbClr val="FFFFFF"/>
+                </a:solidFill>
+              </a14:hiddenFill>
+            </a:ext>
+          </a:extLst>
+        </p:spPr>
+      </p:pic>
     </p:spTree>
     <p:extLst>
       <p:ext uri="{BB962C8B-B14F-4D97-AF65-F5344CB8AC3E}">
@@ -7693,8 +7627,8 @@
         </p:nvSpPr>
         <p:spPr>
           <a:xfrm>
-            <a:off x="0" y="3606800"/>
-            <a:ext cx="9544051" cy="2000536"/>
+            <a:off x="1" y="3606800"/>
+            <a:ext cx="8050306" cy="2000536"/>
           </a:xfrm>
           <a:noFill/>
         </p:spPr>

</xml_diff>

<commit_message>
slides updated + graphs saved from running code
</commit_message>
<xml_diff>
--- a/Slides/Schools Snapshot/AssessmentOverview_SEEE_202306.pptx
+++ b/Slides/Schools Snapshot/AssessmentOverview_SEEE_202306.pptx
@@ -5471,20 +5471,12 @@
           <a:p>
             <a:pPr algn="ctr"/>
             <a:r>
-              <a:rPr lang="en-GB" sz="4800" b="1">
-                <a:solidFill>
-                  <a:schemeClr val="tx1"/>
-                </a:solidFill>
-              </a:rPr>
-              <a:t>14</a:t>
-            </a:r>
-            <a:r>
               <a:rPr lang="en-GB" sz="4800" b="1" dirty="0">
                 <a:solidFill>
                   <a:schemeClr val="tx1"/>
                 </a:solidFill>
               </a:rPr>
-              <a:t>5</a:t>
+              <a:t>47</a:t>
             </a:r>
           </a:p>
           <a:p>

</xml_diff>

<commit_message>
push final changes with slides
</commit_message>
<xml_diff>
--- a/Slides/Schools Snapshot/AssessmentOverview_SEEE_202306.pptx
+++ b/Slides/Schools Snapshot/AssessmentOverview_SEEE_202306.pptx
@@ -5330,15 +5330,15 @@
       </p:sp>
       <p:pic>
         <p:nvPicPr>
-          <p:cNvPr id="4098" name="Picture 2">
-            <a:extLst>
-              <a:ext uri="{FF2B5EF4-FFF2-40B4-BE49-F238E27FC236}">
-                <a16:creationId xmlns:a16="http://schemas.microsoft.com/office/drawing/2014/main" id="{190F93FC-A2B6-AD93-068C-6DAD818EA003}"/>
+          <p:cNvPr id="10" name="Content Placeholder 9" descr="A picture containing text, screenshot, diagram, number&#10;&#10;Description automatically generated">
+            <a:extLst>
+              <a:ext uri="{FF2B5EF4-FFF2-40B4-BE49-F238E27FC236}">
+                <a16:creationId xmlns:a16="http://schemas.microsoft.com/office/drawing/2014/main" id="{06668F88-0A2B-49FB-8F75-34158A58C17B}"/>
               </a:ext>
             </a:extLst>
           </p:cNvPr>
           <p:cNvPicPr>
-            <a:picLocks noGrp="1" noChangeAspect="1" noChangeArrowheads="1"/>
+            <a:picLocks noGrp="1" noChangeAspect="1"/>
           </p:cNvPicPr>
           <p:nvPr>
             <p:ph idx="1"/>
@@ -5352,29 +5352,15 @@
               </a:ext>
             </a:extLst>
           </a:blip>
-          <a:srcRect/>
           <a:stretch>
             <a:fillRect/>
           </a:stretch>
         </p:blipFill>
-        <p:spPr bwMode="auto">
-          <a:xfrm>
-            <a:off x="1060879" y="808038"/>
-            <a:ext cx="10070242" cy="5621337"/>
-          </a:xfrm>
-          <a:prstGeom prst="rect">
-            <a:avLst/>
-          </a:prstGeom>
-          <a:noFill/>
-          <a:extLst>
-            <a:ext uri="{909E8E84-426E-40DD-AFC4-6F175D3DCCD1}">
-              <a14:hiddenFill xmlns:a14="http://schemas.microsoft.com/office/drawing/2010/main">
-                <a:solidFill>
-                  <a:srgbClr val="FFFFFF"/>
-                </a:solidFill>
-              </a14:hiddenFill>
-            </a:ext>
-          </a:extLst>
+        <p:spPr>
+          <a:xfrm>
+            <a:off x="1099256" y="808038"/>
+            <a:ext cx="9993488" cy="5621337"/>
+          </a:xfrm>
         </p:spPr>
       </p:pic>
     </p:spTree>
@@ -7657,15 +7643,15 @@
       </p:sp>
       <p:pic>
         <p:nvPicPr>
-          <p:cNvPr id="5122" name="Picture 2">
-            <a:extLst>
-              <a:ext uri="{FF2B5EF4-FFF2-40B4-BE49-F238E27FC236}">
-                <a16:creationId xmlns:a16="http://schemas.microsoft.com/office/drawing/2014/main" id="{198C82C9-C7C9-795F-88AA-A4026A48DE24}"/>
+          <p:cNvPr id="9" name="Content Placeholder 8" descr="A close-up of a graph&#10;&#10;Description automatically generated with medium confidence">
+            <a:extLst>
+              <a:ext uri="{FF2B5EF4-FFF2-40B4-BE49-F238E27FC236}">
+                <a16:creationId xmlns:a16="http://schemas.microsoft.com/office/drawing/2014/main" id="{BE273A97-69C0-57C1-F8E1-9ED0DF438B18}"/>
               </a:ext>
             </a:extLst>
           </p:cNvPr>
           <p:cNvPicPr>
-            <a:picLocks noGrp="1" noChangeAspect="1" noChangeArrowheads="1"/>
+            <a:picLocks noGrp="1" noChangeAspect="1"/>
           </p:cNvPicPr>
           <p:nvPr>
             <p:ph idx="1"/>
@@ -7679,29 +7665,15 @@
               </a:ext>
             </a:extLst>
           </a:blip>
-          <a:srcRect/>
           <a:stretch>
             <a:fillRect/>
           </a:stretch>
         </p:blipFill>
-        <p:spPr bwMode="auto">
-          <a:xfrm>
-            <a:off x="1055196" y="808038"/>
-            <a:ext cx="10081607" cy="5621337"/>
-          </a:xfrm>
-          <a:prstGeom prst="rect">
-            <a:avLst/>
-          </a:prstGeom>
-          <a:noFill/>
-          <a:extLst>
-            <a:ext uri="{909E8E84-426E-40DD-AFC4-6F175D3DCCD1}">
-              <a14:hiddenFill xmlns:a14="http://schemas.microsoft.com/office/drawing/2010/main">
-                <a:solidFill>
-                  <a:srgbClr val="FFFFFF"/>
-                </a:solidFill>
-              </a14:hiddenFill>
-            </a:ext>
-          </a:extLst>
+        <p:spPr>
+          <a:xfrm>
+            <a:off x="1099256" y="808038"/>
+            <a:ext cx="9993488" cy="5621337"/>
+          </a:xfrm>
         </p:spPr>
       </p:pic>
     </p:spTree>
@@ -7794,15 +7766,15 @@
       </p:sp>
       <p:pic>
         <p:nvPicPr>
-          <p:cNvPr id="6148" name="Picture 4">
-            <a:extLst>
-              <a:ext uri="{FF2B5EF4-FFF2-40B4-BE49-F238E27FC236}">
-                <a16:creationId xmlns:a16="http://schemas.microsoft.com/office/drawing/2014/main" id="{38180BDB-2CAE-EDC7-B1DB-7D36D32BC7AF}"/>
+          <p:cNvPr id="6" name="Content Placeholder 5" descr="A picture containing text, screenshot, diagram, font&#10;&#10;Description automatically generated">
+            <a:extLst>
+              <a:ext uri="{FF2B5EF4-FFF2-40B4-BE49-F238E27FC236}">
+                <a16:creationId xmlns:a16="http://schemas.microsoft.com/office/drawing/2014/main" id="{8AE912ED-53C8-952C-6C4E-74E453B0E235}"/>
               </a:ext>
             </a:extLst>
           </p:cNvPr>
           <p:cNvPicPr>
-            <a:picLocks noGrp="1" noChangeAspect="1" noChangeArrowheads="1"/>
+            <a:picLocks noGrp="1" noChangeAspect="1"/>
           </p:cNvPicPr>
           <p:nvPr>
             <p:ph idx="1"/>
@@ -7816,29 +7788,15 @@
               </a:ext>
             </a:extLst>
           </a:blip>
-          <a:srcRect/>
           <a:stretch>
             <a:fillRect/>
           </a:stretch>
         </p:blipFill>
-        <p:spPr bwMode="auto">
-          <a:xfrm>
-            <a:off x="1060879" y="808038"/>
-            <a:ext cx="10070242" cy="5621337"/>
-          </a:xfrm>
-          <a:prstGeom prst="rect">
-            <a:avLst/>
-          </a:prstGeom>
-          <a:noFill/>
-          <a:extLst>
-            <a:ext uri="{909E8E84-426E-40DD-AFC4-6F175D3DCCD1}">
-              <a14:hiddenFill xmlns:a14="http://schemas.microsoft.com/office/drawing/2010/main">
-                <a:solidFill>
-                  <a:srgbClr val="FFFFFF"/>
-                </a:solidFill>
-              </a14:hiddenFill>
-            </a:ext>
-          </a:extLst>
+        <p:spPr>
+          <a:xfrm>
+            <a:off x="1099256" y="808038"/>
+            <a:ext cx="9993488" cy="5621337"/>
+          </a:xfrm>
         </p:spPr>
       </p:pic>
     </p:spTree>
@@ -7931,15 +7889,15 @@
       </p:sp>
       <p:pic>
         <p:nvPicPr>
-          <p:cNvPr id="2050" name="Picture 2">
-            <a:extLst>
-              <a:ext uri="{FF2B5EF4-FFF2-40B4-BE49-F238E27FC236}">
-                <a16:creationId xmlns:a16="http://schemas.microsoft.com/office/drawing/2014/main" id="{259B2224-F0D8-71D6-16B8-008CEF9B73AE}"/>
+          <p:cNvPr id="6" name="Content Placeholder 5" descr="A picture containing text, screenshot, diagram, font&#10;&#10;Description automatically generated">
+            <a:extLst>
+              <a:ext uri="{FF2B5EF4-FFF2-40B4-BE49-F238E27FC236}">
+                <a16:creationId xmlns:a16="http://schemas.microsoft.com/office/drawing/2014/main" id="{3728F55C-3C8E-D4E7-B681-977C390EDECA}"/>
               </a:ext>
             </a:extLst>
           </p:cNvPr>
           <p:cNvPicPr>
-            <a:picLocks noGrp="1" noChangeAspect="1" noChangeArrowheads="1"/>
+            <a:picLocks noGrp="1" noChangeAspect="1"/>
           </p:cNvPicPr>
           <p:nvPr>
             <p:ph idx="1"/>
@@ -7953,29 +7911,15 @@
               </a:ext>
             </a:extLst>
           </a:blip>
-          <a:srcRect/>
           <a:stretch>
             <a:fillRect/>
           </a:stretch>
         </p:blipFill>
-        <p:spPr bwMode="auto">
-          <a:xfrm>
-            <a:off x="1060879" y="808038"/>
-            <a:ext cx="10070242" cy="5621337"/>
-          </a:xfrm>
-          <a:prstGeom prst="rect">
-            <a:avLst/>
-          </a:prstGeom>
-          <a:noFill/>
-          <a:extLst>
-            <a:ext uri="{909E8E84-426E-40DD-AFC4-6F175D3DCCD1}">
-              <a14:hiddenFill xmlns:a14="http://schemas.microsoft.com/office/drawing/2010/main">
-                <a:solidFill>
-                  <a:srgbClr val="FFFFFF"/>
-                </a:solidFill>
-              </a14:hiddenFill>
-            </a:ext>
-          </a:extLst>
+        <p:spPr>
+          <a:xfrm>
+            <a:off x="1099256" y="808038"/>
+            <a:ext cx="9993488" cy="5621337"/>
+          </a:xfrm>
         </p:spPr>
       </p:pic>
     </p:spTree>
@@ -8068,15 +8012,15 @@
       </p:sp>
       <p:pic>
         <p:nvPicPr>
-          <p:cNvPr id="5" name="Picture 2">
-            <a:extLst>
-              <a:ext uri="{FF2B5EF4-FFF2-40B4-BE49-F238E27FC236}">
-                <a16:creationId xmlns:a16="http://schemas.microsoft.com/office/drawing/2014/main" id="{C5D1601B-52D0-5182-DB83-139C5E53F3A4}"/>
+          <p:cNvPr id="7" name="Content Placeholder 6" descr="A picture containing text, screenshot, diagram, number&#10;&#10;Description automatically generated">
+            <a:extLst>
+              <a:ext uri="{FF2B5EF4-FFF2-40B4-BE49-F238E27FC236}">
+                <a16:creationId xmlns:a16="http://schemas.microsoft.com/office/drawing/2014/main" id="{3039EC99-A45B-507C-10AC-0BF598FAF21F}"/>
               </a:ext>
             </a:extLst>
           </p:cNvPr>
           <p:cNvPicPr>
-            <a:picLocks noGrp="1" noChangeAspect="1" noChangeArrowheads="1"/>
+            <a:picLocks noGrp="1" noChangeAspect="1"/>
           </p:cNvPicPr>
           <p:nvPr>
             <p:ph idx="1"/>
@@ -8090,29 +8034,15 @@
               </a:ext>
             </a:extLst>
           </a:blip>
-          <a:srcRect/>
           <a:stretch>
             <a:fillRect/>
           </a:stretch>
         </p:blipFill>
-        <p:spPr bwMode="auto">
-          <a:xfrm>
-            <a:off x="1057710" y="808038"/>
-            <a:ext cx="10076579" cy="5621337"/>
-          </a:xfrm>
-          <a:prstGeom prst="rect">
-            <a:avLst/>
-          </a:prstGeom>
-          <a:noFill/>
-          <a:extLst>
-            <a:ext uri="{909E8E84-426E-40DD-AFC4-6F175D3DCCD1}">
-              <a14:hiddenFill xmlns:a14="http://schemas.microsoft.com/office/drawing/2010/main">
-                <a:solidFill>
-                  <a:srgbClr val="FFFFFF"/>
-                </a:solidFill>
-              </a14:hiddenFill>
-            </a:ext>
-          </a:extLst>
+        <p:spPr>
+          <a:xfrm>
+            <a:off x="1099256" y="808038"/>
+            <a:ext cx="9993488" cy="5621337"/>
+          </a:xfrm>
         </p:spPr>
       </p:pic>
     </p:spTree>
@@ -8204,15 +8134,15 @@
       </p:sp>
       <p:pic>
         <p:nvPicPr>
-          <p:cNvPr id="3074" name="Picture 2">
-            <a:extLst>
-              <a:ext uri="{FF2B5EF4-FFF2-40B4-BE49-F238E27FC236}">
-                <a16:creationId xmlns:a16="http://schemas.microsoft.com/office/drawing/2014/main" id="{E14A67D5-0D98-28DC-B327-C5390756C654}"/>
+          <p:cNvPr id="6" name="Content Placeholder 5" descr="A picture containing text, screenshot, diagram, font&#10;&#10;Description automatically generated">
+            <a:extLst>
+              <a:ext uri="{FF2B5EF4-FFF2-40B4-BE49-F238E27FC236}">
+                <a16:creationId xmlns:a16="http://schemas.microsoft.com/office/drawing/2014/main" id="{22D976B0-10CD-2EA8-B181-AC1094E1F728}"/>
               </a:ext>
             </a:extLst>
           </p:cNvPr>
           <p:cNvPicPr>
-            <a:picLocks noGrp="1" noChangeAspect="1" noChangeArrowheads="1"/>
+            <a:picLocks noGrp="1" noChangeAspect="1"/>
           </p:cNvPicPr>
           <p:nvPr>
             <p:ph idx="1"/>
@@ -8226,29 +8156,15 @@
               </a:ext>
             </a:extLst>
           </a:blip>
-          <a:srcRect/>
           <a:stretch>
             <a:fillRect/>
           </a:stretch>
         </p:blipFill>
-        <p:spPr bwMode="auto">
-          <a:xfrm>
-            <a:off x="1060879" y="808038"/>
-            <a:ext cx="10070242" cy="5621337"/>
-          </a:xfrm>
-          <a:prstGeom prst="rect">
-            <a:avLst/>
-          </a:prstGeom>
-          <a:noFill/>
-          <a:extLst>
-            <a:ext uri="{909E8E84-426E-40DD-AFC4-6F175D3DCCD1}">
-              <a14:hiddenFill xmlns:a14="http://schemas.microsoft.com/office/drawing/2010/main">
-                <a:solidFill>
-                  <a:srgbClr val="FFFFFF"/>
-                </a:solidFill>
-              </a14:hiddenFill>
-            </a:ext>
-          </a:extLst>
+        <p:spPr>
+          <a:xfrm>
+            <a:off x="1099256" y="808038"/>
+            <a:ext cx="9993488" cy="5621337"/>
+          </a:xfrm>
         </p:spPr>
       </p:pic>
     </p:spTree>

</xml_diff>